<commit_message>
First cut of slide topics for Ada and C++ lecture
</commit_message>
<xml_diff>
--- a/lectures/04_Mixed_Language_Programming_In_Ada/03_Ada_and_C++/Slides/03_Ada_and_C++.pptx
+++ b/lectures/04_Mixed_Language_Programming_In_Ada/03_Ada_and_C++/Slides/03_Ada_and_C++.pptx
@@ -5,13 +5,20 @@
     <p:sldMasterId id="2147483649" r:id="rId1"/>
   </p:sldMasterIdLst>
   <p:notesMasterIdLst>
-    <p:notesMasterId r:id="rId6"/>
+    <p:notesMasterId r:id="rId13"/>
   </p:notesMasterIdLst>
   <p:sldIdLst>
     <p:sldId id="256" r:id="rId2"/>
     <p:sldId id="259" r:id="rId3"/>
-    <p:sldId id="258" r:id="rId4"/>
-    <p:sldId id="257" r:id="rId5"/>
+    <p:sldId id="260" r:id="rId4"/>
+    <p:sldId id="261" r:id="rId5"/>
+    <p:sldId id="262" r:id="rId6"/>
+    <p:sldId id="263" r:id="rId7"/>
+    <p:sldId id="265" r:id="rId8"/>
+    <p:sldId id="264" r:id="rId9"/>
+    <p:sldId id="266" r:id="rId10"/>
+    <p:sldId id="258" r:id="rId11"/>
+    <p:sldId id="257" r:id="rId12"/>
   </p:sldIdLst>
   <p:sldSz cx="9144000" cy="6858000" type="screen4x3"/>
   <p:notesSz cx="6858000" cy="9144000"/>
@@ -200,7 +207,7 @@
           <a:p>
             <a:fld id="{6AEF8CB0-33D2-4F49-9A97-DB788DFC7082}" type="datetimeFigureOut">
               <a:rPr lang="en-GB" smtClean="0"/>
-              <a:t>06/08/2014</a:t>
+              <a:t>10/08/2014</a:t>
             </a:fld>
             <a:endParaRPr lang="en-GB"/>
           </a:p>
@@ -522,13 +529,7 @@
               <a:rPr lang="en-GB" altLang="en-US" smtClean="0">
                 <a:ea typeface="ＭＳ Ｐゴシック" panose="020B0600070205080204" pitchFamily="34" charset="-128"/>
               </a:rPr>
-              <a:t>on </a:t>
-            </a:r>
-            <a:r>
-              <a:rPr lang="en-GB" altLang="en-US" smtClean="0">
-                <a:ea typeface="ＭＳ Ｐゴシック" panose="020B0600070205080204" pitchFamily="34" charset="-128"/>
-              </a:rPr>
-              <a:t>Mixed </a:t>
+              <a:t>on Mixed </a:t>
             </a:r>
             <a:r>
               <a:rPr lang="en-GB" altLang="en-US" dirty="0" smtClean="0">
@@ -540,13 +541,7 @@
               <a:rPr lang="en-GB" altLang="en-US" smtClean="0">
                 <a:ea typeface="ＭＳ Ｐゴシック" panose="020B0600070205080204" pitchFamily="34" charset="-128"/>
               </a:rPr>
-              <a:t>and </a:t>
-            </a:r>
-            <a:r>
-              <a:rPr lang="en-GB" altLang="en-US" smtClean="0">
-                <a:ea typeface="ＭＳ Ｐゴシック" panose="020B0600070205080204" pitchFamily="34" charset="-128"/>
-              </a:rPr>
-              <a:t>C++. </a:t>
+              <a:t>and C++. </a:t>
             </a:r>
             <a:endParaRPr lang="en-GB" altLang="en-US" dirty="0" smtClean="0">
               <a:ea typeface="ＭＳ Ｐゴシック" panose="020B0600070205080204" pitchFamily="34" charset="-128"/>
@@ -651,50 +646,87 @@
           <a:lstStyle/>
           <a:p>
             <a:r>
-              <a:rPr lang="en-GB" altLang="en-US" dirty="0" smtClean="0">
-                <a:ea typeface="ＭＳ Ｐゴシック" panose="020B0600070205080204" pitchFamily="34" charset="-128"/>
-              </a:rPr>
-              <a:t>We’ve now reached the end of the slide section of this lecture.  </a:t>
-            </a:r>
-          </a:p>
-          <a:p>
-            <a:endParaRPr lang="en-GB" altLang="en-US" dirty="0" smtClean="0">
-              <a:ea typeface="ＭＳ Ｐゴシック" panose="020B0600070205080204" pitchFamily="34" charset="-128"/>
-            </a:endParaRPr>
-          </a:p>
-          <a:p>
-            <a:r>
-              <a:rPr lang="en-GB" altLang="en-US" dirty="0" smtClean="0">
-                <a:ea typeface="ＭＳ Ｐゴシック" panose="020B0600070205080204" pitchFamily="34" charset="-128"/>
-              </a:rPr>
-              <a:t>You should now have enough knowledge of this subject to complete a small quiz with questions designed to test your understanding.</a:t>
-            </a:r>
-          </a:p>
-          <a:p>
-            <a:endParaRPr lang="en-GB" altLang="en-US" dirty="0" smtClean="0">
-              <a:ea typeface="ＭＳ Ｐゴシック" panose="020B0600070205080204" pitchFamily="34" charset="-128"/>
-            </a:endParaRPr>
-          </a:p>
-          <a:p>
-            <a:r>
-              <a:rPr lang="en-GB" altLang="en-US" dirty="0" smtClean="0">
-                <a:ea typeface="ＭＳ Ｐゴシック" panose="020B0600070205080204" pitchFamily="34" charset="-128"/>
-              </a:rPr>
-              <a:t>Each question is marked and you will have a chance to review your score at the end of the lecture.</a:t>
-            </a:r>
-          </a:p>
-          <a:p>
-            <a:endParaRPr lang="en-GB" altLang="en-US" dirty="0" smtClean="0">
-              <a:ea typeface="ＭＳ Ｐゴシック" panose="020B0600070205080204" pitchFamily="34" charset="-128"/>
-            </a:endParaRPr>
-          </a:p>
-          <a:p>
-            <a:r>
-              <a:rPr lang="en-GB" altLang="en-US" dirty="0" smtClean="0">
-                <a:ea typeface="ＭＳ Ｐゴシック" panose="020B0600070205080204" pitchFamily="34" charset="-128"/>
-              </a:rPr>
-              <a:t>Good luck !</a:t>
-            </a:r>
+              <a:rPr lang="en-GB" baseline="0" dirty="0" smtClean="0"/>
+              <a:t>This lecture will introduce the subtle differences between interfacing with C and C++ from Ada.</a:t>
+            </a:r>
+          </a:p>
+          <a:p>
+            <a:endParaRPr lang="en-GB" baseline="0" dirty="0" smtClean="0"/>
+          </a:p>
+          <a:p>
+            <a:r>
+              <a:rPr lang="en-GB" baseline="0" dirty="0" smtClean="0"/>
+              <a:t>We will show the C++ specific convention value CPP that is supported by the GNAT compiler.</a:t>
+            </a:r>
+          </a:p>
+          <a:p>
+            <a:endParaRPr lang="en-GB" baseline="0" dirty="0" smtClean="0"/>
+          </a:p>
+          <a:p>
+            <a:r>
+              <a:rPr lang="en-GB" baseline="0" dirty="0" smtClean="0"/>
+              <a:t>A subject that is heavily linked with C++ interfacing is Name Mangling, for which an overview is provided along with 3 approaches to dealing with it when interfacing Ada and C++.</a:t>
+            </a:r>
+          </a:p>
+          <a:p>
+            <a:endParaRPr lang="en-GB" baseline="0" dirty="0" smtClean="0"/>
+          </a:p>
+          <a:p>
+            <a:r>
+              <a:rPr lang="en-GB" baseline="0" dirty="0" smtClean="0"/>
+              <a:t>And while it’s possible to interface to both subprogram and memory objects in C++ the real power comes from being able to do class wide interfacing.</a:t>
+            </a:r>
+          </a:p>
+          <a:p>
+            <a:endParaRPr lang="en-GB" baseline="0" dirty="0" smtClean="0"/>
+          </a:p>
+          <a:p>
+            <a:r>
+              <a:rPr lang="en-GB" baseline="0" dirty="0" smtClean="0"/>
+              <a:t>This will involve importing C++ classes into Ada main programs and vice versa using support for objects in Ada implemented using tagged types.</a:t>
+            </a:r>
+          </a:p>
+          <a:p>
+            <a:endParaRPr lang="en-GB" baseline="0" dirty="0" smtClean="0"/>
+          </a:p>
+          <a:p>
+            <a:r>
+              <a:rPr lang="en-GB" baseline="0" dirty="0" smtClean="0"/>
+              <a:t>For reasons that will become clear this lecture uses the Ada 2005 standard and interfacing pragmas as opposed to Ada 2012 aspects.</a:t>
+            </a:r>
+          </a:p>
+          <a:p>
+            <a:endParaRPr lang="en-GB" baseline="0" dirty="0" smtClean="0"/>
+          </a:p>
+          <a:p>
+            <a:endParaRPr lang="en-GB" baseline="0" dirty="0" smtClean="0"/>
+          </a:p>
+          <a:p>
+            <a:endParaRPr lang="en-GB" baseline="0" dirty="0" smtClean="0"/>
+          </a:p>
+          <a:p>
+            <a:endParaRPr lang="en-GB" baseline="0" dirty="0" smtClean="0"/>
+          </a:p>
+          <a:p>
+            <a:endParaRPr lang="en-GB" baseline="0" dirty="0" smtClean="0"/>
+          </a:p>
+          <a:p>
+            <a:endParaRPr lang="en-GB" baseline="0" dirty="0" smtClean="0"/>
+          </a:p>
+          <a:p>
+            <a:endParaRPr lang="en-GB" baseline="0" dirty="0" smtClean="0"/>
+          </a:p>
+          <a:p>
+            <a:endParaRPr lang="en-GB" baseline="0" dirty="0" smtClean="0"/>
+          </a:p>
+          <a:p>
+            <a:endParaRPr lang="en-GB" baseline="0" dirty="0" smtClean="0"/>
+          </a:p>
+          <a:p>
+            <a:endParaRPr lang="en-GB" baseline="0" dirty="0" smtClean="0"/>
+          </a:p>
+          <a:p>
+            <a:endParaRPr lang="en-GB" dirty="0"/>
           </a:p>
         </p:txBody>
       </p:sp>
@@ -715,7 +747,7 @@
           <a:p>
             <a:fld id="{CA0C9329-88FA-4F10-ACFF-58B750973BE9}" type="slidenum">
               <a:rPr lang="en-GB" smtClean="0"/>
-              <a:t>3</a:t>
+              <a:t>2</a:t>
             </a:fld>
             <a:endParaRPr lang="en-GB"/>
           </a:p>
@@ -724,7 +756,7 @@
     </p:spTree>
     <p:extLst>
       <p:ext uri="{BB962C8B-B14F-4D97-AF65-F5344CB8AC3E}">
-        <p14:creationId xmlns:p14="http://schemas.microsoft.com/office/powerpoint/2010/main" val="1859432055"/>
+        <p14:creationId xmlns:p14="http://schemas.microsoft.com/office/powerpoint/2010/main" val="3715904002"/>
       </p:ext>
     </p:extLst>
   </p:cSld>
@@ -782,19 +814,20 @@
               <a:rPr lang="en-GB" altLang="en-US" dirty="0" smtClean="0">
                 <a:ea typeface="ＭＳ Ｐゴシック" panose="020B0600070205080204" pitchFamily="34" charset="-128"/>
               </a:rPr>
-              <a:t>Thank you for attending this lecture</a:t>
-            </a:r>
-            <a:r>
-              <a:rPr lang="en-GB" altLang="en-US" baseline="0" dirty="0" smtClean="0">
-                <a:ea typeface="ＭＳ Ｐゴシック" panose="020B0600070205080204" pitchFamily="34" charset="-128"/>
-              </a:rPr>
-              <a:t> from the AdaCore University</a:t>
-            </a:r>
+              <a:t>We’ve now reached the end of the slide section of this lecture.  </a:t>
+            </a:r>
+          </a:p>
+          <a:p>
+            <a:endParaRPr lang="en-GB" altLang="en-US" dirty="0" smtClean="0">
+              <a:ea typeface="ＭＳ Ｐゴシック" panose="020B0600070205080204" pitchFamily="34" charset="-128"/>
+            </a:endParaRPr>
+          </a:p>
+          <a:p>
             <a:r>
               <a:rPr lang="en-GB" altLang="en-US" dirty="0" smtClean="0">
                 <a:ea typeface="ＭＳ Ｐゴシック" panose="020B0600070205080204" pitchFamily="34" charset="-128"/>
               </a:rPr>
-              <a:t>.</a:t>
+              <a:t>You should now have enough knowledge of this subject to complete a small quiz with questions designed to test your understanding.</a:t>
             </a:r>
           </a:p>
           <a:p>
@@ -807,7 +840,7 @@
               <a:rPr lang="en-GB" altLang="en-US" dirty="0" smtClean="0">
                 <a:ea typeface="ＭＳ Ｐゴシック" panose="020B0600070205080204" pitchFamily="34" charset="-128"/>
               </a:rPr>
-              <a:t>I hope you have found it a valuable step in learning the Ada Programming Language and that you continue onto the other lectures in the course from the Ada University.</a:t>
+              <a:t>Each question is marked and you will have a chance to review your score at the end of the lecture.</a:t>
             </a:r>
           </a:p>
           <a:p>
@@ -820,11 +853,8 @@
               <a:rPr lang="en-GB" altLang="en-US" dirty="0" smtClean="0">
                 <a:ea typeface="ＭＳ Ｐゴシック" panose="020B0600070205080204" pitchFamily="34" charset="-128"/>
               </a:rPr>
-              <a:t>Thank you.</a:t>
-            </a:r>
-          </a:p>
-          <a:p>
-            <a:endParaRPr lang="en-GB" dirty="0"/>
+              <a:t>Good luck !</a:t>
+            </a:r>
           </a:p>
         </p:txBody>
       </p:sp>
@@ -845,7 +875,137 @@
           <a:p>
             <a:fld id="{CA0C9329-88FA-4F10-ACFF-58B750973BE9}" type="slidenum">
               <a:rPr lang="en-GB" smtClean="0"/>
-              <a:t>4</a:t>
+              <a:t>10</a:t>
+            </a:fld>
+            <a:endParaRPr lang="en-GB"/>
+          </a:p>
+        </p:txBody>
+      </p:sp>
+    </p:spTree>
+    <p:extLst>
+      <p:ext uri="{BB962C8B-B14F-4D97-AF65-F5344CB8AC3E}">
+        <p14:creationId xmlns:p14="http://schemas.microsoft.com/office/powerpoint/2010/main" val="1859432055"/>
+      </p:ext>
+    </p:extLst>
+  </p:cSld>
+  <p:clrMapOvr>
+    <a:masterClrMapping/>
+  </p:clrMapOvr>
+</p:notes>
+</file>
+
+<file path=ppt/notesSlides/notesSlide4.xml><?xml version="1.0" encoding="utf-8"?>
+<p:notes xmlns:a="http://schemas.openxmlformats.org/drawingml/2006/main" xmlns:r="http://schemas.openxmlformats.org/officeDocument/2006/relationships" xmlns:p="http://schemas.openxmlformats.org/presentationml/2006/main">
+  <p:cSld>
+    <p:spTree>
+      <p:nvGrpSpPr>
+        <p:cNvPr id="1" name=""/>
+        <p:cNvGrpSpPr/>
+        <p:nvPr/>
+      </p:nvGrpSpPr>
+      <p:grpSpPr>
+        <a:xfrm>
+          <a:off x="0" y="0"/>
+          <a:ext cx="0" cy="0"/>
+          <a:chOff x="0" y="0"/>
+          <a:chExt cx="0" cy="0"/>
+        </a:xfrm>
+      </p:grpSpPr>
+      <p:sp>
+        <p:nvSpPr>
+          <p:cNvPr id="2" name="Slide Image Placeholder 1"/>
+          <p:cNvSpPr>
+            <a:spLocks noGrp="1" noRot="1" noChangeAspect="1"/>
+          </p:cNvSpPr>
+          <p:nvPr>
+            <p:ph type="sldImg"/>
+          </p:nvPr>
+        </p:nvSpPr>
+        <p:spPr/>
+      </p:sp>
+      <p:sp>
+        <p:nvSpPr>
+          <p:cNvPr id="3" name="Notes Placeholder 2"/>
+          <p:cNvSpPr>
+            <a:spLocks noGrp="1"/>
+          </p:cNvSpPr>
+          <p:nvPr>
+            <p:ph type="body" idx="1"/>
+          </p:nvPr>
+        </p:nvSpPr>
+        <p:spPr/>
+        <p:txBody>
+          <a:bodyPr/>
+          <a:lstStyle/>
+          <a:p>
+            <a:r>
+              <a:rPr lang="en-GB" altLang="en-US" dirty="0" smtClean="0">
+                <a:ea typeface="ＭＳ Ｐゴシック" panose="020B0600070205080204" pitchFamily="34" charset="-128"/>
+              </a:rPr>
+              <a:t>Thank you for attending this lecture</a:t>
+            </a:r>
+            <a:r>
+              <a:rPr lang="en-GB" altLang="en-US" baseline="0" dirty="0" smtClean="0">
+                <a:ea typeface="ＭＳ Ｐゴシック" panose="020B0600070205080204" pitchFamily="34" charset="-128"/>
+              </a:rPr>
+              <a:t> from the AdaCore University</a:t>
+            </a:r>
+            <a:r>
+              <a:rPr lang="en-GB" altLang="en-US" dirty="0" smtClean="0">
+                <a:ea typeface="ＭＳ Ｐゴシック" panose="020B0600070205080204" pitchFamily="34" charset="-128"/>
+              </a:rPr>
+              <a:t>.</a:t>
+            </a:r>
+          </a:p>
+          <a:p>
+            <a:endParaRPr lang="en-GB" altLang="en-US" dirty="0" smtClean="0">
+              <a:ea typeface="ＭＳ Ｐゴシック" panose="020B0600070205080204" pitchFamily="34" charset="-128"/>
+            </a:endParaRPr>
+          </a:p>
+          <a:p>
+            <a:r>
+              <a:rPr lang="en-GB" altLang="en-US" dirty="0" smtClean="0">
+                <a:ea typeface="ＭＳ Ｐゴシック" panose="020B0600070205080204" pitchFamily="34" charset="-128"/>
+              </a:rPr>
+              <a:t>I hope you have found it a valuable step in learning the Ada Programming Language and that you continue onto the other lectures in the course from the Ada University.</a:t>
+            </a:r>
+          </a:p>
+          <a:p>
+            <a:endParaRPr lang="en-GB" altLang="en-US" dirty="0" smtClean="0">
+              <a:ea typeface="ＭＳ Ｐゴシック" panose="020B0600070205080204" pitchFamily="34" charset="-128"/>
+            </a:endParaRPr>
+          </a:p>
+          <a:p>
+            <a:r>
+              <a:rPr lang="en-GB" altLang="en-US" dirty="0" smtClean="0">
+                <a:ea typeface="ＭＳ Ｐゴシック" panose="020B0600070205080204" pitchFamily="34" charset="-128"/>
+              </a:rPr>
+              <a:t>Thank you.</a:t>
+            </a:r>
+          </a:p>
+          <a:p>
+            <a:endParaRPr lang="en-GB" dirty="0"/>
+          </a:p>
+        </p:txBody>
+      </p:sp>
+      <p:sp>
+        <p:nvSpPr>
+          <p:cNvPr id="4" name="Slide Number Placeholder 3"/>
+          <p:cNvSpPr>
+            <a:spLocks noGrp="1"/>
+          </p:cNvSpPr>
+          <p:nvPr>
+            <p:ph type="sldNum" sz="quarter" idx="10"/>
+          </p:nvPr>
+        </p:nvSpPr>
+        <p:spPr/>
+        <p:txBody>
+          <a:bodyPr/>
+          <a:lstStyle/>
+          <a:p>
+            <a:fld id="{CA0C9329-88FA-4F10-ACFF-58B750973BE9}" type="slidenum">
+              <a:rPr lang="en-GB" smtClean="0"/>
+              <a:t>11</a:t>
             </a:fld>
             <a:endParaRPr lang="en-GB"/>
           </a:p>
@@ -6327,6 +6487,66 @@
 </p:sld>
 </file>
 
+<file path=ppt/slides/slide10.xml><?xml version="1.0" encoding="utf-8"?>
+<p:sld xmlns:a="http://schemas.openxmlformats.org/drawingml/2006/main" xmlns:r="http://schemas.openxmlformats.org/officeDocument/2006/relationships" xmlns:p="http://schemas.openxmlformats.org/presentationml/2006/main">
+  <p:cSld>
+    <p:spTree>
+      <p:nvGrpSpPr>
+        <p:cNvPr id="1" name=""/>
+        <p:cNvGrpSpPr/>
+        <p:nvPr/>
+      </p:nvGrpSpPr>
+      <p:grpSpPr>
+        <a:xfrm>
+          <a:off x="0" y="0"/>
+          <a:ext cx="0" cy="0"/>
+          <a:chOff x="0" y="0"/>
+          <a:chExt cx="0" cy="0"/>
+        </a:xfrm>
+      </p:grpSpPr>
+    </p:spTree>
+    <p:extLst>
+      <p:ext uri="{BB962C8B-B14F-4D97-AF65-F5344CB8AC3E}">
+        <p14:creationId xmlns:p14="http://schemas.microsoft.com/office/powerpoint/2010/main" val="396922585"/>
+      </p:ext>
+    </p:extLst>
+  </p:cSld>
+  <p:clrMapOvr>
+    <a:masterClrMapping/>
+  </p:clrMapOvr>
+</p:sld>
+</file>
+
+<file path=ppt/slides/slide11.xml><?xml version="1.0" encoding="utf-8"?>
+<p:sld xmlns:a="http://schemas.openxmlformats.org/drawingml/2006/main" xmlns:r="http://schemas.openxmlformats.org/officeDocument/2006/relationships" xmlns:p="http://schemas.openxmlformats.org/presentationml/2006/main">
+  <p:cSld>
+    <p:spTree>
+      <p:nvGrpSpPr>
+        <p:cNvPr id="1" name=""/>
+        <p:cNvGrpSpPr/>
+        <p:nvPr/>
+      </p:nvGrpSpPr>
+      <p:grpSpPr>
+        <a:xfrm>
+          <a:off x="0" y="0"/>
+          <a:ext cx="0" cy="0"/>
+          <a:chOff x="0" y="0"/>
+          <a:chExt cx="0" cy="0"/>
+        </a:xfrm>
+      </p:grpSpPr>
+    </p:spTree>
+    <p:extLst>
+      <p:ext uri="{BB962C8B-B14F-4D97-AF65-F5344CB8AC3E}">
+        <p14:creationId xmlns:p14="http://schemas.microsoft.com/office/powerpoint/2010/main" val="1688865195"/>
+      </p:ext>
+    </p:extLst>
+  </p:cSld>
+  <p:clrMapOvr>
+    <a:masterClrMapping/>
+  </p:clrMapOvr>
+</p:sld>
+</file>
+
 <file path=ppt/slides/slide2.xml><?xml version="1.0" encoding="utf-8"?>
 <p:sld xmlns:a="http://schemas.openxmlformats.org/drawingml/2006/main" xmlns:r="http://schemas.openxmlformats.org/officeDocument/2006/relationships" xmlns:p="http://schemas.openxmlformats.org/presentationml/2006/main">
   <p:cSld>
@@ -6377,12 +6597,114 @@
             <p:ph sz="half" idx="10"/>
           </p:nvPr>
         </p:nvSpPr>
-        <p:spPr/>
+        <p:spPr>
+          <a:xfrm>
+            <a:off x="729343" y="1041400"/>
+            <a:ext cx="7848600" cy="5127171"/>
+          </a:xfrm>
+        </p:spPr>
         <p:txBody>
           <a:bodyPr/>
           <a:lstStyle/>
           <a:p>
-            <a:endParaRPr lang="en-GB"/>
+            <a:r>
+              <a:rPr lang="en-GB" dirty="0" smtClean="0"/>
+              <a:t>CPP Convention</a:t>
+            </a:r>
+          </a:p>
+          <a:p>
+            <a:r>
+              <a:rPr lang="en-GB" dirty="0" smtClean="0"/>
+              <a:t>C++ Name Mangling</a:t>
+            </a:r>
+            <a:endParaRPr lang="en-GB" dirty="0" smtClean="0"/>
+          </a:p>
+          <a:p>
+            <a:r>
+              <a:rPr lang="en-GB" dirty="0" smtClean="0"/>
+              <a:t>Methods for Address </a:t>
+            </a:r>
+            <a:r>
+              <a:rPr lang="en-GB" dirty="0"/>
+              <a:t>tricky issues of C++ </a:t>
+            </a:r>
+            <a:r>
+              <a:rPr lang="en-GB" dirty="0" smtClean="0"/>
+              <a:t>Name Mangling</a:t>
+            </a:r>
+          </a:p>
+          <a:p>
+            <a:pPr lvl="1"/>
+            <a:r>
+              <a:rPr lang="en-GB" dirty="0" smtClean="0"/>
+              <a:t>extern “C” and use Convention =&gt; C</a:t>
+            </a:r>
+          </a:p>
+          <a:p>
+            <a:pPr lvl="1"/>
+            <a:r>
+              <a:rPr lang="en-GB" dirty="0" smtClean="0"/>
+              <a:t>Using Link_Name</a:t>
+            </a:r>
+            <a:r>
+              <a:rPr lang="en-GB" dirty="0"/>
+              <a:t> </a:t>
+            </a:r>
+            <a:r>
+              <a:rPr lang="en-GB" dirty="0" smtClean="0"/>
+              <a:t>with hardcoded linker symbol</a:t>
+            </a:r>
+          </a:p>
+          <a:p>
+            <a:pPr lvl="1"/>
+            <a:r>
+              <a:rPr lang="en-GB" dirty="0" smtClean="0"/>
+              <a:t>Use g++ -fdump-</a:t>
+            </a:r>
+            <a:r>
+              <a:rPr lang="en-GB" dirty="0" err="1" smtClean="0"/>
+              <a:t>ada</a:t>
+            </a:r>
+            <a:r>
+              <a:rPr lang="en-GB" dirty="0" smtClean="0"/>
+              <a:t>-spec</a:t>
+            </a:r>
+            <a:endParaRPr lang="en-GB" dirty="0" smtClean="0"/>
+          </a:p>
+          <a:p>
+            <a:r>
+              <a:rPr lang="en-GB" dirty="0" smtClean="0"/>
+              <a:t>Interfacing at the C++ class level</a:t>
+            </a:r>
+          </a:p>
+          <a:p>
+            <a:r>
+              <a:rPr lang="en-GB" dirty="0" smtClean="0"/>
+              <a:t>Exporting Ada </a:t>
+            </a:r>
+            <a:r>
+              <a:rPr lang="en-GB" dirty="0" smtClean="0"/>
+              <a:t>tagged types as classes</a:t>
+            </a:r>
+          </a:p>
+          <a:p>
+            <a:r>
+              <a:rPr lang="en-GB" dirty="0" smtClean="0"/>
+              <a:t>Ada 2005 pragmas</a:t>
+            </a:r>
+            <a:endParaRPr lang="en-GB" dirty="0" smtClean="0"/>
+          </a:p>
+          <a:p>
+            <a:endParaRPr lang="en-GB" dirty="0"/>
+          </a:p>
+          <a:p>
+            <a:endParaRPr lang="en-GB" dirty="0" smtClean="0"/>
+          </a:p>
+          <a:p>
+            <a:endParaRPr lang="en-GB" dirty="0" smtClean="0"/>
+          </a:p>
+          <a:p>
+            <a:endParaRPr lang="en-GB" dirty="0"/>
           </a:p>
         </p:txBody>
       </p:sp>
@@ -6416,10 +6738,52 @@
           <a:chExt cx="0" cy="0"/>
         </a:xfrm>
       </p:grpSpPr>
+      <p:sp>
+        <p:nvSpPr>
+          <p:cNvPr id="2" name="Title 1"/>
+          <p:cNvSpPr>
+            <a:spLocks noGrp="1"/>
+          </p:cNvSpPr>
+          <p:nvPr>
+            <p:ph type="title"/>
+          </p:nvPr>
+        </p:nvSpPr>
+        <p:spPr/>
+        <p:txBody>
+          <a:bodyPr/>
+          <a:lstStyle/>
+          <a:p>
+            <a:r>
+              <a:rPr lang="en-GB" dirty="0" smtClean="0"/>
+              <a:t>CPP Convention</a:t>
+            </a:r>
+            <a:endParaRPr lang="en-GB" dirty="0"/>
+          </a:p>
+        </p:txBody>
+      </p:sp>
+      <p:sp>
+        <p:nvSpPr>
+          <p:cNvPr id="3" name="Content Placeholder 2"/>
+          <p:cNvSpPr>
+            <a:spLocks noGrp="1"/>
+          </p:cNvSpPr>
+          <p:nvPr>
+            <p:ph sz="half" idx="10"/>
+          </p:nvPr>
+        </p:nvSpPr>
+        <p:spPr/>
+        <p:txBody>
+          <a:bodyPr/>
+          <a:lstStyle/>
+          <a:p>
+            <a:endParaRPr lang="en-GB"/>
+          </a:p>
+        </p:txBody>
+      </p:sp>
     </p:spTree>
     <p:extLst>
       <p:ext uri="{BB962C8B-B14F-4D97-AF65-F5344CB8AC3E}">
-        <p14:creationId xmlns:p14="http://schemas.microsoft.com/office/powerpoint/2010/main" val="396922585"/>
+        <p14:creationId xmlns:p14="http://schemas.microsoft.com/office/powerpoint/2010/main" val="3067570039"/>
       </p:ext>
     </p:extLst>
   </p:cSld>
@@ -6446,10 +6810,420 @@
           <a:chExt cx="0" cy="0"/>
         </a:xfrm>
       </p:grpSpPr>
+      <p:sp>
+        <p:nvSpPr>
+          <p:cNvPr id="2" name="Title 1"/>
+          <p:cNvSpPr>
+            <a:spLocks noGrp="1"/>
+          </p:cNvSpPr>
+          <p:nvPr>
+            <p:ph type="title"/>
+          </p:nvPr>
+        </p:nvSpPr>
+        <p:spPr/>
+        <p:txBody>
+          <a:bodyPr/>
+          <a:lstStyle/>
+          <a:p>
+            <a:r>
+              <a:rPr lang="en-GB" dirty="0" smtClean="0"/>
+              <a:t>C++ Name Mangling</a:t>
+            </a:r>
+            <a:endParaRPr lang="en-GB" dirty="0"/>
+          </a:p>
+        </p:txBody>
+      </p:sp>
+      <p:sp>
+        <p:nvSpPr>
+          <p:cNvPr id="3" name="Content Placeholder 2"/>
+          <p:cNvSpPr>
+            <a:spLocks noGrp="1"/>
+          </p:cNvSpPr>
+          <p:nvPr>
+            <p:ph sz="half" idx="10"/>
+          </p:nvPr>
+        </p:nvSpPr>
+        <p:spPr/>
+        <p:txBody>
+          <a:bodyPr/>
+          <a:lstStyle/>
+          <a:p>
+            <a:endParaRPr lang="en-GB"/>
+          </a:p>
+        </p:txBody>
+      </p:sp>
     </p:spTree>
     <p:extLst>
       <p:ext uri="{BB962C8B-B14F-4D97-AF65-F5344CB8AC3E}">
-        <p14:creationId xmlns:p14="http://schemas.microsoft.com/office/powerpoint/2010/main" val="1688865195"/>
+        <p14:creationId xmlns:p14="http://schemas.microsoft.com/office/powerpoint/2010/main" val="1966431938"/>
+      </p:ext>
+    </p:extLst>
+  </p:cSld>
+  <p:clrMapOvr>
+    <a:masterClrMapping/>
+  </p:clrMapOvr>
+</p:sld>
+</file>
+
+<file path=ppt/slides/slide5.xml><?xml version="1.0" encoding="utf-8"?>
+<p:sld xmlns:a="http://schemas.openxmlformats.org/drawingml/2006/main" xmlns:r="http://schemas.openxmlformats.org/officeDocument/2006/relationships" xmlns:p="http://schemas.openxmlformats.org/presentationml/2006/main">
+  <p:cSld>
+    <p:spTree>
+      <p:nvGrpSpPr>
+        <p:cNvPr id="1" name=""/>
+        <p:cNvGrpSpPr/>
+        <p:nvPr/>
+      </p:nvGrpSpPr>
+      <p:grpSpPr>
+        <a:xfrm>
+          <a:off x="0" y="0"/>
+          <a:ext cx="0" cy="0"/>
+          <a:chOff x="0" y="0"/>
+          <a:chExt cx="0" cy="0"/>
+        </a:xfrm>
+      </p:grpSpPr>
+      <p:sp>
+        <p:nvSpPr>
+          <p:cNvPr id="2" name="Title 1"/>
+          <p:cNvSpPr>
+            <a:spLocks noGrp="1"/>
+          </p:cNvSpPr>
+          <p:nvPr>
+            <p:ph type="title"/>
+          </p:nvPr>
+        </p:nvSpPr>
+        <p:spPr/>
+        <p:txBody>
+          <a:bodyPr/>
+          <a:lstStyle/>
+          <a:p>
+            <a:r>
+              <a:rPr lang="en-GB" dirty="0" smtClean="0"/>
+              <a:t>extern “C”</a:t>
+            </a:r>
+            <a:endParaRPr lang="en-GB" dirty="0"/>
+          </a:p>
+        </p:txBody>
+      </p:sp>
+      <p:sp>
+        <p:nvSpPr>
+          <p:cNvPr id="3" name="Content Placeholder 2"/>
+          <p:cNvSpPr>
+            <a:spLocks noGrp="1"/>
+          </p:cNvSpPr>
+          <p:nvPr>
+            <p:ph sz="half" idx="10"/>
+          </p:nvPr>
+        </p:nvSpPr>
+        <p:spPr/>
+        <p:txBody>
+          <a:bodyPr/>
+          <a:lstStyle/>
+          <a:p>
+            <a:endParaRPr lang="en-GB"/>
+          </a:p>
+        </p:txBody>
+      </p:sp>
+    </p:spTree>
+    <p:extLst>
+      <p:ext uri="{BB962C8B-B14F-4D97-AF65-F5344CB8AC3E}">
+        <p14:creationId xmlns:p14="http://schemas.microsoft.com/office/powerpoint/2010/main" val="2225317977"/>
+      </p:ext>
+    </p:extLst>
+  </p:cSld>
+  <p:clrMapOvr>
+    <a:masterClrMapping/>
+  </p:clrMapOvr>
+</p:sld>
+</file>
+
+<file path=ppt/slides/slide6.xml><?xml version="1.0" encoding="utf-8"?>
+<p:sld xmlns:a="http://schemas.openxmlformats.org/drawingml/2006/main" xmlns:r="http://schemas.openxmlformats.org/officeDocument/2006/relationships" xmlns:p="http://schemas.openxmlformats.org/presentationml/2006/main">
+  <p:cSld>
+    <p:spTree>
+      <p:nvGrpSpPr>
+        <p:cNvPr id="1" name=""/>
+        <p:cNvGrpSpPr/>
+        <p:nvPr/>
+      </p:nvGrpSpPr>
+      <p:grpSpPr>
+        <a:xfrm>
+          <a:off x="0" y="0"/>
+          <a:ext cx="0" cy="0"/>
+          <a:chOff x="0" y="0"/>
+          <a:chExt cx="0" cy="0"/>
+        </a:xfrm>
+      </p:grpSpPr>
+      <p:sp>
+        <p:nvSpPr>
+          <p:cNvPr id="2" name="Title 1"/>
+          <p:cNvSpPr>
+            <a:spLocks noGrp="1"/>
+          </p:cNvSpPr>
+          <p:nvPr>
+            <p:ph type="title"/>
+          </p:nvPr>
+        </p:nvSpPr>
+        <p:spPr/>
+        <p:txBody>
+          <a:bodyPr/>
+          <a:lstStyle/>
+          <a:p>
+            <a:r>
+              <a:rPr lang="en-GB" dirty="0" smtClean="0"/>
+              <a:t>Using Link_Name </a:t>
+            </a:r>
+            <a:endParaRPr lang="en-GB" dirty="0"/>
+          </a:p>
+        </p:txBody>
+      </p:sp>
+      <p:sp>
+        <p:nvSpPr>
+          <p:cNvPr id="3" name="Content Placeholder 2"/>
+          <p:cNvSpPr>
+            <a:spLocks noGrp="1"/>
+          </p:cNvSpPr>
+          <p:nvPr>
+            <p:ph sz="half" idx="10"/>
+          </p:nvPr>
+        </p:nvSpPr>
+        <p:spPr/>
+        <p:txBody>
+          <a:bodyPr/>
+          <a:lstStyle/>
+          <a:p>
+            <a:endParaRPr lang="en-GB"/>
+          </a:p>
+        </p:txBody>
+      </p:sp>
+    </p:spTree>
+    <p:extLst>
+      <p:ext uri="{BB962C8B-B14F-4D97-AF65-F5344CB8AC3E}">
+        <p14:creationId xmlns:p14="http://schemas.microsoft.com/office/powerpoint/2010/main" val="690682650"/>
+      </p:ext>
+    </p:extLst>
+  </p:cSld>
+  <p:clrMapOvr>
+    <a:masterClrMapping/>
+  </p:clrMapOvr>
+</p:sld>
+</file>
+
+<file path=ppt/slides/slide7.xml><?xml version="1.0" encoding="utf-8"?>
+<p:sld xmlns:a="http://schemas.openxmlformats.org/drawingml/2006/main" xmlns:r="http://schemas.openxmlformats.org/officeDocument/2006/relationships" xmlns:p="http://schemas.openxmlformats.org/presentationml/2006/main">
+  <p:cSld>
+    <p:spTree>
+      <p:nvGrpSpPr>
+        <p:cNvPr id="1" name=""/>
+        <p:cNvGrpSpPr/>
+        <p:nvPr/>
+      </p:nvGrpSpPr>
+      <p:grpSpPr>
+        <a:xfrm>
+          <a:off x="0" y="0"/>
+          <a:ext cx="0" cy="0"/>
+          <a:chOff x="0" y="0"/>
+          <a:chExt cx="0" cy="0"/>
+        </a:xfrm>
+      </p:grpSpPr>
+      <p:sp>
+        <p:nvSpPr>
+          <p:cNvPr id="2" name="Title 1"/>
+          <p:cNvSpPr>
+            <a:spLocks noGrp="1"/>
+          </p:cNvSpPr>
+          <p:nvPr>
+            <p:ph type="title"/>
+          </p:nvPr>
+        </p:nvSpPr>
+        <p:spPr/>
+        <p:txBody>
+          <a:bodyPr/>
+          <a:lstStyle/>
+          <a:p>
+            <a:r>
+              <a:rPr lang="en-GB" dirty="0" smtClean="0"/>
+              <a:t>Using –fdump-</a:t>
+            </a:r>
+            <a:r>
+              <a:rPr lang="en-GB" dirty="0" err="1" smtClean="0"/>
+              <a:t>ada</a:t>
+            </a:r>
+            <a:r>
+              <a:rPr lang="en-GB" dirty="0" smtClean="0"/>
+              <a:t>-spec</a:t>
+            </a:r>
+            <a:endParaRPr lang="en-GB" dirty="0"/>
+          </a:p>
+        </p:txBody>
+      </p:sp>
+      <p:sp>
+        <p:nvSpPr>
+          <p:cNvPr id="3" name="Content Placeholder 2"/>
+          <p:cNvSpPr>
+            <a:spLocks noGrp="1"/>
+          </p:cNvSpPr>
+          <p:nvPr>
+            <p:ph sz="half" idx="10"/>
+          </p:nvPr>
+        </p:nvSpPr>
+        <p:spPr/>
+        <p:txBody>
+          <a:bodyPr/>
+          <a:lstStyle/>
+          <a:p>
+            <a:endParaRPr lang="en-GB"/>
+          </a:p>
+        </p:txBody>
+      </p:sp>
+    </p:spTree>
+    <p:extLst>
+      <p:ext uri="{BB962C8B-B14F-4D97-AF65-F5344CB8AC3E}">
+        <p14:creationId xmlns:p14="http://schemas.microsoft.com/office/powerpoint/2010/main" val="3562261737"/>
+      </p:ext>
+    </p:extLst>
+  </p:cSld>
+  <p:clrMapOvr>
+    <a:masterClrMapping/>
+  </p:clrMapOvr>
+</p:sld>
+</file>
+
+<file path=ppt/slides/slide8.xml><?xml version="1.0" encoding="utf-8"?>
+<p:sld xmlns:a="http://schemas.openxmlformats.org/drawingml/2006/main" xmlns:r="http://schemas.openxmlformats.org/officeDocument/2006/relationships" xmlns:p="http://schemas.openxmlformats.org/presentationml/2006/main">
+  <p:cSld>
+    <p:spTree>
+      <p:nvGrpSpPr>
+        <p:cNvPr id="1" name=""/>
+        <p:cNvGrpSpPr/>
+        <p:nvPr/>
+      </p:nvGrpSpPr>
+      <p:grpSpPr>
+        <a:xfrm>
+          <a:off x="0" y="0"/>
+          <a:ext cx="0" cy="0"/>
+          <a:chOff x="0" y="0"/>
+          <a:chExt cx="0" cy="0"/>
+        </a:xfrm>
+      </p:grpSpPr>
+      <p:sp>
+        <p:nvSpPr>
+          <p:cNvPr id="2" name="Title 1"/>
+          <p:cNvSpPr>
+            <a:spLocks noGrp="1"/>
+          </p:cNvSpPr>
+          <p:nvPr>
+            <p:ph type="title"/>
+          </p:nvPr>
+        </p:nvSpPr>
+        <p:spPr/>
+        <p:txBody>
+          <a:bodyPr/>
+          <a:lstStyle/>
+          <a:p>
+            <a:r>
+              <a:rPr lang="en-GB" dirty="0" smtClean="0"/>
+              <a:t>Importing C++ Classes</a:t>
+            </a:r>
+            <a:endParaRPr lang="en-GB" dirty="0"/>
+          </a:p>
+        </p:txBody>
+      </p:sp>
+      <p:sp>
+        <p:nvSpPr>
+          <p:cNvPr id="3" name="Content Placeholder 2"/>
+          <p:cNvSpPr>
+            <a:spLocks noGrp="1"/>
+          </p:cNvSpPr>
+          <p:nvPr>
+            <p:ph sz="half" idx="10"/>
+          </p:nvPr>
+        </p:nvSpPr>
+        <p:spPr/>
+        <p:txBody>
+          <a:bodyPr/>
+          <a:lstStyle/>
+          <a:p>
+            <a:endParaRPr lang="en-GB"/>
+          </a:p>
+        </p:txBody>
+      </p:sp>
+    </p:spTree>
+    <p:extLst>
+      <p:ext uri="{BB962C8B-B14F-4D97-AF65-F5344CB8AC3E}">
+        <p14:creationId xmlns:p14="http://schemas.microsoft.com/office/powerpoint/2010/main" val="3493439689"/>
+      </p:ext>
+    </p:extLst>
+  </p:cSld>
+  <p:clrMapOvr>
+    <a:masterClrMapping/>
+  </p:clrMapOvr>
+</p:sld>
+</file>
+
+<file path=ppt/slides/slide9.xml><?xml version="1.0" encoding="utf-8"?>
+<p:sld xmlns:a="http://schemas.openxmlformats.org/drawingml/2006/main" xmlns:r="http://schemas.openxmlformats.org/officeDocument/2006/relationships" xmlns:p="http://schemas.openxmlformats.org/presentationml/2006/main">
+  <p:cSld>
+    <p:spTree>
+      <p:nvGrpSpPr>
+        <p:cNvPr id="1" name=""/>
+        <p:cNvGrpSpPr/>
+        <p:nvPr/>
+      </p:nvGrpSpPr>
+      <p:grpSpPr>
+        <a:xfrm>
+          <a:off x="0" y="0"/>
+          <a:ext cx="0" cy="0"/>
+          <a:chOff x="0" y="0"/>
+          <a:chExt cx="0" cy="0"/>
+        </a:xfrm>
+      </p:grpSpPr>
+      <p:sp>
+        <p:nvSpPr>
+          <p:cNvPr id="2" name="Title 1"/>
+          <p:cNvSpPr>
+            <a:spLocks noGrp="1"/>
+          </p:cNvSpPr>
+          <p:nvPr>
+            <p:ph type="title"/>
+          </p:nvPr>
+        </p:nvSpPr>
+        <p:spPr/>
+        <p:txBody>
+          <a:bodyPr/>
+          <a:lstStyle/>
+          <a:p>
+            <a:r>
+              <a:rPr lang="en-GB" dirty="0" smtClean="0"/>
+              <a:t>Exporting Ada Tagged Types</a:t>
+            </a:r>
+            <a:endParaRPr lang="en-GB" dirty="0"/>
+          </a:p>
+        </p:txBody>
+      </p:sp>
+      <p:sp>
+        <p:nvSpPr>
+          <p:cNvPr id="3" name="Content Placeholder 2"/>
+          <p:cNvSpPr>
+            <a:spLocks noGrp="1"/>
+          </p:cNvSpPr>
+          <p:nvPr>
+            <p:ph sz="half" idx="10"/>
+          </p:nvPr>
+        </p:nvSpPr>
+        <p:spPr/>
+        <p:txBody>
+          <a:bodyPr/>
+          <a:lstStyle/>
+          <a:p>
+            <a:endParaRPr lang="en-GB"/>
+          </a:p>
+        </p:txBody>
+      </p:sp>
+    </p:spTree>
+    <p:extLst>
+      <p:ext uri="{BB962C8B-B14F-4D97-AF65-F5344CB8AC3E}">
+        <p14:creationId xmlns:p14="http://schemas.microsoft.com/office/powerpoint/2010/main" val="4241842967"/>
       </p:ext>
     </p:extLst>
   </p:cSld>

</xml_diff>

<commit_message>
Added some extra slides to Slides/03_Ada_and_C++.pptx
</commit_message>
<xml_diff>
--- a/lectures/04_Mixed_Language_Programming_In_Ada/03_Ada_and_C++/Slides/03_Ada_and_C++.pptx
+++ b/lectures/04_Mixed_Language_Programming_In_Ada/03_Ada_and_C++/Slides/03_Ada_and_C++.pptx
@@ -5,7 +5,7 @@
     <p:sldMasterId id="2147483649" r:id="rId1"/>
   </p:sldMasterIdLst>
   <p:notesMasterIdLst>
-    <p:notesMasterId r:id="rId13"/>
+    <p:notesMasterId r:id="rId16"/>
   </p:notesMasterIdLst>
   <p:sldIdLst>
     <p:sldId id="256" r:id="rId2"/>
@@ -16,9 +16,12 @@
     <p:sldId id="263" r:id="rId7"/>
     <p:sldId id="265" r:id="rId8"/>
     <p:sldId id="264" r:id="rId9"/>
-    <p:sldId id="266" r:id="rId10"/>
-    <p:sldId id="258" r:id="rId11"/>
-    <p:sldId id="257" r:id="rId12"/>
+    <p:sldId id="267" r:id="rId10"/>
+    <p:sldId id="268" r:id="rId11"/>
+    <p:sldId id="269" r:id="rId12"/>
+    <p:sldId id="266" r:id="rId13"/>
+    <p:sldId id="258" r:id="rId14"/>
+    <p:sldId id="257" r:id="rId15"/>
   </p:sldIdLst>
   <p:sldSz cx="9144000" cy="6858000" type="screen4x3"/>
   <p:notesSz cx="6858000" cy="9144000"/>
@@ -674,8 +677,13 @@
           <a:p>
             <a:r>
               <a:rPr lang="en-GB" baseline="0" dirty="0" smtClean="0"/>
-              <a:t>And while it’s possible to interface to both subprogram and memory objects in C++ the real power comes from being able to do class wide interfacing.</a:t>
-            </a:r>
+              <a:t>And while it’s possible to interface to both subprogram and memory objects in C++ the real power comes from being able </a:t>
+            </a:r>
+            <a:r>
+              <a:rPr lang="en-GB" baseline="0" dirty="0" smtClean="0"/>
+              <a:t>to support interfacing to classes.</a:t>
+            </a:r>
+            <a:endParaRPr lang="en-GB" baseline="0" dirty="0" smtClean="0"/>
           </a:p>
           <a:p>
             <a:endParaRPr lang="en-GB" baseline="0" dirty="0" smtClean="0"/>
@@ -684,6 +692,15 @@
             <a:r>
               <a:rPr lang="en-GB" baseline="0" dirty="0" smtClean="0"/>
               <a:t>This will involve importing C++ classes into Ada main programs and vice versa using support for objects in Ada implemented using tagged types.</a:t>
+            </a:r>
+          </a:p>
+          <a:p>
+            <a:endParaRPr lang="en-GB" baseline="0" dirty="0" smtClean="0"/>
+          </a:p>
+          <a:p>
+            <a:r>
+              <a:rPr lang="en-GB" baseline="0" dirty="0" smtClean="0"/>
+              <a:t>The lecture will also cover how to make use of C++ class constructors and using Ada 2005 interfaces when dealing with multiple inheritance of abstract classes.</a:t>
             </a:r>
           </a:p>
           <a:p>
@@ -811,50 +828,19 @@
           <a:lstStyle/>
           <a:p>
             <a:r>
-              <a:rPr lang="en-GB" altLang="en-US" dirty="0" smtClean="0">
-                <a:ea typeface="ＭＳ Ｐゴシック" panose="020B0600070205080204" pitchFamily="34" charset="-128"/>
-              </a:rPr>
-              <a:t>We’ve now reached the end of the slide section of this lecture.  </a:t>
-            </a:r>
-          </a:p>
-          <a:p>
-            <a:endParaRPr lang="en-GB" altLang="en-US" dirty="0" smtClean="0">
-              <a:ea typeface="ＭＳ Ｐゴシック" panose="020B0600070205080204" pitchFamily="34" charset="-128"/>
-            </a:endParaRPr>
-          </a:p>
-          <a:p>
-            <a:r>
-              <a:rPr lang="en-GB" altLang="en-US" dirty="0" smtClean="0">
-                <a:ea typeface="ＭＳ Ｐゴシック" panose="020B0600070205080204" pitchFamily="34" charset="-128"/>
-              </a:rPr>
-              <a:t>You should now have enough knowledge of this subject to complete a small quiz with questions designed to test your understanding.</a:t>
-            </a:r>
-          </a:p>
-          <a:p>
-            <a:endParaRPr lang="en-GB" altLang="en-US" dirty="0" smtClean="0">
-              <a:ea typeface="ＭＳ Ｐゴシック" panose="020B0600070205080204" pitchFamily="34" charset="-128"/>
-            </a:endParaRPr>
-          </a:p>
-          <a:p>
-            <a:r>
-              <a:rPr lang="en-GB" altLang="en-US" dirty="0" smtClean="0">
-                <a:ea typeface="ＭＳ Ｐゴシック" panose="020B0600070205080204" pitchFamily="34" charset="-128"/>
-              </a:rPr>
-              <a:t>Each question is marked and you will have a chance to review your score at the end of the lecture.</a:t>
-            </a:r>
-          </a:p>
-          <a:p>
-            <a:endParaRPr lang="en-GB" altLang="en-US" dirty="0" smtClean="0">
-              <a:ea typeface="ＭＳ Ｐゴシック" panose="020B0600070205080204" pitchFamily="34" charset="-128"/>
-            </a:endParaRPr>
-          </a:p>
-          <a:p>
-            <a:r>
-              <a:rPr lang="en-GB" altLang="en-US" dirty="0" smtClean="0">
-                <a:ea typeface="ＭＳ Ｐゴシック" panose="020B0600070205080204" pitchFamily="34" charset="-128"/>
-              </a:rPr>
-              <a:t>Good luck !</a:t>
-            </a:r>
+              <a:rPr lang="en-GB" dirty="0" smtClean="0"/>
+              <a:t>This</a:t>
+            </a:r>
+            <a:r>
+              <a:rPr lang="en-GB" baseline="0" dirty="0" smtClean="0"/>
+              <a:t> is the preferred method for generating Ada bindings for C++ entities and will be used for the remainder of this lecture to generate Ada 2005 compliant code.</a:t>
+            </a:r>
+          </a:p>
+          <a:p>
+            <a:endParaRPr lang="en-GB" baseline="0" dirty="0" smtClean="0"/>
+          </a:p>
+          <a:p>
+            <a:endParaRPr lang="en-GB" dirty="0"/>
           </a:p>
         </p:txBody>
       </p:sp>
@@ -875,7 +861,7 @@
           <a:p>
             <a:fld id="{CA0C9329-88FA-4F10-ACFF-58B750973BE9}" type="slidenum">
               <a:rPr lang="en-GB" smtClean="0"/>
-              <a:t>10</a:t>
+              <a:t>7</a:t>
             </a:fld>
             <a:endParaRPr lang="en-GB"/>
           </a:p>
@@ -884,7 +870,7 @@
     </p:spTree>
     <p:extLst>
       <p:ext uri="{BB962C8B-B14F-4D97-AF65-F5344CB8AC3E}">
-        <p14:creationId xmlns:p14="http://schemas.microsoft.com/office/powerpoint/2010/main" val="1859432055"/>
+        <p14:creationId xmlns:p14="http://schemas.microsoft.com/office/powerpoint/2010/main" val="3558419705"/>
       </p:ext>
     </p:extLst>
   </p:cSld>
@@ -938,52 +924,6 @@
           <a:bodyPr/>
           <a:lstStyle/>
           <a:p>
-            <a:r>
-              <a:rPr lang="en-GB" altLang="en-US" dirty="0" smtClean="0">
-                <a:ea typeface="ＭＳ Ｐゴシック" panose="020B0600070205080204" pitchFamily="34" charset="-128"/>
-              </a:rPr>
-              <a:t>Thank you for attending this lecture</a:t>
-            </a:r>
-            <a:r>
-              <a:rPr lang="en-GB" altLang="en-US" baseline="0" dirty="0" smtClean="0">
-                <a:ea typeface="ＭＳ Ｐゴシック" panose="020B0600070205080204" pitchFamily="34" charset="-128"/>
-              </a:rPr>
-              <a:t> from the AdaCore University</a:t>
-            </a:r>
-            <a:r>
-              <a:rPr lang="en-GB" altLang="en-US" dirty="0" smtClean="0">
-                <a:ea typeface="ＭＳ Ｐゴシック" panose="020B0600070205080204" pitchFamily="34" charset="-128"/>
-              </a:rPr>
-              <a:t>.</a:t>
-            </a:r>
-          </a:p>
-          <a:p>
-            <a:endParaRPr lang="en-GB" altLang="en-US" dirty="0" smtClean="0">
-              <a:ea typeface="ＭＳ Ｐゴシック" panose="020B0600070205080204" pitchFamily="34" charset="-128"/>
-            </a:endParaRPr>
-          </a:p>
-          <a:p>
-            <a:r>
-              <a:rPr lang="en-GB" altLang="en-US" dirty="0" smtClean="0">
-                <a:ea typeface="ＭＳ Ｐゴシック" panose="020B0600070205080204" pitchFamily="34" charset="-128"/>
-              </a:rPr>
-              <a:t>I hope you have found it a valuable step in learning the Ada Programming Language and that you continue onto the other lectures in the course from the Ada University.</a:t>
-            </a:r>
-          </a:p>
-          <a:p>
-            <a:endParaRPr lang="en-GB" altLang="en-US" dirty="0" smtClean="0">
-              <a:ea typeface="ＭＳ Ｐゴシック" panose="020B0600070205080204" pitchFamily="34" charset="-128"/>
-            </a:endParaRPr>
-          </a:p>
-          <a:p>
-            <a:r>
-              <a:rPr lang="en-GB" altLang="en-US" dirty="0" smtClean="0">
-                <a:ea typeface="ＭＳ Ｐゴシック" panose="020B0600070205080204" pitchFamily="34" charset="-128"/>
-              </a:rPr>
-              <a:t>Thank you.</a:t>
-            </a:r>
-          </a:p>
-          <a:p>
             <a:endParaRPr lang="en-GB" dirty="0"/>
           </a:p>
         </p:txBody>
@@ -1005,7 +945,265 @@
           <a:p>
             <a:fld id="{CA0C9329-88FA-4F10-ACFF-58B750973BE9}" type="slidenum">
               <a:rPr lang="en-GB" smtClean="0"/>
-              <a:t>11</a:t>
+              <a:t>8</a:t>
+            </a:fld>
+            <a:endParaRPr lang="en-GB"/>
+          </a:p>
+        </p:txBody>
+      </p:sp>
+    </p:spTree>
+    <p:extLst>
+      <p:ext uri="{BB962C8B-B14F-4D97-AF65-F5344CB8AC3E}">
+        <p14:creationId xmlns:p14="http://schemas.microsoft.com/office/powerpoint/2010/main" val="1945626985"/>
+      </p:ext>
+    </p:extLst>
+  </p:cSld>
+  <p:clrMapOvr>
+    <a:masterClrMapping/>
+  </p:clrMapOvr>
+</p:notes>
+</file>
+
+<file path=ppt/notesSlides/notesSlide5.xml><?xml version="1.0" encoding="utf-8"?>
+<p:notes xmlns:a="http://schemas.openxmlformats.org/drawingml/2006/main" xmlns:r="http://schemas.openxmlformats.org/officeDocument/2006/relationships" xmlns:p="http://schemas.openxmlformats.org/presentationml/2006/main">
+  <p:cSld>
+    <p:spTree>
+      <p:nvGrpSpPr>
+        <p:cNvPr id="1" name=""/>
+        <p:cNvGrpSpPr/>
+        <p:nvPr/>
+      </p:nvGrpSpPr>
+      <p:grpSpPr>
+        <a:xfrm>
+          <a:off x="0" y="0"/>
+          <a:ext cx="0" cy="0"/>
+          <a:chOff x="0" y="0"/>
+          <a:chExt cx="0" cy="0"/>
+        </a:xfrm>
+      </p:grpSpPr>
+      <p:sp>
+        <p:nvSpPr>
+          <p:cNvPr id="2" name="Slide Image Placeholder 1"/>
+          <p:cNvSpPr>
+            <a:spLocks noGrp="1" noRot="1" noChangeAspect="1"/>
+          </p:cNvSpPr>
+          <p:nvPr>
+            <p:ph type="sldImg"/>
+          </p:nvPr>
+        </p:nvSpPr>
+        <p:spPr/>
+      </p:sp>
+      <p:sp>
+        <p:nvSpPr>
+          <p:cNvPr id="3" name="Notes Placeholder 2"/>
+          <p:cNvSpPr>
+            <a:spLocks noGrp="1"/>
+          </p:cNvSpPr>
+          <p:nvPr>
+            <p:ph type="body" idx="1"/>
+          </p:nvPr>
+        </p:nvSpPr>
+        <p:spPr/>
+        <p:txBody>
+          <a:bodyPr/>
+          <a:lstStyle/>
+          <a:p>
+            <a:r>
+              <a:rPr lang="en-GB" altLang="en-US" dirty="0" smtClean="0">
+                <a:ea typeface="ＭＳ Ｐゴシック" panose="020B0600070205080204" pitchFamily="34" charset="-128"/>
+              </a:rPr>
+              <a:t>We’ve now reached the end of the slide section of this lecture.  </a:t>
+            </a:r>
+          </a:p>
+          <a:p>
+            <a:endParaRPr lang="en-GB" altLang="en-US" dirty="0" smtClean="0">
+              <a:ea typeface="ＭＳ Ｐゴシック" panose="020B0600070205080204" pitchFamily="34" charset="-128"/>
+            </a:endParaRPr>
+          </a:p>
+          <a:p>
+            <a:r>
+              <a:rPr lang="en-GB" altLang="en-US" dirty="0" smtClean="0">
+                <a:ea typeface="ＭＳ Ｐゴシック" panose="020B0600070205080204" pitchFamily="34" charset="-128"/>
+              </a:rPr>
+              <a:t>You should now have enough knowledge of this subject to complete a small quiz with questions designed to test your understanding.</a:t>
+            </a:r>
+          </a:p>
+          <a:p>
+            <a:endParaRPr lang="en-GB" altLang="en-US" dirty="0" smtClean="0">
+              <a:ea typeface="ＭＳ Ｐゴシック" panose="020B0600070205080204" pitchFamily="34" charset="-128"/>
+            </a:endParaRPr>
+          </a:p>
+          <a:p>
+            <a:r>
+              <a:rPr lang="en-GB" altLang="en-US" dirty="0" smtClean="0">
+                <a:ea typeface="ＭＳ Ｐゴシック" panose="020B0600070205080204" pitchFamily="34" charset="-128"/>
+              </a:rPr>
+              <a:t>Each question is marked and you will have a chance to review your score at the end of the lecture.</a:t>
+            </a:r>
+          </a:p>
+          <a:p>
+            <a:endParaRPr lang="en-GB" altLang="en-US" dirty="0" smtClean="0">
+              <a:ea typeface="ＭＳ Ｐゴシック" panose="020B0600070205080204" pitchFamily="34" charset="-128"/>
+            </a:endParaRPr>
+          </a:p>
+          <a:p>
+            <a:r>
+              <a:rPr lang="en-GB" altLang="en-US" dirty="0" smtClean="0">
+                <a:ea typeface="ＭＳ Ｐゴシック" panose="020B0600070205080204" pitchFamily="34" charset="-128"/>
+              </a:rPr>
+              <a:t>Good luck !</a:t>
+            </a:r>
+          </a:p>
+        </p:txBody>
+      </p:sp>
+      <p:sp>
+        <p:nvSpPr>
+          <p:cNvPr id="4" name="Slide Number Placeholder 3"/>
+          <p:cNvSpPr>
+            <a:spLocks noGrp="1"/>
+          </p:cNvSpPr>
+          <p:nvPr>
+            <p:ph type="sldNum" sz="quarter" idx="10"/>
+          </p:nvPr>
+        </p:nvSpPr>
+        <p:spPr/>
+        <p:txBody>
+          <a:bodyPr/>
+          <a:lstStyle/>
+          <a:p>
+            <a:fld id="{CA0C9329-88FA-4F10-ACFF-58B750973BE9}" type="slidenum">
+              <a:rPr lang="en-GB" smtClean="0"/>
+              <a:t>13</a:t>
+            </a:fld>
+            <a:endParaRPr lang="en-GB"/>
+          </a:p>
+        </p:txBody>
+      </p:sp>
+    </p:spTree>
+    <p:extLst>
+      <p:ext uri="{BB962C8B-B14F-4D97-AF65-F5344CB8AC3E}">
+        <p14:creationId xmlns:p14="http://schemas.microsoft.com/office/powerpoint/2010/main" val="1859432055"/>
+      </p:ext>
+    </p:extLst>
+  </p:cSld>
+  <p:clrMapOvr>
+    <a:masterClrMapping/>
+  </p:clrMapOvr>
+</p:notes>
+</file>
+
+<file path=ppt/notesSlides/notesSlide6.xml><?xml version="1.0" encoding="utf-8"?>
+<p:notes xmlns:a="http://schemas.openxmlformats.org/drawingml/2006/main" xmlns:r="http://schemas.openxmlformats.org/officeDocument/2006/relationships" xmlns:p="http://schemas.openxmlformats.org/presentationml/2006/main">
+  <p:cSld>
+    <p:spTree>
+      <p:nvGrpSpPr>
+        <p:cNvPr id="1" name=""/>
+        <p:cNvGrpSpPr/>
+        <p:nvPr/>
+      </p:nvGrpSpPr>
+      <p:grpSpPr>
+        <a:xfrm>
+          <a:off x="0" y="0"/>
+          <a:ext cx="0" cy="0"/>
+          <a:chOff x="0" y="0"/>
+          <a:chExt cx="0" cy="0"/>
+        </a:xfrm>
+      </p:grpSpPr>
+      <p:sp>
+        <p:nvSpPr>
+          <p:cNvPr id="2" name="Slide Image Placeholder 1"/>
+          <p:cNvSpPr>
+            <a:spLocks noGrp="1" noRot="1" noChangeAspect="1"/>
+          </p:cNvSpPr>
+          <p:nvPr>
+            <p:ph type="sldImg"/>
+          </p:nvPr>
+        </p:nvSpPr>
+        <p:spPr/>
+      </p:sp>
+      <p:sp>
+        <p:nvSpPr>
+          <p:cNvPr id="3" name="Notes Placeholder 2"/>
+          <p:cNvSpPr>
+            <a:spLocks noGrp="1"/>
+          </p:cNvSpPr>
+          <p:nvPr>
+            <p:ph type="body" idx="1"/>
+          </p:nvPr>
+        </p:nvSpPr>
+        <p:spPr/>
+        <p:txBody>
+          <a:bodyPr/>
+          <a:lstStyle/>
+          <a:p>
+            <a:r>
+              <a:rPr lang="en-GB" altLang="en-US" dirty="0" smtClean="0">
+                <a:ea typeface="ＭＳ Ｐゴシック" panose="020B0600070205080204" pitchFamily="34" charset="-128"/>
+              </a:rPr>
+              <a:t>Thank you for attending this lecture</a:t>
+            </a:r>
+            <a:r>
+              <a:rPr lang="en-GB" altLang="en-US" baseline="0" dirty="0" smtClean="0">
+                <a:ea typeface="ＭＳ Ｐゴシック" panose="020B0600070205080204" pitchFamily="34" charset="-128"/>
+              </a:rPr>
+              <a:t> from the AdaCore University</a:t>
+            </a:r>
+            <a:r>
+              <a:rPr lang="en-GB" altLang="en-US" dirty="0" smtClean="0">
+                <a:ea typeface="ＭＳ Ｐゴシック" panose="020B0600070205080204" pitchFamily="34" charset="-128"/>
+              </a:rPr>
+              <a:t>.</a:t>
+            </a:r>
+          </a:p>
+          <a:p>
+            <a:endParaRPr lang="en-GB" altLang="en-US" dirty="0" smtClean="0">
+              <a:ea typeface="ＭＳ Ｐゴシック" panose="020B0600070205080204" pitchFamily="34" charset="-128"/>
+            </a:endParaRPr>
+          </a:p>
+          <a:p>
+            <a:r>
+              <a:rPr lang="en-GB" altLang="en-US" dirty="0" smtClean="0">
+                <a:ea typeface="ＭＳ Ｐゴシック" panose="020B0600070205080204" pitchFamily="34" charset="-128"/>
+              </a:rPr>
+              <a:t>I hope you have found it a valuable step in learning the Ada Programming Language and that you continue onto the other lectures in the course from the Ada University.</a:t>
+            </a:r>
+          </a:p>
+          <a:p>
+            <a:endParaRPr lang="en-GB" altLang="en-US" dirty="0" smtClean="0">
+              <a:ea typeface="ＭＳ Ｐゴシック" panose="020B0600070205080204" pitchFamily="34" charset="-128"/>
+            </a:endParaRPr>
+          </a:p>
+          <a:p>
+            <a:r>
+              <a:rPr lang="en-GB" altLang="en-US" dirty="0" smtClean="0">
+                <a:ea typeface="ＭＳ Ｐゴシック" panose="020B0600070205080204" pitchFamily="34" charset="-128"/>
+              </a:rPr>
+              <a:t>Thank you.</a:t>
+            </a:r>
+          </a:p>
+          <a:p>
+            <a:endParaRPr lang="en-GB" dirty="0"/>
+          </a:p>
+        </p:txBody>
+      </p:sp>
+      <p:sp>
+        <p:nvSpPr>
+          <p:cNvPr id="4" name="Slide Number Placeholder 3"/>
+          <p:cNvSpPr>
+            <a:spLocks noGrp="1"/>
+          </p:cNvSpPr>
+          <p:nvPr>
+            <p:ph type="sldNum" sz="quarter" idx="10"/>
+          </p:nvPr>
+        </p:nvSpPr>
+        <p:spPr/>
+        <p:txBody>
+          <a:bodyPr/>
+          <a:lstStyle/>
+          <a:p>
+            <a:fld id="{CA0C9329-88FA-4F10-ACFF-58B750973BE9}" type="slidenum">
+              <a:rPr lang="en-GB" smtClean="0"/>
+              <a:t>14</a:t>
             </a:fld>
             <a:endParaRPr lang="en-GB"/>
           </a:p>
@@ -6504,6 +6702,222 @@
           <a:chExt cx="0" cy="0"/>
         </a:xfrm>
       </p:grpSpPr>
+      <p:sp>
+        <p:nvSpPr>
+          <p:cNvPr id="2" name="Title 1"/>
+          <p:cNvSpPr>
+            <a:spLocks noGrp="1"/>
+          </p:cNvSpPr>
+          <p:nvPr>
+            <p:ph type="title"/>
+          </p:nvPr>
+        </p:nvSpPr>
+        <p:spPr/>
+        <p:txBody>
+          <a:bodyPr/>
+          <a:lstStyle/>
+          <a:p>
+            <a:r>
+              <a:rPr lang="en-GB" dirty="0" smtClean="0"/>
+              <a:t>C++ Constructors</a:t>
+            </a:r>
+            <a:endParaRPr lang="en-GB" dirty="0"/>
+          </a:p>
+        </p:txBody>
+      </p:sp>
+      <p:sp>
+        <p:nvSpPr>
+          <p:cNvPr id="3" name="Content Placeholder 2"/>
+          <p:cNvSpPr>
+            <a:spLocks noGrp="1"/>
+          </p:cNvSpPr>
+          <p:nvPr>
+            <p:ph sz="half" idx="10"/>
+          </p:nvPr>
+        </p:nvSpPr>
+        <p:spPr/>
+        <p:txBody>
+          <a:bodyPr/>
+          <a:lstStyle/>
+          <a:p>
+            <a:endParaRPr lang="en-GB"/>
+          </a:p>
+        </p:txBody>
+      </p:sp>
+    </p:spTree>
+    <p:extLst>
+      <p:ext uri="{BB962C8B-B14F-4D97-AF65-F5344CB8AC3E}">
+        <p14:creationId xmlns:p14="http://schemas.microsoft.com/office/powerpoint/2010/main" val="176516661"/>
+      </p:ext>
+    </p:extLst>
+  </p:cSld>
+  <p:clrMapOvr>
+    <a:masterClrMapping/>
+  </p:clrMapOvr>
+</p:sld>
+</file>
+
+<file path=ppt/slides/slide11.xml><?xml version="1.0" encoding="utf-8"?>
+<p:sld xmlns:a="http://schemas.openxmlformats.org/drawingml/2006/main" xmlns:r="http://schemas.openxmlformats.org/officeDocument/2006/relationships" xmlns:p="http://schemas.openxmlformats.org/presentationml/2006/main">
+  <p:cSld>
+    <p:spTree>
+      <p:nvGrpSpPr>
+        <p:cNvPr id="1" name=""/>
+        <p:cNvGrpSpPr/>
+        <p:nvPr/>
+      </p:nvGrpSpPr>
+      <p:grpSpPr>
+        <a:xfrm>
+          <a:off x="0" y="0"/>
+          <a:ext cx="0" cy="0"/>
+          <a:chOff x="0" y="0"/>
+          <a:chExt cx="0" cy="0"/>
+        </a:xfrm>
+      </p:grpSpPr>
+      <p:sp>
+        <p:nvSpPr>
+          <p:cNvPr id="2" name="Title 1"/>
+          <p:cNvSpPr>
+            <a:spLocks noGrp="1"/>
+          </p:cNvSpPr>
+          <p:nvPr>
+            <p:ph type="title"/>
+          </p:nvPr>
+        </p:nvSpPr>
+        <p:spPr/>
+        <p:txBody>
+          <a:bodyPr/>
+          <a:lstStyle/>
+          <a:p>
+            <a:r>
+              <a:rPr lang="en-GB" dirty="0" smtClean="0"/>
+              <a:t>C++ Exceptions</a:t>
+            </a:r>
+            <a:endParaRPr lang="en-GB" dirty="0"/>
+          </a:p>
+        </p:txBody>
+      </p:sp>
+      <p:sp>
+        <p:nvSpPr>
+          <p:cNvPr id="3" name="Content Placeholder 2"/>
+          <p:cNvSpPr>
+            <a:spLocks noGrp="1"/>
+          </p:cNvSpPr>
+          <p:nvPr>
+            <p:ph sz="half" idx="10"/>
+          </p:nvPr>
+        </p:nvSpPr>
+        <p:spPr/>
+        <p:txBody>
+          <a:bodyPr/>
+          <a:lstStyle/>
+          <a:p>
+            <a:endParaRPr lang="en-GB"/>
+          </a:p>
+        </p:txBody>
+      </p:sp>
+    </p:spTree>
+    <p:extLst>
+      <p:ext uri="{BB962C8B-B14F-4D97-AF65-F5344CB8AC3E}">
+        <p14:creationId xmlns:p14="http://schemas.microsoft.com/office/powerpoint/2010/main" val="3148377477"/>
+      </p:ext>
+    </p:extLst>
+  </p:cSld>
+  <p:clrMapOvr>
+    <a:masterClrMapping/>
+  </p:clrMapOvr>
+</p:sld>
+</file>
+
+<file path=ppt/slides/slide12.xml><?xml version="1.0" encoding="utf-8"?>
+<p:sld xmlns:a="http://schemas.openxmlformats.org/drawingml/2006/main" xmlns:r="http://schemas.openxmlformats.org/officeDocument/2006/relationships" xmlns:p="http://schemas.openxmlformats.org/presentationml/2006/main">
+  <p:cSld>
+    <p:spTree>
+      <p:nvGrpSpPr>
+        <p:cNvPr id="1" name=""/>
+        <p:cNvGrpSpPr/>
+        <p:nvPr/>
+      </p:nvGrpSpPr>
+      <p:grpSpPr>
+        <a:xfrm>
+          <a:off x="0" y="0"/>
+          <a:ext cx="0" cy="0"/>
+          <a:chOff x="0" y="0"/>
+          <a:chExt cx="0" cy="0"/>
+        </a:xfrm>
+      </p:grpSpPr>
+      <p:sp>
+        <p:nvSpPr>
+          <p:cNvPr id="2" name="Title 1"/>
+          <p:cNvSpPr>
+            <a:spLocks noGrp="1"/>
+          </p:cNvSpPr>
+          <p:nvPr>
+            <p:ph type="title"/>
+          </p:nvPr>
+        </p:nvSpPr>
+        <p:spPr/>
+        <p:txBody>
+          <a:bodyPr/>
+          <a:lstStyle/>
+          <a:p>
+            <a:r>
+              <a:rPr lang="en-GB" dirty="0" smtClean="0"/>
+              <a:t>Exporting Ada Tagged Types</a:t>
+            </a:r>
+            <a:endParaRPr lang="en-GB" dirty="0"/>
+          </a:p>
+        </p:txBody>
+      </p:sp>
+      <p:sp>
+        <p:nvSpPr>
+          <p:cNvPr id="3" name="Content Placeholder 2"/>
+          <p:cNvSpPr>
+            <a:spLocks noGrp="1"/>
+          </p:cNvSpPr>
+          <p:nvPr>
+            <p:ph sz="half" idx="10"/>
+          </p:nvPr>
+        </p:nvSpPr>
+        <p:spPr/>
+        <p:txBody>
+          <a:bodyPr/>
+          <a:lstStyle/>
+          <a:p>
+            <a:endParaRPr lang="en-GB"/>
+          </a:p>
+        </p:txBody>
+      </p:sp>
+    </p:spTree>
+    <p:extLst>
+      <p:ext uri="{BB962C8B-B14F-4D97-AF65-F5344CB8AC3E}">
+        <p14:creationId xmlns:p14="http://schemas.microsoft.com/office/powerpoint/2010/main" val="4241842967"/>
+      </p:ext>
+    </p:extLst>
+  </p:cSld>
+  <p:clrMapOvr>
+    <a:masterClrMapping/>
+  </p:clrMapOvr>
+</p:sld>
+</file>
+
+<file path=ppt/slides/slide13.xml><?xml version="1.0" encoding="utf-8"?>
+<p:sld xmlns:a="http://schemas.openxmlformats.org/drawingml/2006/main" xmlns:r="http://schemas.openxmlformats.org/officeDocument/2006/relationships" xmlns:p="http://schemas.openxmlformats.org/presentationml/2006/main">
+  <p:cSld>
+    <p:spTree>
+      <p:nvGrpSpPr>
+        <p:cNvPr id="1" name=""/>
+        <p:cNvGrpSpPr/>
+        <p:nvPr/>
+      </p:nvGrpSpPr>
+      <p:grpSpPr>
+        <a:xfrm>
+          <a:off x="0" y="0"/>
+          <a:ext cx="0" cy="0"/>
+          <a:chOff x="0" y="0"/>
+          <a:chExt cx="0" cy="0"/>
+        </a:xfrm>
+      </p:grpSpPr>
     </p:spTree>
     <p:extLst>
       <p:ext uri="{BB962C8B-B14F-4D97-AF65-F5344CB8AC3E}">
@@ -6517,7 +6931,7 @@
 </p:sld>
 </file>
 
-<file path=ppt/slides/slide11.xml><?xml version="1.0" encoding="utf-8"?>
+<file path=ppt/slides/slide14.xml><?xml version="1.0" encoding="utf-8"?>
 <p:sld xmlns:a="http://schemas.openxmlformats.org/drawingml/2006/main" xmlns:r="http://schemas.openxmlformats.org/officeDocument/2006/relationships" xmlns:p="http://schemas.openxmlformats.org/presentationml/2006/main">
   <p:cSld>
     <p:spTree>
@@ -6617,7 +7031,6 @@
               <a:rPr lang="en-GB" dirty="0" smtClean="0"/>
               <a:t>C++ Name Mangling</a:t>
             </a:r>
-            <a:endParaRPr lang="en-GB" dirty="0" smtClean="0"/>
           </a:p>
           <a:p>
             <a:r>
@@ -6669,30 +7082,59 @@
               <a:rPr lang="en-GB" dirty="0" smtClean="0"/>
               <a:t>-spec</a:t>
             </a:r>
+          </a:p>
+          <a:p>
+            <a:r>
+              <a:rPr lang="en-GB" dirty="0" smtClean="0"/>
+              <a:t>Interfacing at the C++ class </a:t>
+            </a:r>
+            <a:r>
+              <a:rPr lang="en-GB" dirty="0" smtClean="0"/>
+              <a:t>level</a:t>
+            </a:r>
+          </a:p>
+          <a:p>
+            <a:pPr lvl="1"/>
+            <a:r>
+              <a:rPr lang="en-GB" dirty="0" smtClean="0"/>
+              <a:t>Constructors and Multiple Inheritance of Abstract Classes</a:t>
+            </a:r>
             <a:endParaRPr lang="en-GB" dirty="0" smtClean="0"/>
           </a:p>
           <a:p>
             <a:r>
               <a:rPr lang="en-GB" dirty="0" smtClean="0"/>
-              <a:t>Interfacing at the C++ class level</a:t>
-            </a:r>
-          </a:p>
-          <a:p>
+              <a:t>Exporting </a:t>
+            </a:r>
             <a:r>
               <a:rPr lang="en-GB" dirty="0" smtClean="0"/>
-              <a:t>Exporting Ada </a:t>
+              <a:t>Ada tagged types as </a:t>
             </a:r>
             <a:r>
               <a:rPr lang="en-GB" dirty="0" smtClean="0"/>
-              <a:t>tagged types as classes</a:t>
-            </a:r>
+              <a:t>classes</a:t>
+            </a:r>
+          </a:p>
+          <a:p>
+            <a:r>
+              <a:rPr lang="en-GB" dirty="0" smtClean="0"/>
+              <a:t>Mapping C</a:t>
+            </a:r>
+            <a:r>
+              <a:rPr lang="en-GB" dirty="0"/>
+              <a:t>++ </a:t>
+            </a:r>
+            <a:r>
+              <a:rPr lang="en-GB" dirty="0" smtClean="0"/>
+              <a:t>Exceptions</a:t>
+            </a:r>
+            <a:endParaRPr lang="en-GB" dirty="0" smtClean="0"/>
           </a:p>
           <a:p>
             <a:r>
               <a:rPr lang="en-GB" dirty="0" smtClean="0"/>
               <a:t>Ada 2005 pragmas</a:t>
             </a:r>
-            <a:endParaRPr lang="en-GB" dirty="0" smtClean="0"/>
           </a:p>
           <a:p>
             <a:endParaRPr lang="en-GB" dirty="0"/>
@@ -7123,7 +7565,11 @@
           <a:p>
             <a:r>
               <a:rPr lang="en-GB" dirty="0" smtClean="0"/>
-              <a:t>Importing C++ Classes</a:t>
+              <a:t>C</a:t>
+            </a:r>
+            <a:r>
+              <a:rPr lang="en-GB" dirty="0" smtClean="0"/>
+              <a:t>++ Classes</a:t>
             </a:r>
             <a:endParaRPr lang="en-GB" dirty="0"/>
           </a:p>
@@ -7144,7 +7590,7 @@
           <a:bodyPr/>
           <a:lstStyle/>
           <a:p>
-            <a:endParaRPr lang="en-GB"/>
+            <a:endParaRPr lang="en-GB" dirty="0"/>
           </a:p>
         </p:txBody>
       </p:sp>
@@ -7195,7 +7641,7 @@
           <a:p>
             <a:r>
               <a:rPr lang="en-GB" dirty="0" smtClean="0"/>
-              <a:t>Exporting Ada Tagged Types</a:t>
+              <a:t>C++ Abstract Classes</a:t>
             </a:r>
             <a:endParaRPr lang="en-GB" dirty="0"/>
           </a:p>
@@ -7223,7 +7669,7 @@
     </p:spTree>
     <p:extLst>
       <p:ext uri="{BB962C8B-B14F-4D97-AF65-F5344CB8AC3E}">
-        <p14:creationId xmlns:p14="http://schemas.microsoft.com/office/powerpoint/2010/main" val="4241842967"/>
+        <p14:creationId xmlns:p14="http://schemas.microsoft.com/office/powerpoint/2010/main" val="1565503488"/>
       </p:ext>
     </p:extLst>
   </p:cSld>

</xml_diff>

<commit_message>
Simplified the slide "C++ Exceptions"
</commit_message>
<xml_diff>
--- a/lectures/04_Mixed_Language_Programming_In_Ada/03_Ada_and_C++/Slides/03_Ada_and_C++.pptx
+++ b/lectures/04_Mixed_Language_Programming_In_Ada/03_Ada_and_C++/Slides/03_Ada_and_C++.pptx
@@ -233,7 +233,7 @@
           <a:p>
             <a:fld id="{6AEF8CB0-33D2-4F49-9A97-DB788DFC7082}" type="datetimeFigureOut">
               <a:rPr lang="en-GB" smtClean="0"/>
-              <a:t>17/08/2014</a:t>
+              <a:t>18/08/2014</a:t>
             </a:fld>
             <a:endParaRPr lang="en-GB"/>
           </a:p>
@@ -1526,11 +1526,7 @@
           <a:p>
             <a:r>
               <a:rPr lang="en-GB" baseline="0" dirty="0" smtClean="0"/>
-              <a:t>The output from this program will be the value 20</a:t>
-            </a:r>
-            <a:r>
-              <a:rPr lang="en-GB" baseline="0" dirty="0" smtClean="0"/>
-              <a:t>.</a:t>
+              <a:t>The output from this program will be the value 20.</a:t>
             </a:r>
           </a:p>
           <a:p>
@@ -1839,7 +1835,11 @@
           <a:p>
             <a:r>
               <a:rPr lang="en-GB" baseline="0" dirty="0" smtClean="0"/>
-              <a:t>In this example the Animal C++ class has a public subprogram called </a:t>
+              <a:t>The </a:t>
+            </a:r>
+            <a:r>
+              <a:rPr lang="en-GB" baseline="0" dirty="0" smtClean="0"/>
+              <a:t>C++ implementation of </a:t>
             </a:r>
             <a:r>
               <a:rPr lang="en-GB" baseline="0" dirty="0" err="1" smtClean="0"/>
@@ -1847,7 +1847,7 @@
             </a:r>
             <a:r>
               <a:rPr lang="en-GB" baseline="0" dirty="0" smtClean="0"/>
-              <a:t> that is declared to possibly throw an exception with an Integer argument.</a:t>
+              <a:t>() deliberately throws an exception with an argument value of 20.</a:t>
             </a:r>
           </a:p>
           <a:p>
@@ -1856,66 +1856,11 @@
           <a:p>
             <a:r>
               <a:rPr lang="en-GB" baseline="0" dirty="0" smtClean="0"/>
-              <a:t>The g++ –fdump-</a:t>
-            </a:r>
-            <a:r>
-              <a:rPr lang="en-GB" baseline="0" dirty="0" err="1" smtClean="0"/>
-              <a:t>ada</a:t>
+              <a:t>It </a:t>
             </a:r>
             <a:r>
               <a:rPr lang="en-GB" baseline="0" dirty="0" smtClean="0"/>
-              <a:t>-spec output is shown here for completeness.</a:t>
-            </a:r>
-          </a:p>
-          <a:p>
-            <a:endParaRPr lang="en-GB" baseline="0" dirty="0" smtClean="0"/>
-          </a:p>
-          <a:p>
-            <a:r>
-              <a:rPr lang="en-GB" baseline="0" dirty="0" smtClean="0"/>
-              <a:t>The C++ implementation of </a:t>
-            </a:r>
-            <a:r>
-              <a:rPr lang="en-GB" baseline="0" dirty="0" err="1" smtClean="0"/>
-              <a:t>isOK</a:t>
-            </a:r>
-            <a:r>
-              <a:rPr lang="en-GB" baseline="0" dirty="0" smtClean="0"/>
-              <a:t>() deliberately throws an exception with an argument value of 20.</a:t>
-            </a:r>
-          </a:p>
-          <a:p>
-            <a:endParaRPr lang="en-GB" baseline="0" dirty="0" smtClean="0"/>
-          </a:p>
-          <a:p>
-            <a:r>
-              <a:rPr lang="en-GB" baseline="0" dirty="0" smtClean="0"/>
-              <a:t>The Ada main program is able to instantiate an Animal object as the entity named </a:t>
-            </a:r>
-            <a:r>
-              <a:rPr lang="en-GB" baseline="0" dirty="0" err="1" smtClean="0"/>
-              <a:t>Obj</a:t>
-            </a:r>
-            <a:r>
-              <a:rPr lang="en-GB" baseline="0" dirty="0" smtClean="0"/>
-              <a:t> and calls its </a:t>
-            </a:r>
-            <a:r>
-              <a:rPr lang="en-GB" baseline="0" dirty="0" err="1" smtClean="0"/>
-              <a:t>isOK</a:t>
-            </a:r>
-            <a:r>
-              <a:rPr lang="en-GB" baseline="0" dirty="0" smtClean="0"/>
-              <a:t> subprogram.</a:t>
-            </a:r>
-          </a:p>
-          <a:p>
-            <a:endParaRPr lang="en-GB" baseline="0" dirty="0" smtClean="0"/>
-          </a:p>
-          <a:p>
-            <a:r>
-              <a:rPr lang="en-GB" baseline="0" dirty="0" smtClean="0"/>
-              <a:t>It is only possible to use a general Ada exception handler for C++ exceptions and in this case the handler prints out the string “C++ Exception raised”.</a:t>
+              <a:t>is only possible to use a general Ada exception handler for C++ exceptions and in this case the handler prints out the string “C++ Exception raised”.</a:t>
             </a:r>
           </a:p>
           <a:p>
@@ -2200,6 +2145,10 @@
           <a:bodyPr/>
           <a:lstStyle/>
           <a:p>
+            <a:r>
+              <a:rPr lang="en-GB" dirty="0" smtClean="0"/>
+              <a:t>CPP Convention</a:t>
+            </a:r>
             <a:endParaRPr lang="en-GB" dirty="0"/>
           </a:p>
         </p:txBody>
@@ -2221,7 +2170,7 @@
           <a:p>
             <a:fld id="{CA0C9329-88FA-4F10-ACFF-58B750973BE9}" type="slidenum">
               <a:rPr lang="en-GB" smtClean="0"/>
-              <a:t>20</a:t>
+              <a:t>17</a:t>
             </a:fld>
             <a:endParaRPr lang="en-GB"/>
           </a:p>
@@ -2230,7 +2179,7 @@
     </p:spTree>
     <p:extLst>
       <p:ext uri="{BB962C8B-B14F-4D97-AF65-F5344CB8AC3E}">
-        <p14:creationId xmlns:p14="http://schemas.microsoft.com/office/powerpoint/2010/main" val="4132547052"/>
+        <p14:creationId xmlns:p14="http://schemas.microsoft.com/office/powerpoint/2010/main" val="1897586256"/>
       </p:ext>
     </p:extLst>
   </p:cSld>
@@ -2305,7 +2254,7 @@
           <a:p>
             <a:fld id="{CA0C9329-88FA-4F10-ACFF-58B750973BE9}" type="slidenum">
               <a:rPr lang="en-GB" smtClean="0"/>
-              <a:t>22</a:t>
+              <a:t>18</a:t>
             </a:fld>
             <a:endParaRPr lang="en-GB"/>
           </a:p>
@@ -2314,7 +2263,7 @@
     </p:spTree>
     <p:extLst>
       <p:ext uri="{BB962C8B-B14F-4D97-AF65-F5344CB8AC3E}">
-        <p14:creationId xmlns:p14="http://schemas.microsoft.com/office/powerpoint/2010/main" val="3774796086"/>
+        <p14:creationId xmlns:p14="http://schemas.microsoft.com/office/powerpoint/2010/main" val="336091907"/>
       </p:ext>
     </p:extLst>
   </p:cSld>
@@ -2368,6 +2317,10 @@
           <a:bodyPr/>
           <a:lstStyle/>
           <a:p>
+            <a:r>
+              <a:rPr lang="en-GB" dirty="0" smtClean="0"/>
+              <a:t>Incorrect mangled name</a:t>
+            </a:r>
             <a:endParaRPr lang="en-GB" dirty="0"/>
           </a:p>
         </p:txBody>
@@ -2389,7 +2342,7 @@
           <a:p>
             <a:fld id="{CA0C9329-88FA-4F10-ACFF-58B750973BE9}" type="slidenum">
               <a:rPr lang="en-GB" smtClean="0"/>
-              <a:t>24</a:t>
+              <a:t>19</a:t>
             </a:fld>
             <a:endParaRPr lang="en-GB"/>
           </a:p>
@@ -2398,7 +2351,7 @@
     </p:spTree>
     <p:extLst>
       <p:ext uri="{BB962C8B-B14F-4D97-AF65-F5344CB8AC3E}">
-        <p14:creationId xmlns:p14="http://schemas.microsoft.com/office/powerpoint/2010/main" val="2386974068"/>
+        <p14:creationId xmlns:p14="http://schemas.microsoft.com/office/powerpoint/2010/main" val="1468503777"/>
       </p:ext>
     </p:extLst>
   </p:cSld>
@@ -2647,7 +2600,7 @@
           <a:p>
             <a:fld id="{CA0C9329-88FA-4F10-ACFF-58B750973BE9}" type="slidenum">
               <a:rPr lang="en-GB" smtClean="0"/>
-              <a:t>26</a:t>
+              <a:t>20</a:t>
             </a:fld>
             <a:endParaRPr lang="en-GB"/>
           </a:p>
@@ -2656,7 +2609,7 @@
     </p:spTree>
     <p:extLst>
       <p:ext uri="{BB962C8B-B14F-4D97-AF65-F5344CB8AC3E}">
-        <p14:creationId xmlns:p14="http://schemas.microsoft.com/office/powerpoint/2010/main" val="2363033350"/>
+        <p14:creationId xmlns:p14="http://schemas.microsoft.com/office/powerpoint/2010/main" val="4132547052"/>
       </p:ext>
     </p:extLst>
   </p:cSld>
@@ -2710,6 +2663,10 @@
           <a:bodyPr/>
           <a:lstStyle/>
           <a:p>
+            <a:r>
+              <a:rPr lang="en-GB" dirty="0" smtClean="0"/>
+              <a:t>extern “C”</a:t>
+            </a:r>
             <a:endParaRPr lang="en-GB" dirty="0"/>
           </a:p>
         </p:txBody>
@@ -2731,7 +2688,7 @@
           <a:p>
             <a:fld id="{CA0C9329-88FA-4F10-ACFF-58B750973BE9}" type="slidenum">
               <a:rPr lang="en-GB" smtClean="0"/>
-              <a:t>28</a:t>
+              <a:t>21</a:t>
             </a:fld>
             <a:endParaRPr lang="en-GB"/>
           </a:p>
@@ -2740,7 +2697,7 @@
     </p:spTree>
     <p:extLst>
       <p:ext uri="{BB962C8B-B14F-4D97-AF65-F5344CB8AC3E}">
-        <p14:creationId xmlns:p14="http://schemas.microsoft.com/office/powerpoint/2010/main" val="4034560739"/>
+        <p14:creationId xmlns:p14="http://schemas.microsoft.com/office/powerpoint/2010/main" val="523632989"/>
       </p:ext>
     </p:extLst>
   </p:cSld>
@@ -2815,7 +2772,7 @@
           <a:p>
             <a:fld id="{CA0C9329-88FA-4F10-ACFF-58B750973BE9}" type="slidenum">
               <a:rPr lang="en-GB" smtClean="0"/>
-              <a:t>30</a:t>
+              <a:t>22</a:t>
             </a:fld>
             <a:endParaRPr lang="en-GB"/>
           </a:p>
@@ -2824,7 +2781,7 @@
     </p:spTree>
     <p:extLst>
       <p:ext uri="{BB962C8B-B14F-4D97-AF65-F5344CB8AC3E}">
-        <p14:creationId xmlns:p14="http://schemas.microsoft.com/office/powerpoint/2010/main" val="3046249282"/>
+        <p14:creationId xmlns:p14="http://schemas.microsoft.com/office/powerpoint/2010/main" val="3774796086"/>
       </p:ext>
     </p:extLst>
   </p:cSld>
@@ -2878,6 +2835,18 @@
           <a:bodyPr/>
           <a:lstStyle/>
           <a:p>
+            <a:r>
+              <a:rPr lang="en-GB" dirty="0" smtClean="0"/>
+              <a:t>Multiple choice</a:t>
+            </a:r>
+            <a:r>
+              <a:rPr lang="en-GB" baseline="0" dirty="0" smtClean="0"/>
+              <a:t> mangled name for </a:t>
+            </a:r>
+            <a:r>
+              <a:rPr lang="en-GB" baseline="0" dirty="0" err="1" smtClean="0"/>
+              <a:t>Link_Name</a:t>
+            </a:r>
             <a:endParaRPr lang="en-GB" dirty="0"/>
           </a:p>
         </p:txBody>
@@ -2899,7 +2868,7 @@
           <a:p>
             <a:fld id="{CA0C9329-88FA-4F10-ACFF-58B750973BE9}" type="slidenum">
               <a:rPr lang="en-GB" smtClean="0"/>
-              <a:t>32</a:t>
+              <a:t>23</a:t>
             </a:fld>
             <a:endParaRPr lang="en-GB"/>
           </a:p>
@@ -2908,7 +2877,7 @@
     </p:spTree>
     <p:extLst>
       <p:ext uri="{BB962C8B-B14F-4D97-AF65-F5344CB8AC3E}">
-        <p14:creationId xmlns:p14="http://schemas.microsoft.com/office/powerpoint/2010/main" val="669449949"/>
+        <p14:creationId xmlns:p14="http://schemas.microsoft.com/office/powerpoint/2010/main" val="3893196804"/>
       </p:ext>
     </p:extLst>
   </p:cSld>
@@ -2983,7 +2952,7 @@
           <a:p>
             <a:fld id="{CA0C9329-88FA-4F10-ACFF-58B750973BE9}" type="slidenum">
               <a:rPr lang="en-GB" smtClean="0"/>
-              <a:t>34</a:t>
+              <a:t>24</a:t>
             </a:fld>
             <a:endParaRPr lang="en-GB"/>
           </a:p>
@@ -2992,7 +2961,7 @@
     </p:spTree>
     <p:extLst>
       <p:ext uri="{BB962C8B-B14F-4D97-AF65-F5344CB8AC3E}">
-        <p14:creationId xmlns:p14="http://schemas.microsoft.com/office/powerpoint/2010/main" val="1801290123"/>
+        <p14:creationId xmlns:p14="http://schemas.microsoft.com/office/powerpoint/2010/main" val="2386974068"/>
       </p:ext>
     </p:extLst>
   </p:cSld>
@@ -3046,6 +3015,10 @@
           <a:bodyPr/>
           <a:lstStyle/>
           <a:p>
+            <a:r>
+              <a:rPr lang="en-GB" dirty="0" smtClean="0"/>
+              <a:t>Importing C++ classes</a:t>
+            </a:r>
             <a:endParaRPr lang="en-GB" dirty="0"/>
           </a:p>
         </p:txBody>
@@ -3067,7 +3040,7 @@
           <a:p>
             <a:fld id="{CA0C9329-88FA-4F10-ACFF-58B750973BE9}" type="slidenum">
               <a:rPr lang="en-GB" smtClean="0"/>
-              <a:t>36</a:t>
+              <a:t>25</a:t>
             </a:fld>
             <a:endParaRPr lang="en-GB"/>
           </a:p>
@@ -3076,7 +3049,7 @@
     </p:spTree>
     <p:extLst>
       <p:ext uri="{BB962C8B-B14F-4D97-AF65-F5344CB8AC3E}">
-        <p14:creationId xmlns:p14="http://schemas.microsoft.com/office/powerpoint/2010/main" val="1798100639"/>
+        <p14:creationId xmlns:p14="http://schemas.microsoft.com/office/powerpoint/2010/main" val="3979178975"/>
       </p:ext>
     </p:extLst>
   </p:cSld>
@@ -3130,52 +3103,6 @@
           <a:bodyPr/>
           <a:lstStyle/>
           <a:p>
-            <a:r>
-              <a:rPr lang="en-GB" altLang="en-US" dirty="0" smtClean="0">
-                <a:ea typeface="ＭＳ Ｐゴシック" panose="020B0600070205080204" pitchFamily="34" charset="-128"/>
-              </a:rPr>
-              <a:t>Thank you for attending this lecture</a:t>
-            </a:r>
-            <a:r>
-              <a:rPr lang="en-GB" altLang="en-US" baseline="0" dirty="0" smtClean="0">
-                <a:ea typeface="ＭＳ Ｐゴシック" panose="020B0600070205080204" pitchFamily="34" charset="-128"/>
-              </a:rPr>
-              <a:t> from the AdaCore University</a:t>
-            </a:r>
-            <a:r>
-              <a:rPr lang="en-GB" altLang="en-US" dirty="0" smtClean="0">
-                <a:ea typeface="ＭＳ Ｐゴシック" panose="020B0600070205080204" pitchFamily="34" charset="-128"/>
-              </a:rPr>
-              <a:t>.</a:t>
-            </a:r>
-          </a:p>
-          <a:p>
-            <a:endParaRPr lang="en-GB" altLang="en-US" dirty="0" smtClean="0">
-              <a:ea typeface="ＭＳ Ｐゴシック" panose="020B0600070205080204" pitchFamily="34" charset="-128"/>
-            </a:endParaRPr>
-          </a:p>
-          <a:p>
-            <a:r>
-              <a:rPr lang="en-GB" altLang="en-US" dirty="0" smtClean="0">
-                <a:ea typeface="ＭＳ Ｐゴシック" panose="020B0600070205080204" pitchFamily="34" charset="-128"/>
-              </a:rPr>
-              <a:t>I hope you have found it a valuable step in learning the Ada Programming Language and that you continue onto the other lectures in the course from the Ada University.</a:t>
-            </a:r>
-          </a:p>
-          <a:p>
-            <a:endParaRPr lang="en-GB" altLang="en-US" dirty="0" smtClean="0">
-              <a:ea typeface="ＭＳ Ｐゴシック" panose="020B0600070205080204" pitchFamily="34" charset="-128"/>
-            </a:endParaRPr>
-          </a:p>
-          <a:p>
-            <a:r>
-              <a:rPr lang="en-GB" altLang="en-US" dirty="0" smtClean="0">
-                <a:ea typeface="ＭＳ Ｐゴシック" panose="020B0600070205080204" pitchFamily="34" charset="-128"/>
-              </a:rPr>
-              <a:t>Thank you.</a:t>
-            </a:r>
-          </a:p>
-          <a:p>
             <a:endParaRPr lang="en-GB" dirty="0"/>
           </a:p>
         </p:txBody>
@@ -3197,7 +3124,7 @@
           <a:p>
             <a:fld id="{CA0C9329-88FA-4F10-ACFF-58B750973BE9}" type="slidenum">
               <a:rPr lang="en-GB" smtClean="0"/>
-              <a:t>37</a:t>
+              <a:t>26</a:t>
             </a:fld>
             <a:endParaRPr lang="en-GB"/>
           </a:p>
@@ -3206,7 +3133,267 @@
     </p:spTree>
     <p:extLst>
       <p:ext uri="{BB962C8B-B14F-4D97-AF65-F5344CB8AC3E}">
-        <p14:creationId xmlns:p14="http://schemas.microsoft.com/office/powerpoint/2010/main" val="1691745314"/>
+        <p14:creationId xmlns:p14="http://schemas.microsoft.com/office/powerpoint/2010/main" val="2363033350"/>
+      </p:ext>
+    </p:extLst>
+  </p:cSld>
+  <p:clrMapOvr>
+    <a:masterClrMapping/>
+  </p:clrMapOvr>
+</p:notes>
+</file>
+
+<file path=ppt/notesSlides/notesSlide27.xml><?xml version="1.0" encoding="utf-8"?>
+<p:notes xmlns:a="http://schemas.openxmlformats.org/drawingml/2006/main" xmlns:r="http://schemas.openxmlformats.org/officeDocument/2006/relationships" xmlns:p="http://schemas.openxmlformats.org/presentationml/2006/main">
+  <p:cSld>
+    <p:spTree>
+      <p:nvGrpSpPr>
+        <p:cNvPr id="1" name=""/>
+        <p:cNvGrpSpPr/>
+        <p:nvPr/>
+      </p:nvGrpSpPr>
+      <p:grpSpPr>
+        <a:xfrm>
+          <a:off x="0" y="0"/>
+          <a:ext cx="0" cy="0"/>
+          <a:chOff x="0" y="0"/>
+          <a:chExt cx="0" cy="0"/>
+        </a:xfrm>
+      </p:grpSpPr>
+      <p:sp>
+        <p:nvSpPr>
+          <p:cNvPr id="2" name="Slide Image Placeholder 1"/>
+          <p:cNvSpPr>
+            <a:spLocks noGrp="1" noRot="1" noChangeAspect="1"/>
+          </p:cNvSpPr>
+          <p:nvPr>
+            <p:ph type="sldImg"/>
+          </p:nvPr>
+        </p:nvSpPr>
+        <p:spPr/>
+      </p:sp>
+      <p:sp>
+        <p:nvSpPr>
+          <p:cNvPr id="3" name="Notes Placeholder 2"/>
+          <p:cNvSpPr>
+            <a:spLocks noGrp="1"/>
+          </p:cNvSpPr>
+          <p:nvPr>
+            <p:ph type="body" idx="1"/>
+          </p:nvPr>
+        </p:nvSpPr>
+        <p:spPr/>
+        <p:txBody>
+          <a:bodyPr/>
+          <a:lstStyle/>
+          <a:p>
+            <a:r>
+              <a:rPr lang="en-GB" dirty="0" smtClean="0"/>
+              <a:t>C++ constructors</a:t>
+            </a:r>
+            <a:endParaRPr lang="en-GB" dirty="0"/>
+          </a:p>
+        </p:txBody>
+      </p:sp>
+      <p:sp>
+        <p:nvSpPr>
+          <p:cNvPr id="4" name="Slide Number Placeholder 3"/>
+          <p:cNvSpPr>
+            <a:spLocks noGrp="1"/>
+          </p:cNvSpPr>
+          <p:nvPr>
+            <p:ph type="sldNum" sz="quarter" idx="10"/>
+          </p:nvPr>
+        </p:nvSpPr>
+        <p:spPr/>
+        <p:txBody>
+          <a:bodyPr/>
+          <a:lstStyle/>
+          <a:p>
+            <a:fld id="{CA0C9329-88FA-4F10-ACFF-58B750973BE9}" type="slidenum">
+              <a:rPr lang="en-GB" smtClean="0"/>
+              <a:t>27</a:t>
+            </a:fld>
+            <a:endParaRPr lang="en-GB"/>
+          </a:p>
+        </p:txBody>
+      </p:sp>
+    </p:spTree>
+    <p:extLst>
+      <p:ext uri="{BB962C8B-B14F-4D97-AF65-F5344CB8AC3E}">
+        <p14:creationId xmlns:p14="http://schemas.microsoft.com/office/powerpoint/2010/main" val="1812088868"/>
+      </p:ext>
+    </p:extLst>
+  </p:cSld>
+  <p:clrMapOvr>
+    <a:masterClrMapping/>
+  </p:clrMapOvr>
+</p:notes>
+</file>
+
+<file path=ppt/notesSlides/notesSlide28.xml><?xml version="1.0" encoding="utf-8"?>
+<p:notes xmlns:a="http://schemas.openxmlformats.org/drawingml/2006/main" xmlns:r="http://schemas.openxmlformats.org/officeDocument/2006/relationships" xmlns:p="http://schemas.openxmlformats.org/presentationml/2006/main">
+  <p:cSld>
+    <p:spTree>
+      <p:nvGrpSpPr>
+        <p:cNvPr id="1" name=""/>
+        <p:cNvGrpSpPr/>
+        <p:nvPr/>
+      </p:nvGrpSpPr>
+      <p:grpSpPr>
+        <a:xfrm>
+          <a:off x="0" y="0"/>
+          <a:ext cx="0" cy="0"/>
+          <a:chOff x="0" y="0"/>
+          <a:chExt cx="0" cy="0"/>
+        </a:xfrm>
+      </p:grpSpPr>
+      <p:sp>
+        <p:nvSpPr>
+          <p:cNvPr id="2" name="Slide Image Placeholder 1"/>
+          <p:cNvSpPr>
+            <a:spLocks noGrp="1" noRot="1" noChangeAspect="1"/>
+          </p:cNvSpPr>
+          <p:nvPr>
+            <p:ph type="sldImg"/>
+          </p:nvPr>
+        </p:nvSpPr>
+        <p:spPr/>
+      </p:sp>
+      <p:sp>
+        <p:nvSpPr>
+          <p:cNvPr id="3" name="Notes Placeholder 2"/>
+          <p:cNvSpPr>
+            <a:spLocks noGrp="1"/>
+          </p:cNvSpPr>
+          <p:nvPr>
+            <p:ph type="body" idx="1"/>
+          </p:nvPr>
+        </p:nvSpPr>
+        <p:spPr/>
+        <p:txBody>
+          <a:bodyPr/>
+          <a:lstStyle/>
+          <a:p>
+            <a:endParaRPr lang="en-GB" dirty="0"/>
+          </a:p>
+        </p:txBody>
+      </p:sp>
+      <p:sp>
+        <p:nvSpPr>
+          <p:cNvPr id="4" name="Slide Number Placeholder 3"/>
+          <p:cNvSpPr>
+            <a:spLocks noGrp="1"/>
+          </p:cNvSpPr>
+          <p:nvPr>
+            <p:ph type="sldNum" sz="quarter" idx="10"/>
+          </p:nvPr>
+        </p:nvSpPr>
+        <p:spPr/>
+        <p:txBody>
+          <a:bodyPr/>
+          <a:lstStyle/>
+          <a:p>
+            <a:fld id="{CA0C9329-88FA-4F10-ACFF-58B750973BE9}" type="slidenum">
+              <a:rPr lang="en-GB" smtClean="0"/>
+              <a:t>28</a:t>
+            </a:fld>
+            <a:endParaRPr lang="en-GB"/>
+          </a:p>
+        </p:txBody>
+      </p:sp>
+    </p:spTree>
+    <p:extLst>
+      <p:ext uri="{BB962C8B-B14F-4D97-AF65-F5344CB8AC3E}">
+        <p14:creationId xmlns:p14="http://schemas.microsoft.com/office/powerpoint/2010/main" val="4034560739"/>
+      </p:ext>
+    </p:extLst>
+  </p:cSld>
+  <p:clrMapOvr>
+    <a:masterClrMapping/>
+  </p:clrMapOvr>
+</p:notes>
+</file>
+
+<file path=ppt/notesSlides/notesSlide29.xml><?xml version="1.0" encoding="utf-8"?>
+<p:notes xmlns:a="http://schemas.openxmlformats.org/drawingml/2006/main" xmlns:r="http://schemas.openxmlformats.org/officeDocument/2006/relationships" xmlns:p="http://schemas.openxmlformats.org/presentationml/2006/main">
+  <p:cSld>
+    <p:spTree>
+      <p:nvGrpSpPr>
+        <p:cNvPr id="1" name=""/>
+        <p:cNvGrpSpPr/>
+        <p:nvPr/>
+      </p:nvGrpSpPr>
+      <p:grpSpPr>
+        <a:xfrm>
+          <a:off x="0" y="0"/>
+          <a:ext cx="0" cy="0"/>
+          <a:chOff x="0" y="0"/>
+          <a:chExt cx="0" cy="0"/>
+        </a:xfrm>
+      </p:grpSpPr>
+      <p:sp>
+        <p:nvSpPr>
+          <p:cNvPr id="2" name="Slide Image Placeholder 1"/>
+          <p:cNvSpPr>
+            <a:spLocks noGrp="1" noRot="1" noChangeAspect="1"/>
+          </p:cNvSpPr>
+          <p:nvPr>
+            <p:ph type="sldImg"/>
+          </p:nvPr>
+        </p:nvSpPr>
+        <p:spPr/>
+      </p:sp>
+      <p:sp>
+        <p:nvSpPr>
+          <p:cNvPr id="3" name="Notes Placeholder 2"/>
+          <p:cNvSpPr>
+            <a:spLocks noGrp="1"/>
+          </p:cNvSpPr>
+          <p:nvPr>
+            <p:ph type="body" idx="1"/>
+          </p:nvPr>
+        </p:nvSpPr>
+        <p:spPr/>
+        <p:txBody>
+          <a:bodyPr/>
+          <a:lstStyle/>
+          <a:p>
+            <a:r>
+              <a:rPr lang="en-GB" dirty="0" smtClean="0"/>
+              <a:t>Using C++ classes</a:t>
+            </a:r>
+            <a:endParaRPr lang="en-GB" dirty="0"/>
+          </a:p>
+        </p:txBody>
+      </p:sp>
+      <p:sp>
+        <p:nvSpPr>
+          <p:cNvPr id="4" name="Slide Number Placeholder 3"/>
+          <p:cNvSpPr>
+            <a:spLocks noGrp="1"/>
+          </p:cNvSpPr>
+          <p:nvPr>
+            <p:ph type="sldNum" sz="quarter" idx="10"/>
+          </p:nvPr>
+        </p:nvSpPr>
+        <p:spPr/>
+        <p:txBody>
+          <a:bodyPr/>
+          <a:lstStyle/>
+          <a:p>
+            <a:fld id="{CA0C9329-88FA-4F10-ACFF-58B750973BE9}" type="slidenum">
+              <a:rPr lang="en-GB" smtClean="0"/>
+              <a:t>29</a:t>
+            </a:fld>
+            <a:endParaRPr lang="en-GB"/>
+          </a:p>
+        </p:txBody>
+      </p:sp>
+    </p:spTree>
+    <p:extLst>
+      <p:ext uri="{BB962C8B-B14F-4D97-AF65-F5344CB8AC3E}">
+        <p14:creationId xmlns:p14="http://schemas.microsoft.com/office/powerpoint/2010/main" val="2231323776"/>
       </p:ext>
     </p:extLst>
   </p:cSld>
@@ -3341,6 +3528,740 @@
     <p:extLst>
       <p:ext uri="{BB962C8B-B14F-4D97-AF65-F5344CB8AC3E}">
         <p14:creationId xmlns:p14="http://schemas.microsoft.com/office/powerpoint/2010/main" val="2602639475"/>
+      </p:ext>
+    </p:extLst>
+  </p:cSld>
+  <p:clrMapOvr>
+    <a:masterClrMapping/>
+  </p:clrMapOvr>
+</p:notes>
+</file>
+
+<file path=ppt/notesSlides/notesSlide30.xml><?xml version="1.0" encoding="utf-8"?>
+<p:notes xmlns:a="http://schemas.openxmlformats.org/drawingml/2006/main" xmlns:r="http://schemas.openxmlformats.org/officeDocument/2006/relationships" xmlns:p="http://schemas.openxmlformats.org/presentationml/2006/main">
+  <p:cSld>
+    <p:spTree>
+      <p:nvGrpSpPr>
+        <p:cNvPr id="1" name=""/>
+        <p:cNvGrpSpPr/>
+        <p:nvPr/>
+      </p:nvGrpSpPr>
+      <p:grpSpPr>
+        <a:xfrm>
+          <a:off x="0" y="0"/>
+          <a:ext cx="0" cy="0"/>
+          <a:chOff x="0" y="0"/>
+          <a:chExt cx="0" cy="0"/>
+        </a:xfrm>
+      </p:grpSpPr>
+      <p:sp>
+        <p:nvSpPr>
+          <p:cNvPr id="2" name="Slide Image Placeholder 1"/>
+          <p:cNvSpPr>
+            <a:spLocks noGrp="1" noRot="1" noChangeAspect="1"/>
+          </p:cNvSpPr>
+          <p:nvPr>
+            <p:ph type="sldImg"/>
+          </p:nvPr>
+        </p:nvSpPr>
+        <p:spPr/>
+      </p:sp>
+      <p:sp>
+        <p:nvSpPr>
+          <p:cNvPr id="3" name="Notes Placeholder 2"/>
+          <p:cNvSpPr>
+            <a:spLocks noGrp="1"/>
+          </p:cNvSpPr>
+          <p:nvPr>
+            <p:ph type="body" idx="1"/>
+          </p:nvPr>
+        </p:nvSpPr>
+        <p:spPr/>
+        <p:txBody>
+          <a:bodyPr/>
+          <a:lstStyle/>
+          <a:p>
+            <a:endParaRPr lang="en-GB" dirty="0"/>
+          </a:p>
+        </p:txBody>
+      </p:sp>
+      <p:sp>
+        <p:nvSpPr>
+          <p:cNvPr id="4" name="Slide Number Placeholder 3"/>
+          <p:cNvSpPr>
+            <a:spLocks noGrp="1"/>
+          </p:cNvSpPr>
+          <p:nvPr>
+            <p:ph type="sldNum" sz="quarter" idx="10"/>
+          </p:nvPr>
+        </p:nvSpPr>
+        <p:spPr/>
+        <p:txBody>
+          <a:bodyPr/>
+          <a:lstStyle/>
+          <a:p>
+            <a:fld id="{CA0C9329-88FA-4F10-ACFF-58B750973BE9}" type="slidenum">
+              <a:rPr lang="en-GB" smtClean="0"/>
+              <a:t>30</a:t>
+            </a:fld>
+            <a:endParaRPr lang="en-GB"/>
+          </a:p>
+        </p:txBody>
+      </p:sp>
+    </p:spTree>
+    <p:extLst>
+      <p:ext uri="{BB962C8B-B14F-4D97-AF65-F5344CB8AC3E}">
+        <p14:creationId xmlns:p14="http://schemas.microsoft.com/office/powerpoint/2010/main" val="3046249282"/>
+      </p:ext>
+    </p:extLst>
+  </p:cSld>
+  <p:clrMapOvr>
+    <a:masterClrMapping/>
+  </p:clrMapOvr>
+</p:notes>
+</file>
+
+<file path=ppt/notesSlides/notesSlide31.xml><?xml version="1.0" encoding="utf-8"?>
+<p:notes xmlns:a="http://schemas.openxmlformats.org/drawingml/2006/main" xmlns:r="http://schemas.openxmlformats.org/officeDocument/2006/relationships" xmlns:p="http://schemas.openxmlformats.org/presentationml/2006/main">
+  <p:cSld>
+    <p:spTree>
+      <p:nvGrpSpPr>
+        <p:cNvPr id="1" name=""/>
+        <p:cNvGrpSpPr/>
+        <p:nvPr/>
+      </p:nvGrpSpPr>
+      <p:grpSpPr>
+        <a:xfrm>
+          <a:off x="0" y="0"/>
+          <a:ext cx="0" cy="0"/>
+          <a:chOff x="0" y="0"/>
+          <a:chExt cx="0" cy="0"/>
+        </a:xfrm>
+      </p:grpSpPr>
+      <p:sp>
+        <p:nvSpPr>
+          <p:cNvPr id="2" name="Slide Image Placeholder 1"/>
+          <p:cNvSpPr>
+            <a:spLocks noGrp="1" noRot="1" noChangeAspect="1"/>
+          </p:cNvSpPr>
+          <p:nvPr>
+            <p:ph type="sldImg"/>
+          </p:nvPr>
+        </p:nvSpPr>
+        <p:spPr/>
+      </p:sp>
+      <p:sp>
+        <p:nvSpPr>
+          <p:cNvPr id="3" name="Notes Placeholder 2"/>
+          <p:cNvSpPr>
+            <a:spLocks noGrp="1"/>
+          </p:cNvSpPr>
+          <p:nvPr>
+            <p:ph type="body" idx="1"/>
+          </p:nvPr>
+        </p:nvSpPr>
+        <p:spPr/>
+        <p:txBody>
+          <a:bodyPr/>
+          <a:lstStyle/>
+          <a:p>
+            <a:r>
+              <a:rPr lang="en-GB" dirty="0" smtClean="0"/>
+              <a:t>Extending imported</a:t>
+            </a:r>
+            <a:r>
+              <a:rPr lang="en-GB" baseline="0" dirty="0" smtClean="0"/>
+              <a:t> C++ classes</a:t>
+            </a:r>
+            <a:endParaRPr lang="en-GB" dirty="0"/>
+          </a:p>
+        </p:txBody>
+      </p:sp>
+      <p:sp>
+        <p:nvSpPr>
+          <p:cNvPr id="4" name="Slide Number Placeholder 3"/>
+          <p:cNvSpPr>
+            <a:spLocks noGrp="1"/>
+          </p:cNvSpPr>
+          <p:nvPr>
+            <p:ph type="sldNum" sz="quarter" idx="10"/>
+          </p:nvPr>
+        </p:nvSpPr>
+        <p:spPr/>
+        <p:txBody>
+          <a:bodyPr/>
+          <a:lstStyle/>
+          <a:p>
+            <a:fld id="{CA0C9329-88FA-4F10-ACFF-58B750973BE9}" type="slidenum">
+              <a:rPr lang="en-GB" smtClean="0"/>
+              <a:t>31</a:t>
+            </a:fld>
+            <a:endParaRPr lang="en-GB"/>
+          </a:p>
+        </p:txBody>
+      </p:sp>
+    </p:spTree>
+    <p:extLst>
+      <p:ext uri="{BB962C8B-B14F-4D97-AF65-F5344CB8AC3E}">
+        <p14:creationId xmlns:p14="http://schemas.microsoft.com/office/powerpoint/2010/main" val="1142815457"/>
+      </p:ext>
+    </p:extLst>
+  </p:cSld>
+  <p:clrMapOvr>
+    <a:masterClrMapping/>
+  </p:clrMapOvr>
+</p:notes>
+</file>
+
+<file path=ppt/notesSlides/notesSlide32.xml><?xml version="1.0" encoding="utf-8"?>
+<p:notes xmlns:a="http://schemas.openxmlformats.org/drawingml/2006/main" xmlns:r="http://schemas.openxmlformats.org/officeDocument/2006/relationships" xmlns:p="http://schemas.openxmlformats.org/presentationml/2006/main">
+  <p:cSld>
+    <p:spTree>
+      <p:nvGrpSpPr>
+        <p:cNvPr id="1" name=""/>
+        <p:cNvGrpSpPr/>
+        <p:nvPr/>
+      </p:nvGrpSpPr>
+      <p:grpSpPr>
+        <a:xfrm>
+          <a:off x="0" y="0"/>
+          <a:ext cx="0" cy="0"/>
+          <a:chOff x="0" y="0"/>
+          <a:chExt cx="0" cy="0"/>
+        </a:xfrm>
+      </p:grpSpPr>
+      <p:sp>
+        <p:nvSpPr>
+          <p:cNvPr id="2" name="Slide Image Placeholder 1"/>
+          <p:cNvSpPr>
+            <a:spLocks noGrp="1" noRot="1" noChangeAspect="1"/>
+          </p:cNvSpPr>
+          <p:nvPr>
+            <p:ph type="sldImg"/>
+          </p:nvPr>
+        </p:nvSpPr>
+        <p:spPr/>
+      </p:sp>
+      <p:sp>
+        <p:nvSpPr>
+          <p:cNvPr id="3" name="Notes Placeholder 2"/>
+          <p:cNvSpPr>
+            <a:spLocks noGrp="1"/>
+          </p:cNvSpPr>
+          <p:nvPr>
+            <p:ph type="body" idx="1"/>
+          </p:nvPr>
+        </p:nvSpPr>
+        <p:spPr/>
+        <p:txBody>
+          <a:bodyPr/>
+          <a:lstStyle/>
+          <a:p>
+            <a:endParaRPr lang="en-GB" dirty="0"/>
+          </a:p>
+        </p:txBody>
+      </p:sp>
+      <p:sp>
+        <p:nvSpPr>
+          <p:cNvPr id="4" name="Slide Number Placeholder 3"/>
+          <p:cNvSpPr>
+            <a:spLocks noGrp="1"/>
+          </p:cNvSpPr>
+          <p:nvPr>
+            <p:ph type="sldNum" sz="quarter" idx="10"/>
+          </p:nvPr>
+        </p:nvSpPr>
+        <p:spPr/>
+        <p:txBody>
+          <a:bodyPr/>
+          <a:lstStyle/>
+          <a:p>
+            <a:fld id="{CA0C9329-88FA-4F10-ACFF-58B750973BE9}" type="slidenum">
+              <a:rPr lang="en-GB" smtClean="0"/>
+              <a:t>32</a:t>
+            </a:fld>
+            <a:endParaRPr lang="en-GB"/>
+          </a:p>
+        </p:txBody>
+      </p:sp>
+    </p:spTree>
+    <p:extLst>
+      <p:ext uri="{BB962C8B-B14F-4D97-AF65-F5344CB8AC3E}">
+        <p14:creationId xmlns:p14="http://schemas.microsoft.com/office/powerpoint/2010/main" val="669449949"/>
+      </p:ext>
+    </p:extLst>
+  </p:cSld>
+  <p:clrMapOvr>
+    <a:masterClrMapping/>
+  </p:clrMapOvr>
+</p:notes>
+</file>
+
+<file path=ppt/notesSlides/notesSlide33.xml><?xml version="1.0" encoding="utf-8"?>
+<p:notes xmlns:a="http://schemas.openxmlformats.org/drawingml/2006/main" xmlns:r="http://schemas.openxmlformats.org/officeDocument/2006/relationships" xmlns:p="http://schemas.openxmlformats.org/presentationml/2006/main">
+  <p:cSld>
+    <p:spTree>
+      <p:nvGrpSpPr>
+        <p:cNvPr id="1" name=""/>
+        <p:cNvGrpSpPr/>
+        <p:nvPr/>
+      </p:nvGrpSpPr>
+      <p:grpSpPr>
+        <a:xfrm>
+          <a:off x="0" y="0"/>
+          <a:ext cx="0" cy="0"/>
+          <a:chOff x="0" y="0"/>
+          <a:chExt cx="0" cy="0"/>
+        </a:xfrm>
+      </p:grpSpPr>
+      <p:sp>
+        <p:nvSpPr>
+          <p:cNvPr id="2" name="Slide Image Placeholder 1"/>
+          <p:cNvSpPr>
+            <a:spLocks noGrp="1" noRot="1" noChangeAspect="1"/>
+          </p:cNvSpPr>
+          <p:nvPr>
+            <p:ph type="sldImg"/>
+          </p:nvPr>
+        </p:nvSpPr>
+        <p:spPr/>
+      </p:sp>
+      <p:sp>
+        <p:nvSpPr>
+          <p:cNvPr id="3" name="Notes Placeholder 2"/>
+          <p:cNvSpPr>
+            <a:spLocks noGrp="1"/>
+          </p:cNvSpPr>
+          <p:nvPr>
+            <p:ph type="body" idx="1"/>
+          </p:nvPr>
+        </p:nvSpPr>
+        <p:spPr/>
+        <p:txBody>
+          <a:bodyPr/>
+          <a:lstStyle/>
+          <a:p>
+            <a:r>
+              <a:rPr lang="en-GB" dirty="0" smtClean="0"/>
+              <a:t>Exporting Ada tagged types</a:t>
+            </a:r>
+            <a:endParaRPr lang="en-GB" dirty="0"/>
+          </a:p>
+        </p:txBody>
+      </p:sp>
+      <p:sp>
+        <p:nvSpPr>
+          <p:cNvPr id="4" name="Slide Number Placeholder 3"/>
+          <p:cNvSpPr>
+            <a:spLocks noGrp="1"/>
+          </p:cNvSpPr>
+          <p:nvPr>
+            <p:ph type="sldNum" sz="quarter" idx="10"/>
+          </p:nvPr>
+        </p:nvSpPr>
+        <p:spPr/>
+        <p:txBody>
+          <a:bodyPr/>
+          <a:lstStyle/>
+          <a:p>
+            <a:fld id="{CA0C9329-88FA-4F10-ACFF-58B750973BE9}" type="slidenum">
+              <a:rPr lang="en-GB" smtClean="0"/>
+              <a:t>33</a:t>
+            </a:fld>
+            <a:endParaRPr lang="en-GB"/>
+          </a:p>
+        </p:txBody>
+      </p:sp>
+    </p:spTree>
+    <p:extLst>
+      <p:ext uri="{BB962C8B-B14F-4D97-AF65-F5344CB8AC3E}">
+        <p14:creationId xmlns:p14="http://schemas.microsoft.com/office/powerpoint/2010/main" val="90033136"/>
+      </p:ext>
+    </p:extLst>
+  </p:cSld>
+  <p:clrMapOvr>
+    <a:masterClrMapping/>
+  </p:clrMapOvr>
+</p:notes>
+</file>
+
+<file path=ppt/notesSlides/notesSlide34.xml><?xml version="1.0" encoding="utf-8"?>
+<p:notes xmlns:a="http://schemas.openxmlformats.org/drawingml/2006/main" xmlns:r="http://schemas.openxmlformats.org/officeDocument/2006/relationships" xmlns:p="http://schemas.openxmlformats.org/presentationml/2006/main">
+  <p:cSld>
+    <p:spTree>
+      <p:nvGrpSpPr>
+        <p:cNvPr id="1" name=""/>
+        <p:cNvGrpSpPr/>
+        <p:nvPr/>
+      </p:nvGrpSpPr>
+      <p:grpSpPr>
+        <a:xfrm>
+          <a:off x="0" y="0"/>
+          <a:ext cx="0" cy="0"/>
+          <a:chOff x="0" y="0"/>
+          <a:chExt cx="0" cy="0"/>
+        </a:xfrm>
+      </p:grpSpPr>
+      <p:sp>
+        <p:nvSpPr>
+          <p:cNvPr id="2" name="Slide Image Placeholder 1"/>
+          <p:cNvSpPr>
+            <a:spLocks noGrp="1" noRot="1" noChangeAspect="1"/>
+          </p:cNvSpPr>
+          <p:nvPr>
+            <p:ph type="sldImg"/>
+          </p:nvPr>
+        </p:nvSpPr>
+        <p:spPr/>
+      </p:sp>
+      <p:sp>
+        <p:nvSpPr>
+          <p:cNvPr id="3" name="Notes Placeholder 2"/>
+          <p:cNvSpPr>
+            <a:spLocks noGrp="1"/>
+          </p:cNvSpPr>
+          <p:nvPr>
+            <p:ph type="body" idx="1"/>
+          </p:nvPr>
+        </p:nvSpPr>
+        <p:spPr/>
+        <p:txBody>
+          <a:bodyPr/>
+          <a:lstStyle/>
+          <a:p>
+            <a:endParaRPr lang="en-GB" dirty="0"/>
+          </a:p>
+        </p:txBody>
+      </p:sp>
+      <p:sp>
+        <p:nvSpPr>
+          <p:cNvPr id="4" name="Slide Number Placeholder 3"/>
+          <p:cNvSpPr>
+            <a:spLocks noGrp="1"/>
+          </p:cNvSpPr>
+          <p:nvPr>
+            <p:ph type="sldNum" sz="quarter" idx="10"/>
+          </p:nvPr>
+        </p:nvSpPr>
+        <p:spPr/>
+        <p:txBody>
+          <a:bodyPr/>
+          <a:lstStyle/>
+          <a:p>
+            <a:fld id="{CA0C9329-88FA-4F10-ACFF-58B750973BE9}" type="slidenum">
+              <a:rPr lang="en-GB" smtClean="0"/>
+              <a:t>34</a:t>
+            </a:fld>
+            <a:endParaRPr lang="en-GB"/>
+          </a:p>
+        </p:txBody>
+      </p:sp>
+    </p:spTree>
+    <p:extLst>
+      <p:ext uri="{BB962C8B-B14F-4D97-AF65-F5344CB8AC3E}">
+        <p14:creationId xmlns:p14="http://schemas.microsoft.com/office/powerpoint/2010/main" val="1801290123"/>
+      </p:ext>
+    </p:extLst>
+  </p:cSld>
+  <p:clrMapOvr>
+    <a:masterClrMapping/>
+  </p:clrMapOvr>
+</p:notes>
+</file>
+
+<file path=ppt/notesSlides/notesSlide35.xml><?xml version="1.0" encoding="utf-8"?>
+<p:notes xmlns:a="http://schemas.openxmlformats.org/drawingml/2006/main" xmlns:r="http://schemas.openxmlformats.org/officeDocument/2006/relationships" xmlns:p="http://schemas.openxmlformats.org/presentationml/2006/main">
+  <p:cSld>
+    <p:spTree>
+      <p:nvGrpSpPr>
+        <p:cNvPr id="1" name=""/>
+        <p:cNvGrpSpPr/>
+        <p:nvPr/>
+      </p:nvGrpSpPr>
+      <p:grpSpPr>
+        <a:xfrm>
+          <a:off x="0" y="0"/>
+          <a:ext cx="0" cy="0"/>
+          <a:chOff x="0" y="0"/>
+          <a:chExt cx="0" cy="0"/>
+        </a:xfrm>
+      </p:grpSpPr>
+      <p:sp>
+        <p:nvSpPr>
+          <p:cNvPr id="2" name="Slide Image Placeholder 1"/>
+          <p:cNvSpPr>
+            <a:spLocks noGrp="1" noRot="1" noChangeAspect="1"/>
+          </p:cNvSpPr>
+          <p:nvPr>
+            <p:ph type="sldImg"/>
+          </p:nvPr>
+        </p:nvSpPr>
+        <p:spPr/>
+      </p:sp>
+      <p:sp>
+        <p:nvSpPr>
+          <p:cNvPr id="3" name="Notes Placeholder 2"/>
+          <p:cNvSpPr>
+            <a:spLocks noGrp="1"/>
+          </p:cNvSpPr>
+          <p:nvPr>
+            <p:ph type="body" idx="1"/>
+          </p:nvPr>
+        </p:nvSpPr>
+        <p:spPr/>
+        <p:txBody>
+          <a:bodyPr/>
+          <a:lstStyle/>
+          <a:p>
+            <a:r>
+              <a:rPr lang="en-GB" dirty="0" smtClean="0"/>
+              <a:t>C++ exceptions</a:t>
+            </a:r>
+            <a:endParaRPr lang="en-GB" dirty="0"/>
+          </a:p>
+        </p:txBody>
+      </p:sp>
+      <p:sp>
+        <p:nvSpPr>
+          <p:cNvPr id="4" name="Slide Number Placeholder 3"/>
+          <p:cNvSpPr>
+            <a:spLocks noGrp="1"/>
+          </p:cNvSpPr>
+          <p:nvPr>
+            <p:ph type="sldNum" sz="quarter" idx="10"/>
+          </p:nvPr>
+        </p:nvSpPr>
+        <p:spPr/>
+        <p:txBody>
+          <a:bodyPr/>
+          <a:lstStyle/>
+          <a:p>
+            <a:fld id="{CA0C9329-88FA-4F10-ACFF-58B750973BE9}" type="slidenum">
+              <a:rPr lang="en-GB" smtClean="0"/>
+              <a:t>35</a:t>
+            </a:fld>
+            <a:endParaRPr lang="en-GB"/>
+          </a:p>
+        </p:txBody>
+      </p:sp>
+    </p:spTree>
+    <p:extLst>
+      <p:ext uri="{BB962C8B-B14F-4D97-AF65-F5344CB8AC3E}">
+        <p14:creationId xmlns:p14="http://schemas.microsoft.com/office/powerpoint/2010/main" val="3232511024"/>
+      </p:ext>
+    </p:extLst>
+  </p:cSld>
+  <p:clrMapOvr>
+    <a:masterClrMapping/>
+  </p:clrMapOvr>
+</p:notes>
+</file>
+
+<file path=ppt/notesSlides/notesSlide36.xml><?xml version="1.0" encoding="utf-8"?>
+<p:notes xmlns:a="http://schemas.openxmlformats.org/drawingml/2006/main" xmlns:r="http://schemas.openxmlformats.org/officeDocument/2006/relationships" xmlns:p="http://schemas.openxmlformats.org/presentationml/2006/main">
+  <p:cSld>
+    <p:spTree>
+      <p:nvGrpSpPr>
+        <p:cNvPr id="1" name=""/>
+        <p:cNvGrpSpPr/>
+        <p:nvPr/>
+      </p:nvGrpSpPr>
+      <p:grpSpPr>
+        <a:xfrm>
+          <a:off x="0" y="0"/>
+          <a:ext cx="0" cy="0"/>
+          <a:chOff x="0" y="0"/>
+          <a:chExt cx="0" cy="0"/>
+        </a:xfrm>
+      </p:grpSpPr>
+      <p:sp>
+        <p:nvSpPr>
+          <p:cNvPr id="2" name="Slide Image Placeholder 1"/>
+          <p:cNvSpPr>
+            <a:spLocks noGrp="1" noRot="1" noChangeAspect="1"/>
+          </p:cNvSpPr>
+          <p:nvPr>
+            <p:ph type="sldImg"/>
+          </p:nvPr>
+        </p:nvSpPr>
+        <p:spPr/>
+      </p:sp>
+      <p:sp>
+        <p:nvSpPr>
+          <p:cNvPr id="3" name="Notes Placeholder 2"/>
+          <p:cNvSpPr>
+            <a:spLocks noGrp="1"/>
+          </p:cNvSpPr>
+          <p:nvPr>
+            <p:ph type="body" idx="1"/>
+          </p:nvPr>
+        </p:nvSpPr>
+        <p:spPr/>
+        <p:txBody>
+          <a:bodyPr/>
+          <a:lstStyle/>
+          <a:p>
+            <a:endParaRPr lang="en-GB" dirty="0"/>
+          </a:p>
+        </p:txBody>
+      </p:sp>
+      <p:sp>
+        <p:nvSpPr>
+          <p:cNvPr id="4" name="Slide Number Placeholder 3"/>
+          <p:cNvSpPr>
+            <a:spLocks noGrp="1"/>
+          </p:cNvSpPr>
+          <p:nvPr>
+            <p:ph type="sldNum" sz="quarter" idx="10"/>
+          </p:nvPr>
+        </p:nvSpPr>
+        <p:spPr/>
+        <p:txBody>
+          <a:bodyPr/>
+          <a:lstStyle/>
+          <a:p>
+            <a:fld id="{CA0C9329-88FA-4F10-ACFF-58B750973BE9}" type="slidenum">
+              <a:rPr lang="en-GB" smtClean="0"/>
+              <a:t>36</a:t>
+            </a:fld>
+            <a:endParaRPr lang="en-GB"/>
+          </a:p>
+        </p:txBody>
+      </p:sp>
+    </p:spTree>
+    <p:extLst>
+      <p:ext uri="{BB962C8B-B14F-4D97-AF65-F5344CB8AC3E}">
+        <p14:creationId xmlns:p14="http://schemas.microsoft.com/office/powerpoint/2010/main" val="1798100639"/>
+      </p:ext>
+    </p:extLst>
+  </p:cSld>
+  <p:clrMapOvr>
+    <a:masterClrMapping/>
+  </p:clrMapOvr>
+</p:notes>
+</file>
+
+<file path=ppt/notesSlides/notesSlide37.xml><?xml version="1.0" encoding="utf-8"?>
+<p:notes xmlns:a="http://schemas.openxmlformats.org/drawingml/2006/main" xmlns:r="http://schemas.openxmlformats.org/officeDocument/2006/relationships" xmlns:p="http://schemas.openxmlformats.org/presentationml/2006/main">
+  <p:cSld>
+    <p:spTree>
+      <p:nvGrpSpPr>
+        <p:cNvPr id="1" name=""/>
+        <p:cNvGrpSpPr/>
+        <p:nvPr/>
+      </p:nvGrpSpPr>
+      <p:grpSpPr>
+        <a:xfrm>
+          <a:off x="0" y="0"/>
+          <a:ext cx="0" cy="0"/>
+          <a:chOff x="0" y="0"/>
+          <a:chExt cx="0" cy="0"/>
+        </a:xfrm>
+      </p:grpSpPr>
+      <p:sp>
+        <p:nvSpPr>
+          <p:cNvPr id="2" name="Slide Image Placeholder 1"/>
+          <p:cNvSpPr>
+            <a:spLocks noGrp="1" noRot="1" noChangeAspect="1"/>
+          </p:cNvSpPr>
+          <p:nvPr>
+            <p:ph type="sldImg"/>
+          </p:nvPr>
+        </p:nvSpPr>
+        <p:spPr/>
+      </p:sp>
+      <p:sp>
+        <p:nvSpPr>
+          <p:cNvPr id="3" name="Notes Placeholder 2"/>
+          <p:cNvSpPr>
+            <a:spLocks noGrp="1"/>
+          </p:cNvSpPr>
+          <p:nvPr>
+            <p:ph type="body" idx="1"/>
+          </p:nvPr>
+        </p:nvSpPr>
+        <p:spPr/>
+        <p:txBody>
+          <a:bodyPr/>
+          <a:lstStyle/>
+          <a:p>
+            <a:r>
+              <a:rPr lang="en-GB" altLang="en-US" dirty="0" smtClean="0">
+                <a:ea typeface="ＭＳ Ｐゴシック" panose="020B0600070205080204" pitchFamily="34" charset="-128"/>
+              </a:rPr>
+              <a:t>Thank you for attending this lecture</a:t>
+            </a:r>
+            <a:r>
+              <a:rPr lang="en-GB" altLang="en-US" baseline="0" dirty="0" smtClean="0">
+                <a:ea typeface="ＭＳ Ｐゴシック" panose="020B0600070205080204" pitchFamily="34" charset="-128"/>
+              </a:rPr>
+              <a:t> from the AdaCore University</a:t>
+            </a:r>
+            <a:r>
+              <a:rPr lang="en-GB" altLang="en-US" dirty="0" smtClean="0">
+                <a:ea typeface="ＭＳ Ｐゴシック" panose="020B0600070205080204" pitchFamily="34" charset="-128"/>
+              </a:rPr>
+              <a:t>.</a:t>
+            </a:r>
+          </a:p>
+          <a:p>
+            <a:endParaRPr lang="en-GB" altLang="en-US" dirty="0" smtClean="0">
+              <a:ea typeface="ＭＳ Ｐゴシック" panose="020B0600070205080204" pitchFamily="34" charset="-128"/>
+            </a:endParaRPr>
+          </a:p>
+          <a:p>
+            <a:r>
+              <a:rPr lang="en-GB" altLang="en-US" dirty="0" smtClean="0">
+                <a:ea typeface="ＭＳ Ｐゴシック" panose="020B0600070205080204" pitchFamily="34" charset="-128"/>
+              </a:rPr>
+              <a:t>I hope you have found it a valuable step in learning the Ada Programming Language and that you continue onto the other lectures in the course from the Ada University.</a:t>
+            </a:r>
+          </a:p>
+          <a:p>
+            <a:endParaRPr lang="en-GB" altLang="en-US" dirty="0" smtClean="0">
+              <a:ea typeface="ＭＳ Ｐゴシック" panose="020B0600070205080204" pitchFamily="34" charset="-128"/>
+            </a:endParaRPr>
+          </a:p>
+          <a:p>
+            <a:r>
+              <a:rPr lang="en-GB" altLang="en-US" dirty="0" smtClean="0">
+                <a:ea typeface="ＭＳ Ｐゴシック" panose="020B0600070205080204" pitchFamily="34" charset="-128"/>
+              </a:rPr>
+              <a:t>Thank you.</a:t>
+            </a:r>
+          </a:p>
+          <a:p>
+            <a:endParaRPr lang="en-GB" dirty="0"/>
+          </a:p>
+        </p:txBody>
+      </p:sp>
+      <p:sp>
+        <p:nvSpPr>
+          <p:cNvPr id="4" name="Slide Number Placeholder 3"/>
+          <p:cNvSpPr>
+            <a:spLocks noGrp="1"/>
+          </p:cNvSpPr>
+          <p:nvPr>
+            <p:ph type="sldNum" sz="quarter" idx="10"/>
+          </p:nvPr>
+        </p:nvSpPr>
+        <p:spPr/>
+        <p:txBody>
+          <a:bodyPr/>
+          <a:lstStyle/>
+          <a:p>
+            <a:fld id="{CA0C9329-88FA-4F10-ACFF-58B750973BE9}" type="slidenum">
+              <a:rPr lang="en-GB" smtClean="0"/>
+              <a:t>37</a:t>
+            </a:fld>
+            <a:endParaRPr lang="en-GB"/>
+          </a:p>
+        </p:txBody>
+      </p:sp>
+    </p:spTree>
+    <p:extLst>
+      <p:ext uri="{BB962C8B-B14F-4D97-AF65-F5344CB8AC3E}">
+        <p14:creationId xmlns:p14="http://schemas.microsoft.com/office/powerpoint/2010/main" val="1691745314"/>
       </p:ext>
     </p:extLst>
   </p:cSld>
@@ -17194,12 +18115,6 @@
                         </a:rPr>
                         <a:t>;</a:t>
                       </a:r>
-                      <a:endParaRPr lang="en-GB" sz="1100" b="0" baseline="0" dirty="0" smtClean="0">
-                        <a:solidFill>
-                          <a:schemeClr val="tx1"/>
-                        </a:solidFill>
-                        <a:latin typeface="Courier New" pitchFamily="49" charset="0"/>
-                      </a:endParaRPr>
                     </a:p>
                     <a:p>
                       <a:pPr marL="0" marR="0" indent="0" algn="l" defTabSz="914400" rtl="0" eaLnBrk="1" fontAlgn="auto" latinLnBrk="0" hangingPunct="1">
@@ -17815,12 +18730,6 @@
                         </a:rPr>
                         <a:t>begin</a:t>
                       </a:r>
-                      <a:endParaRPr lang="en-GB" sz="1100" b="1" baseline="0" dirty="0" smtClean="0">
-                        <a:solidFill>
-                          <a:schemeClr val="tx1"/>
-                        </a:solidFill>
-                        <a:latin typeface="Courier New" pitchFamily="49" charset="0"/>
-                      </a:endParaRPr>
                     </a:p>
                     <a:p>
                       <a:pPr marL="0" marR="0" indent="0" algn="l" defTabSz="914400" rtl="0" eaLnBrk="1" fontAlgn="auto" latinLnBrk="0" hangingPunct="1">
@@ -17865,16 +18774,7 @@
                           </a:solidFill>
                           <a:latin typeface="Courier New" pitchFamily="49" charset="0"/>
                         </a:rPr>
-                        <a:t> </a:t>
-                      </a:r>
-                      <a:r>
-                        <a:rPr lang="en-GB" sz="1100" b="0" baseline="0" dirty="0" smtClean="0">
-                          <a:solidFill>
-                            <a:schemeClr val="tx1"/>
-                          </a:solidFill>
-                          <a:latin typeface="Courier New" pitchFamily="49" charset="0"/>
-                        </a:rPr>
-                        <a:t>Animal'(</a:t>
+                        <a:t> Animal'(</a:t>
                       </a:r>
                       <a:r>
                         <a:rPr lang="en-GB" sz="1100" b="0" baseline="0" dirty="0" err="1" smtClean="0">
@@ -19261,6 +20161,13 @@
   <p:clrMapOvr>
     <a:masterClrMapping/>
   </p:clrMapOvr>
+  <p:timing>
+    <p:tnLst>
+      <p:par>
+        <p:cTn id="1" dur="indefinite" restart="never" nodeType="tmRoot"/>
+      </p:par>
+    </p:tnLst>
+  </p:timing>
 </p:sld>
 </file>
 
@@ -21727,12 +22634,6 @@
                         </a:rPr>
                         <a:t>;</a:t>
                       </a:r>
-                      <a:endParaRPr lang="en-GB" sz="1100" b="0" baseline="0" dirty="0" smtClean="0">
-                        <a:solidFill>
-                          <a:schemeClr val="tx1"/>
-                        </a:solidFill>
-                        <a:latin typeface="Courier New" pitchFamily="49" charset="0"/>
-                      </a:endParaRPr>
                     </a:p>
                     <a:p>
                       <a:pPr marL="0" marR="0" indent="0" algn="l" defTabSz="914400" rtl="0" eaLnBrk="1" fontAlgn="auto" latinLnBrk="0" hangingPunct="1">
@@ -22348,12 +23249,6 @@
                         </a:rPr>
                         <a:t>begin</a:t>
                       </a:r>
-                      <a:endParaRPr lang="en-GB" sz="1100" b="1" baseline="0" dirty="0" smtClean="0">
-                        <a:solidFill>
-                          <a:schemeClr val="tx1"/>
-                        </a:solidFill>
-                        <a:latin typeface="Courier New" pitchFamily="49" charset="0"/>
-                      </a:endParaRPr>
                     </a:p>
                     <a:p>
                       <a:pPr marL="0" marR="0" indent="0" algn="l" defTabSz="914400" rtl="0" eaLnBrk="1" fontAlgn="auto" latinLnBrk="0" hangingPunct="1">
@@ -22398,16 +23293,7 @@
                           </a:solidFill>
                           <a:latin typeface="Courier New" pitchFamily="49" charset="0"/>
                         </a:rPr>
-                        <a:t> </a:t>
-                      </a:r>
-                      <a:r>
-                        <a:rPr lang="en-GB" sz="1100" b="0" baseline="0" dirty="0" smtClean="0">
-                          <a:solidFill>
-                            <a:schemeClr val="tx1"/>
-                          </a:solidFill>
-                          <a:latin typeface="Courier New" pitchFamily="49" charset="0"/>
-                        </a:rPr>
-                        <a:t>Animal'(</a:t>
+                        <a:t> Animal'(</a:t>
                       </a:r>
                       <a:r>
                         <a:rPr lang="en-GB" sz="1100" b="0" baseline="0" dirty="0" err="1" smtClean="0">
@@ -22878,6 +23764,13 @@
   <p:clrMapOvr>
     <a:masterClrMapping/>
   </p:clrMapOvr>
+  <p:timing>
+    <p:tnLst>
+      <p:par>
+        <p:cTn id="1" dur="indefinite" restart="never" nodeType="tmRoot"/>
+      </p:par>
+    </p:tnLst>
+  </p:timing>
 </p:sld>
 </file>
 
@@ -22930,14 +23823,14 @@
           <p:nvPr>
             <p:extLst>
               <p:ext uri="{D42A27DB-BD31-4B8C-83A1-F6EECF244321}">
-                <p14:modId xmlns:p14="http://schemas.microsoft.com/office/powerpoint/2010/main" val="260163419"/>
+                <p14:modId xmlns:p14="http://schemas.microsoft.com/office/powerpoint/2010/main" val="2569990223"/>
               </p:ext>
             </p:extLst>
           </p:nvPr>
         </p:nvGraphicFramePr>
         <p:xfrm>
-          <a:off x="441146" y="854710"/>
-          <a:ext cx="2821484" cy="1096730"/>
+          <a:off x="3161258" y="1197610"/>
+          <a:ext cx="2821484" cy="659765"/>
         </p:xfrm>
         <a:graphic>
           <a:graphicData uri="http://schemas.openxmlformats.org/drawingml/2006/table">
@@ -22948,7 +23841,7 @@
               <a:tblGrid>
                 <a:gridCol w="2821484"/>
               </a:tblGrid>
-              <a:tr h="1076574">
+              <a:tr h="659765">
                 <a:tc>
                   <a:txBody>
                     <a:bodyPr/>
@@ -22978,7 +23871,7 @@
                           </a:solidFill>
                           <a:latin typeface="Courier New" pitchFamily="49" charset="0"/>
                         </a:rPr>
-                        <a:t>// </a:t>
+                        <a:t>bool </a:t>
                       </a:r>
                       <a:r>
                         <a:rPr lang="en-GB" sz="1100" b="0" baseline="0" dirty="0" err="1" smtClean="0">
@@ -22987,125 +23880,16 @@
                           </a:solidFill>
                           <a:latin typeface="Courier New" pitchFamily="49" charset="0"/>
                         </a:rPr>
-                        <a:t>animal.h</a:t>
-                      </a:r>
-                      <a:endParaRPr lang="en-GB" sz="1100" b="0" baseline="0" dirty="0" smtClean="0">
-                        <a:solidFill>
-                          <a:schemeClr val="tx1"/>
-                        </a:solidFill>
-                        <a:latin typeface="Courier New" pitchFamily="49" charset="0"/>
-                      </a:endParaRPr>
-                    </a:p>
-                    <a:p>
-                      <a:pPr marL="0" marR="0" indent="0" algn="l" defTabSz="914400" rtl="0" eaLnBrk="1" fontAlgn="auto" latinLnBrk="0" hangingPunct="1">
-                        <a:lnSpc>
-                          <a:spcPct val="100000"/>
-                        </a:lnSpc>
-                        <a:spcBef>
-                          <a:spcPts val="0"/>
-                        </a:spcBef>
-                        <a:spcAft>
-                          <a:spcPts val="0"/>
-                        </a:spcAft>
-                        <a:buClrTx/>
-                        <a:buSzTx/>
-                        <a:buFontTx/>
-                        <a:buNone/>
-                        <a:tabLst/>
-                        <a:defRPr/>
-                      </a:pPr>
-                      <a:r>
-                        <a:rPr lang="en-GB" sz="1100" b="0" baseline="0" dirty="0" smtClean="0">
-                          <a:solidFill>
-                            <a:schemeClr val="tx1"/>
-                          </a:solidFill>
-                          <a:latin typeface="Courier New" pitchFamily="49" charset="0"/>
-                        </a:rPr>
-                        <a:t>class Animal {</a:t>
-                      </a:r>
-                    </a:p>
-                    <a:p>
-                      <a:pPr marL="0" marR="0" indent="0" algn="l" defTabSz="914400" rtl="0" eaLnBrk="1" fontAlgn="auto" latinLnBrk="0" hangingPunct="1">
-                        <a:lnSpc>
-                          <a:spcPct val="100000"/>
-                        </a:lnSpc>
-                        <a:spcBef>
-                          <a:spcPts val="0"/>
-                        </a:spcBef>
-                        <a:spcAft>
-                          <a:spcPts val="0"/>
-                        </a:spcAft>
-                        <a:buClrTx/>
-                        <a:buSzTx/>
-                        <a:buFontTx/>
-                        <a:buNone/>
-                        <a:tabLst/>
-                        <a:defRPr/>
-                      </a:pPr>
-                      <a:r>
-                        <a:rPr lang="en-GB" sz="1100" b="0" baseline="0" dirty="0" smtClean="0">
-                          <a:solidFill>
-                            <a:schemeClr val="tx1"/>
-                          </a:solidFill>
-                          <a:latin typeface="Courier New" pitchFamily="49" charset="0"/>
-                        </a:rPr>
-                        <a:t>public:</a:t>
-                      </a:r>
-                    </a:p>
-                    <a:p>
-                      <a:pPr marL="0" marR="0" indent="0" algn="l" defTabSz="914400" rtl="0" eaLnBrk="1" fontAlgn="auto" latinLnBrk="0" hangingPunct="1">
-                        <a:lnSpc>
-                          <a:spcPct val="100000"/>
-                        </a:lnSpc>
-                        <a:spcBef>
-                          <a:spcPts val="0"/>
-                        </a:spcBef>
-                        <a:spcAft>
-                          <a:spcPts val="0"/>
-                        </a:spcAft>
-                        <a:buClrTx/>
-                        <a:buSzTx/>
-                        <a:buFontTx/>
-                        <a:buNone/>
-                        <a:tabLst/>
-                        <a:defRPr/>
-                      </a:pPr>
-                      <a:r>
-                        <a:rPr lang="en-GB" sz="1100" b="0" baseline="0" dirty="0" smtClean="0">
-                          <a:solidFill>
-                            <a:schemeClr val="tx1"/>
-                          </a:solidFill>
-                          <a:latin typeface="Courier New" pitchFamily="49" charset="0"/>
-                        </a:rPr>
-                        <a:t>   Animal();</a:t>
-                      </a:r>
-                    </a:p>
-                    <a:p>
-                      <a:pPr marL="0" marR="0" indent="0" algn="l" defTabSz="914400" rtl="0" eaLnBrk="1" fontAlgn="auto" latinLnBrk="0" hangingPunct="1">
-                        <a:lnSpc>
-                          <a:spcPct val="100000"/>
-                        </a:lnSpc>
-                        <a:spcBef>
-                          <a:spcPts val="0"/>
-                        </a:spcBef>
-                        <a:spcAft>
-                          <a:spcPts val="0"/>
-                        </a:spcAft>
-                        <a:buClrTx/>
-                        <a:buSzTx/>
-                        <a:buFontTx/>
-                        <a:buNone/>
-                        <a:tabLst/>
-                        <a:defRPr/>
-                      </a:pPr>
-                      <a:r>
-                        <a:rPr lang="en-GB" sz="1100" b="0" baseline="0" dirty="0" smtClean="0">
-                          <a:solidFill>
-                            <a:schemeClr val="tx1"/>
-                          </a:solidFill>
-                          <a:latin typeface="Courier New" pitchFamily="49" charset="0"/>
-                        </a:rPr>
-                        <a:t>   bool </a:t>
+                        <a:t>isOK</a:t>
+                      </a:r>
+                      <a:r>
+                        <a:rPr lang="en-GB" sz="1100" b="0" baseline="0" dirty="0" smtClean="0">
+                          <a:solidFill>
+                            <a:schemeClr val="tx1"/>
+                          </a:solidFill>
+                          <a:latin typeface="Courier New" pitchFamily="49" charset="0"/>
+                        </a:rPr>
+                        <a:t>(void) throw(</a:t>
                       </a:r>
                       <a:r>
                         <a:rPr lang="en-GB" sz="1100" b="0" baseline="0" dirty="0" err="1" smtClean="0">
@@ -23114,24 +23898,6 @@
                           </a:solidFill>
                           <a:latin typeface="Courier New" pitchFamily="49" charset="0"/>
                         </a:rPr>
-                        <a:t>isOK</a:t>
-                      </a:r>
-                      <a:r>
-                        <a:rPr lang="en-GB" sz="1100" b="0" baseline="0" dirty="0" smtClean="0">
-                          <a:solidFill>
-                            <a:schemeClr val="tx1"/>
-                          </a:solidFill>
-                          <a:latin typeface="Courier New" pitchFamily="49" charset="0"/>
-                        </a:rPr>
-                        <a:t>(void) throw(</a:t>
-                      </a:r>
-                      <a:r>
-                        <a:rPr lang="en-GB" sz="1100" b="0" baseline="0" dirty="0" err="1" smtClean="0">
-                          <a:solidFill>
-                            <a:schemeClr val="tx1"/>
-                          </a:solidFill>
-                          <a:latin typeface="Courier New" pitchFamily="49" charset="0"/>
-                        </a:rPr>
                         <a:t>int</a:t>
                       </a:r>
                       <a:r>
@@ -23141,7 +23907,35 @@
                           </a:solidFill>
                           <a:latin typeface="Courier New" pitchFamily="49" charset="0"/>
                         </a:rPr>
-                        <a:t>);</a:t>
+                        <a:t>) { </a:t>
+                      </a:r>
+                    </a:p>
+                    <a:p>
+                      <a:pPr marL="0" marR="0" indent="0" algn="l" defTabSz="914400" rtl="0" eaLnBrk="1" fontAlgn="auto" latinLnBrk="0" hangingPunct="1">
+                        <a:lnSpc>
+                          <a:spcPct val="100000"/>
+                        </a:lnSpc>
+                        <a:spcBef>
+                          <a:spcPts val="0"/>
+                        </a:spcBef>
+                        <a:spcAft>
+                          <a:spcPts val="0"/>
+                        </a:spcAft>
+                        <a:buClrTx/>
+                        <a:buSzTx/>
+                        <a:buFontTx/>
+                        <a:buNone/>
+                        <a:tabLst/>
+                        <a:defRPr/>
+                      </a:pPr>
+                      <a:r>
+                        <a:rPr lang="en-GB" sz="1100" b="0" baseline="0" dirty="0" smtClean="0">
+                          <a:solidFill>
+                            <a:schemeClr val="tx1"/>
+                          </a:solidFill>
+                          <a:latin typeface="Courier New" pitchFamily="49" charset="0"/>
+                        </a:rPr>
+                        <a:t>   throw 20;</a:t>
                       </a:r>
                     </a:p>
                     <a:p>
@@ -23170,1385 +23964,6 @@
                           <a:latin typeface="Courier New" pitchFamily="49" charset="0"/>
                         </a:rPr>
                         <a:t>};</a:t>
-                      </a:r>
-                      <a:endParaRPr lang="en-US" sz="1100" b="0" baseline="0" dirty="0" smtClean="0">
-                        <a:solidFill>
-                          <a:schemeClr val="tx1"/>
-                        </a:solidFill>
-                        <a:latin typeface="Courier New" pitchFamily="49" charset="0"/>
-                      </a:endParaRPr>
-                    </a:p>
-                  </a:txBody>
-                  <a:tcPr marL="91413" marR="91413" marT="45445" marB="45445">
-                    <a:solidFill>
-                      <a:schemeClr val="bg1">
-                        <a:lumMod val="95000"/>
-                      </a:schemeClr>
-                    </a:solidFill>
-                  </a:tcPr>
-                </a:tc>
-              </a:tr>
-            </a:tbl>
-          </a:graphicData>
-        </a:graphic>
-      </p:graphicFrame>
-      <p:graphicFrame>
-        <p:nvGraphicFramePr>
-          <p:cNvPr id="5" name="Tableau 4"/>
-          <p:cNvGraphicFramePr>
-            <a:graphicFrameLocks noGrp="1"/>
-          </p:cNvGraphicFramePr>
-          <p:nvPr>
-            <p:extLst>
-              <p:ext uri="{D42A27DB-BD31-4B8C-83A1-F6EECF244321}">
-                <p14:modId xmlns:p14="http://schemas.microsoft.com/office/powerpoint/2010/main" val="3636115324"/>
-              </p:ext>
-            </p:extLst>
-          </p:nvPr>
-        </p:nvGraphicFramePr>
-        <p:xfrm>
-          <a:off x="441146" y="2112190"/>
-          <a:ext cx="2919274" cy="1096730"/>
-        </p:xfrm>
-        <a:graphic>
-          <a:graphicData uri="http://schemas.openxmlformats.org/drawingml/2006/table">
-            <a:tbl>
-              <a:tblPr firstRow="1" bandRow="1">
-                <a:tableStyleId>{5C22544A-7EE6-4342-B048-85BDC9FD1C3A}</a:tableStyleId>
-              </a:tblPr>
-              <a:tblGrid>
-                <a:gridCol w="2919274"/>
-              </a:tblGrid>
-              <a:tr h="796366">
-                <a:tc>
-                  <a:txBody>
-                    <a:bodyPr/>
-                    <a:lstStyle/>
-                    <a:p>
-                      <a:pPr marL="0" marR="0" indent="0" algn="l" defTabSz="914400" rtl="0" eaLnBrk="1" fontAlgn="auto" latinLnBrk="0" hangingPunct="1">
-                        <a:lnSpc>
-                          <a:spcPct val="100000"/>
-                        </a:lnSpc>
-                        <a:spcBef>
-                          <a:spcPts val="0"/>
-                        </a:spcBef>
-                        <a:spcAft>
-                          <a:spcPts val="0"/>
-                        </a:spcAft>
-                        <a:buClrTx/>
-                        <a:buSzTx/>
-                        <a:buFontTx/>
-                        <a:buNone/>
-                        <a:tabLst/>
-                        <a:defRPr/>
-                      </a:pPr>
-                      <a:r>
-                        <a:rPr lang="en-GB" sz="1100" b="0" baseline="0" dirty="0" smtClean="0">
-                          <a:solidFill>
-                            <a:schemeClr val="tx1"/>
-                          </a:solidFill>
-                          <a:latin typeface="Courier New" pitchFamily="49" charset="0"/>
-                        </a:rPr>
-                        <a:t>// </a:t>
-                      </a:r>
-                      <a:r>
-                        <a:rPr lang="en-GB" sz="1100" b="0" baseline="0" dirty="0" smtClean="0">
-                          <a:solidFill>
-                            <a:schemeClr val="tx1"/>
-                          </a:solidFill>
-                          <a:latin typeface="Courier New" pitchFamily="49" charset="0"/>
-                        </a:rPr>
-                        <a:t>animal.cpp</a:t>
-                      </a:r>
-                      <a:endParaRPr lang="en-GB" sz="1100" b="0" baseline="0" dirty="0" smtClean="0">
-                        <a:solidFill>
-                          <a:schemeClr val="tx1"/>
-                        </a:solidFill>
-                        <a:latin typeface="Courier New" pitchFamily="49" charset="0"/>
-                      </a:endParaRPr>
-                    </a:p>
-                    <a:p>
-                      <a:pPr marL="0" marR="0" indent="0" algn="l" defTabSz="914400" rtl="0" eaLnBrk="1" fontAlgn="auto" latinLnBrk="0" hangingPunct="1">
-                        <a:lnSpc>
-                          <a:spcPct val="100000"/>
-                        </a:lnSpc>
-                        <a:spcBef>
-                          <a:spcPts val="0"/>
-                        </a:spcBef>
-                        <a:spcAft>
-                          <a:spcPts val="0"/>
-                        </a:spcAft>
-                        <a:buClrTx/>
-                        <a:buSzTx/>
-                        <a:buFontTx/>
-                        <a:buNone/>
-                        <a:tabLst/>
-                        <a:defRPr/>
-                      </a:pPr>
-                      <a:r>
-                        <a:rPr lang="en-GB" sz="1100" b="0" baseline="0" dirty="0" smtClean="0">
-                          <a:solidFill>
-                            <a:schemeClr val="tx1"/>
-                          </a:solidFill>
-                          <a:latin typeface="Courier New" pitchFamily="49" charset="0"/>
-                        </a:rPr>
-                        <a:t>#include "</a:t>
-                      </a:r>
-                      <a:r>
-                        <a:rPr lang="en-GB" sz="1100" b="0" baseline="0" dirty="0" err="1" smtClean="0">
-                          <a:solidFill>
-                            <a:schemeClr val="tx1"/>
-                          </a:solidFill>
-                          <a:latin typeface="Courier New" pitchFamily="49" charset="0"/>
-                        </a:rPr>
-                        <a:t>animal.h</a:t>
-                      </a:r>
-                      <a:r>
-                        <a:rPr lang="en-GB" sz="1100" b="0" baseline="0" dirty="0" smtClean="0">
-                          <a:solidFill>
-                            <a:schemeClr val="tx1"/>
-                          </a:solidFill>
-                          <a:latin typeface="Courier New" pitchFamily="49" charset="0"/>
-                        </a:rPr>
-                        <a:t>"</a:t>
-                      </a:r>
-                    </a:p>
-                    <a:p>
-                      <a:pPr marL="0" marR="0" indent="0" algn="l" defTabSz="914400" rtl="0" eaLnBrk="1" fontAlgn="auto" latinLnBrk="0" hangingPunct="1">
-                        <a:lnSpc>
-                          <a:spcPct val="100000"/>
-                        </a:lnSpc>
-                        <a:spcBef>
-                          <a:spcPts val="0"/>
-                        </a:spcBef>
-                        <a:spcAft>
-                          <a:spcPts val="0"/>
-                        </a:spcAft>
-                        <a:buClrTx/>
-                        <a:buSzTx/>
-                        <a:buFontTx/>
-                        <a:buNone/>
-                        <a:tabLst/>
-                        <a:defRPr/>
-                      </a:pPr>
-                      <a:endParaRPr lang="en-GB" sz="1100" b="0" baseline="0" dirty="0" smtClean="0">
-                        <a:solidFill>
-                          <a:schemeClr val="tx1"/>
-                        </a:solidFill>
-                        <a:latin typeface="Courier New" pitchFamily="49" charset="0"/>
-                      </a:endParaRPr>
-                    </a:p>
-                    <a:p>
-                      <a:pPr marL="0" marR="0" indent="0" algn="l" defTabSz="914400" rtl="0" eaLnBrk="1" fontAlgn="auto" latinLnBrk="0" hangingPunct="1">
-                        <a:lnSpc>
-                          <a:spcPct val="100000"/>
-                        </a:lnSpc>
-                        <a:spcBef>
-                          <a:spcPts val="0"/>
-                        </a:spcBef>
-                        <a:spcAft>
-                          <a:spcPts val="0"/>
-                        </a:spcAft>
-                        <a:buClrTx/>
-                        <a:buSzTx/>
-                        <a:buFontTx/>
-                        <a:buNone/>
-                        <a:tabLst/>
-                        <a:defRPr/>
-                      </a:pPr>
-                      <a:r>
-                        <a:rPr lang="en-GB" sz="1100" b="0" baseline="0" dirty="0" smtClean="0">
-                          <a:solidFill>
-                            <a:schemeClr val="tx1"/>
-                          </a:solidFill>
-                          <a:latin typeface="Courier New" pitchFamily="49" charset="0"/>
-                        </a:rPr>
-                        <a:t>Animal::Animal() {};</a:t>
-                      </a:r>
-                    </a:p>
-                    <a:p>
-                      <a:pPr marL="0" marR="0" indent="0" algn="l" defTabSz="914400" rtl="0" eaLnBrk="1" fontAlgn="auto" latinLnBrk="0" hangingPunct="1">
-                        <a:lnSpc>
-                          <a:spcPct val="100000"/>
-                        </a:lnSpc>
-                        <a:spcBef>
-                          <a:spcPts val="0"/>
-                        </a:spcBef>
-                        <a:spcAft>
-                          <a:spcPts val="0"/>
-                        </a:spcAft>
-                        <a:buClrTx/>
-                        <a:buSzTx/>
-                        <a:buFontTx/>
-                        <a:buNone/>
-                        <a:tabLst/>
-                        <a:defRPr/>
-                      </a:pPr>
-                      <a:r>
-                        <a:rPr lang="en-GB" sz="1100" b="0" baseline="0" dirty="0" smtClean="0">
-                          <a:solidFill>
-                            <a:schemeClr val="tx1"/>
-                          </a:solidFill>
-                          <a:latin typeface="Courier New" pitchFamily="49" charset="0"/>
-                        </a:rPr>
-                        <a:t>bool Animal::</a:t>
-                      </a:r>
-                      <a:r>
-                        <a:rPr lang="en-GB" sz="1100" b="0" baseline="0" dirty="0" err="1" smtClean="0">
-                          <a:solidFill>
-                            <a:schemeClr val="tx1"/>
-                          </a:solidFill>
-                          <a:latin typeface="Courier New" pitchFamily="49" charset="0"/>
-                        </a:rPr>
-                        <a:t>isOK</a:t>
-                      </a:r>
-                      <a:r>
-                        <a:rPr lang="en-GB" sz="1100" b="0" baseline="0" dirty="0" smtClean="0">
-                          <a:solidFill>
-                            <a:schemeClr val="tx1"/>
-                          </a:solidFill>
-                          <a:latin typeface="Courier New" pitchFamily="49" charset="0"/>
-                        </a:rPr>
-                        <a:t>(void)</a:t>
-                      </a:r>
-                    </a:p>
-                    <a:p>
-                      <a:pPr marL="0" marR="0" indent="0" algn="l" defTabSz="914400" rtl="0" eaLnBrk="1" fontAlgn="auto" latinLnBrk="0" hangingPunct="1">
-                        <a:lnSpc>
-                          <a:spcPct val="100000"/>
-                        </a:lnSpc>
-                        <a:spcBef>
-                          <a:spcPts val="0"/>
-                        </a:spcBef>
-                        <a:spcAft>
-                          <a:spcPts val="0"/>
-                        </a:spcAft>
-                        <a:buClrTx/>
-                        <a:buSzTx/>
-                        <a:buFontTx/>
-                        <a:buNone/>
-                        <a:tabLst/>
-                        <a:defRPr/>
-                      </a:pPr>
-                      <a:r>
-                        <a:rPr lang="en-GB" sz="1100" b="0" baseline="0" dirty="0" smtClean="0">
-                          <a:solidFill>
-                            <a:schemeClr val="tx1"/>
-                          </a:solidFill>
-                          <a:latin typeface="Courier New" pitchFamily="49" charset="0"/>
-                        </a:rPr>
-                        <a:t>   throw(</a:t>
-                      </a:r>
-                      <a:r>
-                        <a:rPr lang="en-GB" sz="1100" b="0" baseline="0" dirty="0" err="1" smtClean="0">
-                          <a:solidFill>
-                            <a:schemeClr val="tx1"/>
-                          </a:solidFill>
-                          <a:latin typeface="Courier New" pitchFamily="49" charset="0"/>
-                        </a:rPr>
-                        <a:t>int</a:t>
-                      </a:r>
-                      <a:r>
-                        <a:rPr lang="en-GB" sz="1100" b="0" baseline="0" dirty="0" smtClean="0">
-                          <a:solidFill>
-                            <a:schemeClr val="tx1"/>
-                          </a:solidFill>
-                          <a:latin typeface="Courier New" pitchFamily="49" charset="0"/>
-                        </a:rPr>
-                        <a:t>) { throw 20; };</a:t>
-                      </a:r>
-                      <a:endParaRPr lang="en-US" sz="1100" b="0" baseline="0" dirty="0" smtClean="0">
-                        <a:solidFill>
-                          <a:schemeClr val="tx1"/>
-                        </a:solidFill>
-                        <a:latin typeface="Courier New" pitchFamily="49" charset="0"/>
-                      </a:endParaRPr>
-                    </a:p>
-                  </a:txBody>
-                  <a:tcPr marL="91413" marR="91413" marT="45445" marB="45445">
-                    <a:solidFill>
-                      <a:schemeClr val="bg1">
-                        <a:lumMod val="95000"/>
-                      </a:schemeClr>
-                    </a:solidFill>
-                  </a:tcPr>
-                </a:tc>
-              </a:tr>
-            </a:tbl>
-          </a:graphicData>
-        </a:graphic>
-      </p:graphicFrame>
-      <p:graphicFrame>
-        <p:nvGraphicFramePr>
-          <p:cNvPr id="6" name="Tableau 4"/>
-          <p:cNvGraphicFramePr>
-            <a:graphicFrameLocks noGrp="1"/>
-          </p:cNvGraphicFramePr>
-          <p:nvPr>
-            <p:extLst>
-              <p:ext uri="{D42A27DB-BD31-4B8C-83A1-F6EECF244321}">
-                <p14:modId xmlns:p14="http://schemas.microsoft.com/office/powerpoint/2010/main" val="3122008531"/>
-              </p:ext>
-            </p:extLst>
-          </p:nvPr>
-        </p:nvGraphicFramePr>
-        <p:xfrm>
-          <a:off x="3445644" y="856144"/>
-          <a:ext cx="5312276" cy="3108410"/>
-        </p:xfrm>
-        <a:graphic>
-          <a:graphicData uri="http://schemas.openxmlformats.org/drawingml/2006/table">
-            <a:tbl>
-              <a:tblPr firstRow="1" bandRow="1">
-                <a:tableStyleId>{5C22544A-7EE6-4342-B048-85BDC9FD1C3A}</a:tableStyleId>
-              </a:tblPr>
-              <a:tblGrid>
-                <a:gridCol w="5312276"/>
-              </a:tblGrid>
-              <a:tr h="796366">
-                <a:tc>
-                  <a:txBody>
-                    <a:bodyPr/>
-                    <a:lstStyle/>
-                    <a:p>
-                      <a:pPr marL="0" marR="0" indent="0" algn="l" defTabSz="914400" rtl="0" eaLnBrk="1" fontAlgn="auto" latinLnBrk="0" hangingPunct="1">
-                        <a:lnSpc>
-                          <a:spcPct val="100000"/>
-                        </a:lnSpc>
-                        <a:spcBef>
-                          <a:spcPts val="0"/>
-                        </a:spcBef>
-                        <a:spcAft>
-                          <a:spcPts val="0"/>
-                        </a:spcAft>
-                        <a:buClrTx/>
-                        <a:buSzTx/>
-                        <a:buFontTx/>
-                        <a:buNone/>
-                        <a:tabLst/>
-                        <a:defRPr/>
-                      </a:pPr>
-                      <a:r>
-                        <a:rPr lang="en-GB" sz="1100" b="0" baseline="0" dirty="0" smtClean="0">
-                          <a:solidFill>
-                            <a:schemeClr val="tx1"/>
-                          </a:solidFill>
-                          <a:latin typeface="Courier New" pitchFamily="49" charset="0"/>
-                        </a:rPr>
-                        <a:t>-- </a:t>
-                      </a:r>
-                      <a:r>
-                        <a:rPr lang="en-GB" sz="1100" b="0" baseline="0" dirty="0" err="1" smtClean="0">
-                          <a:solidFill>
-                            <a:schemeClr val="tx1"/>
-                          </a:solidFill>
-                          <a:latin typeface="Courier New" pitchFamily="49" charset="0"/>
-                        </a:rPr>
-                        <a:t>animal_h.ads</a:t>
-                      </a:r>
-                      <a:endParaRPr lang="en-GB" sz="1100" b="0" baseline="0" dirty="0" smtClean="0">
-                        <a:solidFill>
-                          <a:schemeClr val="tx1"/>
-                        </a:solidFill>
-                        <a:latin typeface="Courier New" pitchFamily="49" charset="0"/>
-                      </a:endParaRPr>
-                    </a:p>
-                    <a:p>
-                      <a:pPr marL="0" marR="0" indent="0" algn="l" defTabSz="914400" rtl="0" eaLnBrk="1" fontAlgn="auto" latinLnBrk="0" hangingPunct="1">
-                        <a:lnSpc>
-                          <a:spcPct val="100000"/>
-                        </a:lnSpc>
-                        <a:spcBef>
-                          <a:spcPts val="0"/>
-                        </a:spcBef>
-                        <a:spcAft>
-                          <a:spcPts val="0"/>
-                        </a:spcAft>
-                        <a:buClrTx/>
-                        <a:buSzTx/>
-                        <a:buFontTx/>
-                        <a:buNone/>
-                        <a:tabLst/>
-                        <a:defRPr/>
-                      </a:pPr>
-                      <a:r>
-                        <a:rPr lang="en-GB" sz="1100" b="1" baseline="0" dirty="0" smtClean="0">
-                          <a:solidFill>
-                            <a:schemeClr val="tx1"/>
-                          </a:solidFill>
-                          <a:latin typeface="Courier New" pitchFamily="49" charset="0"/>
-                        </a:rPr>
-                        <a:t>package</a:t>
-                      </a:r>
-                      <a:r>
-                        <a:rPr lang="en-GB" sz="1100" b="0" baseline="0" dirty="0" smtClean="0">
-                          <a:solidFill>
-                            <a:schemeClr val="tx1"/>
-                          </a:solidFill>
-                          <a:latin typeface="Courier New" pitchFamily="49" charset="0"/>
-                        </a:rPr>
-                        <a:t> </a:t>
-                      </a:r>
-                      <a:r>
-                        <a:rPr lang="en-GB" sz="1100" b="0" baseline="0" dirty="0" err="1" smtClean="0">
-                          <a:solidFill>
-                            <a:schemeClr val="tx1"/>
-                          </a:solidFill>
-                          <a:latin typeface="Courier New" pitchFamily="49" charset="0"/>
-                        </a:rPr>
-                        <a:t>animal_h</a:t>
-                      </a:r>
-                      <a:r>
-                        <a:rPr lang="en-GB" sz="1100" b="0" baseline="0" dirty="0" smtClean="0">
-                          <a:solidFill>
-                            <a:schemeClr val="tx1"/>
-                          </a:solidFill>
-                          <a:latin typeface="Courier New" pitchFamily="49" charset="0"/>
-                        </a:rPr>
-                        <a:t> </a:t>
-                      </a:r>
-                      <a:r>
-                        <a:rPr lang="en-GB" sz="1100" b="1" baseline="0" dirty="0" smtClean="0">
-                          <a:solidFill>
-                            <a:schemeClr val="tx1"/>
-                          </a:solidFill>
-                          <a:latin typeface="Courier New" pitchFamily="49" charset="0"/>
-                        </a:rPr>
-                        <a:t>is</a:t>
-                      </a:r>
-                    </a:p>
-                    <a:p>
-                      <a:pPr marL="0" marR="0" indent="0" algn="l" defTabSz="914400" rtl="0" eaLnBrk="1" fontAlgn="auto" latinLnBrk="0" hangingPunct="1">
-                        <a:lnSpc>
-                          <a:spcPct val="100000"/>
-                        </a:lnSpc>
-                        <a:spcBef>
-                          <a:spcPts val="0"/>
-                        </a:spcBef>
-                        <a:spcAft>
-                          <a:spcPts val="0"/>
-                        </a:spcAft>
-                        <a:buClrTx/>
-                        <a:buSzTx/>
-                        <a:buFontTx/>
-                        <a:buNone/>
-                        <a:tabLst/>
-                        <a:defRPr/>
-                      </a:pPr>
-                      <a:endParaRPr lang="en-GB" sz="1100" b="0" baseline="0" dirty="0" smtClean="0">
-                        <a:solidFill>
-                          <a:schemeClr val="tx1"/>
-                        </a:solidFill>
-                        <a:latin typeface="Courier New" pitchFamily="49" charset="0"/>
-                      </a:endParaRPr>
-                    </a:p>
-                    <a:p>
-                      <a:pPr marL="0" marR="0" indent="0" algn="l" defTabSz="914400" rtl="0" eaLnBrk="1" fontAlgn="auto" latinLnBrk="0" hangingPunct="1">
-                        <a:lnSpc>
-                          <a:spcPct val="100000"/>
-                        </a:lnSpc>
-                        <a:spcBef>
-                          <a:spcPts val="0"/>
-                        </a:spcBef>
-                        <a:spcAft>
-                          <a:spcPts val="0"/>
-                        </a:spcAft>
-                        <a:buClrTx/>
-                        <a:buSzTx/>
-                        <a:buFontTx/>
-                        <a:buNone/>
-                        <a:tabLst/>
-                        <a:defRPr/>
-                      </a:pPr>
-                      <a:r>
-                        <a:rPr lang="en-GB" sz="1100" b="0" baseline="0" dirty="0" smtClean="0">
-                          <a:solidFill>
-                            <a:schemeClr val="tx1"/>
-                          </a:solidFill>
-                          <a:latin typeface="Courier New" pitchFamily="49" charset="0"/>
-                        </a:rPr>
-                        <a:t>   </a:t>
-                      </a:r>
-                      <a:r>
-                        <a:rPr lang="en-GB" sz="1100" b="1" baseline="0" dirty="0" smtClean="0">
-                          <a:solidFill>
-                            <a:schemeClr val="tx1"/>
-                          </a:solidFill>
-                          <a:latin typeface="Courier New" pitchFamily="49" charset="0"/>
-                        </a:rPr>
-                        <a:t>package</a:t>
-                      </a:r>
-                      <a:r>
-                        <a:rPr lang="en-GB" sz="1100" b="0" baseline="0" dirty="0" smtClean="0">
-                          <a:solidFill>
-                            <a:schemeClr val="tx1"/>
-                          </a:solidFill>
-                          <a:latin typeface="Courier New" pitchFamily="49" charset="0"/>
-                        </a:rPr>
-                        <a:t> </a:t>
-                      </a:r>
-                      <a:r>
-                        <a:rPr lang="en-GB" sz="1100" b="0" baseline="0" dirty="0" err="1" smtClean="0">
-                          <a:solidFill>
-                            <a:schemeClr val="tx1"/>
-                          </a:solidFill>
-                          <a:latin typeface="Courier New" pitchFamily="49" charset="0"/>
-                        </a:rPr>
-                        <a:t>Class_Animal</a:t>
-                      </a:r>
-                      <a:r>
-                        <a:rPr lang="en-GB" sz="1100" b="0" baseline="0" dirty="0" smtClean="0">
-                          <a:solidFill>
-                            <a:schemeClr val="tx1"/>
-                          </a:solidFill>
-                          <a:latin typeface="Courier New" pitchFamily="49" charset="0"/>
-                        </a:rPr>
-                        <a:t> </a:t>
-                      </a:r>
-                      <a:r>
-                        <a:rPr lang="en-GB" sz="1100" b="1" baseline="0" dirty="0" smtClean="0">
-                          <a:solidFill>
-                            <a:schemeClr val="tx1"/>
-                          </a:solidFill>
-                          <a:latin typeface="Courier New" pitchFamily="49" charset="0"/>
-                        </a:rPr>
-                        <a:t>is</a:t>
-                      </a:r>
-                    </a:p>
-                    <a:p>
-                      <a:pPr marL="0" marR="0" indent="0" algn="l" defTabSz="914400" rtl="0" eaLnBrk="1" fontAlgn="auto" latinLnBrk="0" hangingPunct="1">
-                        <a:lnSpc>
-                          <a:spcPct val="100000"/>
-                        </a:lnSpc>
-                        <a:spcBef>
-                          <a:spcPts val="0"/>
-                        </a:spcBef>
-                        <a:spcAft>
-                          <a:spcPts val="0"/>
-                        </a:spcAft>
-                        <a:buClrTx/>
-                        <a:buSzTx/>
-                        <a:buFontTx/>
-                        <a:buNone/>
-                        <a:tabLst/>
-                        <a:defRPr/>
-                      </a:pPr>
-                      <a:r>
-                        <a:rPr lang="en-GB" sz="1100" b="0" baseline="0" dirty="0" smtClean="0">
-                          <a:solidFill>
-                            <a:schemeClr val="tx1"/>
-                          </a:solidFill>
-                          <a:latin typeface="Courier New" pitchFamily="49" charset="0"/>
-                        </a:rPr>
-                        <a:t>      </a:t>
-                      </a:r>
-                      <a:r>
-                        <a:rPr lang="en-GB" sz="1100" b="1" baseline="0" dirty="0" smtClean="0">
-                          <a:solidFill>
-                            <a:schemeClr val="tx1"/>
-                          </a:solidFill>
-                          <a:latin typeface="Courier New" pitchFamily="49" charset="0"/>
-                        </a:rPr>
-                        <a:t>type</a:t>
-                      </a:r>
-                      <a:r>
-                        <a:rPr lang="en-GB" sz="1100" b="0" baseline="0" dirty="0" smtClean="0">
-                          <a:solidFill>
-                            <a:schemeClr val="tx1"/>
-                          </a:solidFill>
-                          <a:latin typeface="Courier New" pitchFamily="49" charset="0"/>
-                        </a:rPr>
-                        <a:t> Animal </a:t>
-                      </a:r>
-                      <a:r>
-                        <a:rPr lang="en-GB" sz="1100" b="1" baseline="0" dirty="0" smtClean="0">
-                          <a:solidFill>
-                            <a:schemeClr val="tx1"/>
-                          </a:solidFill>
-                          <a:latin typeface="Courier New" pitchFamily="49" charset="0"/>
-                        </a:rPr>
-                        <a:t>is</a:t>
-                      </a:r>
-                      <a:r>
-                        <a:rPr lang="en-GB" sz="1100" b="0" baseline="0" dirty="0" smtClean="0">
-                          <a:solidFill>
-                            <a:schemeClr val="tx1"/>
-                          </a:solidFill>
-                          <a:latin typeface="Courier New" pitchFamily="49" charset="0"/>
-                        </a:rPr>
-                        <a:t> </a:t>
-                      </a:r>
-                      <a:r>
-                        <a:rPr lang="en-GB" sz="1100" b="1" baseline="0" dirty="0" smtClean="0">
-                          <a:solidFill>
-                            <a:schemeClr val="tx1"/>
-                          </a:solidFill>
-                          <a:latin typeface="Courier New" pitchFamily="49" charset="0"/>
-                        </a:rPr>
-                        <a:t>limited</a:t>
-                      </a:r>
-                      <a:r>
-                        <a:rPr lang="en-GB" sz="1100" b="0" baseline="0" dirty="0" smtClean="0">
-                          <a:solidFill>
-                            <a:schemeClr val="tx1"/>
-                          </a:solidFill>
-                          <a:latin typeface="Courier New" pitchFamily="49" charset="0"/>
-                        </a:rPr>
-                        <a:t> </a:t>
-                      </a:r>
-                      <a:r>
-                        <a:rPr lang="en-GB" sz="1100" b="1" baseline="0" dirty="0" smtClean="0">
-                          <a:solidFill>
-                            <a:schemeClr val="tx1"/>
-                          </a:solidFill>
-                          <a:latin typeface="Courier New" pitchFamily="49" charset="0"/>
-                        </a:rPr>
-                        <a:t>record</a:t>
-                      </a:r>
-                    </a:p>
-                    <a:p>
-                      <a:pPr marL="0" marR="0" indent="0" algn="l" defTabSz="914400" rtl="0" eaLnBrk="1" fontAlgn="auto" latinLnBrk="0" hangingPunct="1">
-                        <a:lnSpc>
-                          <a:spcPct val="100000"/>
-                        </a:lnSpc>
-                        <a:spcBef>
-                          <a:spcPts val="0"/>
-                        </a:spcBef>
-                        <a:spcAft>
-                          <a:spcPts val="0"/>
-                        </a:spcAft>
-                        <a:buClrTx/>
-                        <a:buSzTx/>
-                        <a:buFontTx/>
-                        <a:buNone/>
-                        <a:tabLst/>
-                        <a:defRPr/>
-                      </a:pPr>
-                      <a:r>
-                        <a:rPr lang="en-GB" sz="1100" b="0" baseline="0" dirty="0" smtClean="0">
-                          <a:solidFill>
-                            <a:schemeClr val="tx1"/>
-                          </a:solidFill>
-                          <a:latin typeface="Courier New" pitchFamily="49" charset="0"/>
-                        </a:rPr>
-                        <a:t>         </a:t>
-                      </a:r>
-                      <a:r>
-                        <a:rPr lang="en-GB" sz="1100" b="1" baseline="0" dirty="0" smtClean="0">
-                          <a:solidFill>
-                            <a:schemeClr val="tx1"/>
-                          </a:solidFill>
-                          <a:latin typeface="Courier New" pitchFamily="49" charset="0"/>
-                        </a:rPr>
-                        <a:t>null</a:t>
-                      </a:r>
-                      <a:r>
-                        <a:rPr lang="en-GB" sz="1100" b="0" baseline="0" dirty="0" smtClean="0">
-                          <a:solidFill>
-                            <a:schemeClr val="tx1"/>
-                          </a:solidFill>
-                          <a:latin typeface="Courier New" pitchFamily="49" charset="0"/>
-                        </a:rPr>
-                        <a:t>;</a:t>
-                      </a:r>
-                    </a:p>
-                    <a:p>
-                      <a:pPr marL="0" marR="0" indent="0" algn="l" defTabSz="914400" rtl="0" eaLnBrk="1" fontAlgn="auto" latinLnBrk="0" hangingPunct="1">
-                        <a:lnSpc>
-                          <a:spcPct val="100000"/>
-                        </a:lnSpc>
-                        <a:spcBef>
-                          <a:spcPts val="0"/>
-                        </a:spcBef>
-                        <a:spcAft>
-                          <a:spcPts val="0"/>
-                        </a:spcAft>
-                        <a:buClrTx/>
-                        <a:buSzTx/>
-                        <a:buFontTx/>
-                        <a:buNone/>
-                        <a:tabLst/>
-                        <a:defRPr/>
-                      </a:pPr>
-                      <a:r>
-                        <a:rPr lang="en-GB" sz="1100" b="0" baseline="0" dirty="0" smtClean="0">
-                          <a:solidFill>
-                            <a:schemeClr val="tx1"/>
-                          </a:solidFill>
-                          <a:latin typeface="Courier New" pitchFamily="49" charset="0"/>
-                        </a:rPr>
-                        <a:t>      </a:t>
-                      </a:r>
-                      <a:r>
-                        <a:rPr lang="en-GB" sz="1100" b="1" baseline="0" dirty="0" smtClean="0">
-                          <a:solidFill>
-                            <a:schemeClr val="tx1"/>
-                          </a:solidFill>
-                          <a:latin typeface="Courier New" pitchFamily="49" charset="0"/>
-                        </a:rPr>
-                        <a:t>end</a:t>
-                      </a:r>
-                      <a:r>
-                        <a:rPr lang="en-GB" sz="1100" b="0" baseline="0" dirty="0" smtClean="0">
-                          <a:solidFill>
-                            <a:schemeClr val="tx1"/>
-                          </a:solidFill>
-                          <a:latin typeface="Courier New" pitchFamily="49" charset="0"/>
-                        </a:rPr>
-                        <a:t> </a:t>
-                      </a:r>
-                      <a:r>
-                        <a:rPr lang="en-GB" sz="1100" b="1" baseline="0" dirty="0" smtClean="0">
-                          <a:solidFill>
-                            <a:schemeClr val="tx1"/>
-                          </a:solidFill>
-                          <a:latin typeface="Courier New" pitchFamily="49" charset="0"/>
-                        </a:rPr>
-                        <a:t>record</a:t>
-                      </a:r>
-                      <a:r>
-                        <a:rPr lang="en-GB" sz="1100" b="0" baseline="0" dirty="0" smtClean="0">
-                          <a:solidFill>
-                            <a:schemeClr val="tx1"/>
-                          </a:solidFill>
-                          <a:latin typeface="Courier New" pitchFamily="49" charset="0"/>
-                        </a:rPr>
-                        <a:t>;</a:t>
-                      </a:r>
-                    </a:p>
-                    <a:p>
-                      <a:pPr marL="0" marR="0" indent="0" algn="l" defTabSz="914400" rtl="0" eaLnBrk="1" fontAlgn="auto" latinLnBrk="0" hangingPunct="1">
-                        <a:lnSpc>
-                          <a:spcPct val="100000"/>
-                        </a:lnSpc>
-                        <a:spcBef>
-                          <a:spcPts val="0"/>
-                        </a:spcBef>
-                        <a:spcAft>
-                          <a:spcPts val="0"/>
-                        </a:spcAft>
-                        <a:buClrTx/>
-                        <a:buSzTx/>
-                        <a:buFontTx/>
-                        <a:buNone/>
-                        <a:tabLst/>
-                        <a:defRPr/>
-                      </a:pPr>
-                      <a:r>
-                        <a:rPr lang="en-GB" sz="1100" b="0" baseline="0" dirty="0" smtClean="0">
-                          <a:solidFill>
-                            <a:schemeClr val="tx1"/>
-                          </a:solidFill>
-                          <a:latin typeface="Courier New" pitchFamily="49" charset="0"/>
-                        </a:rPr>
-                        <a:t>      </a:t>
-                      </a:r>
-                      <a:r>
-                        <a:rPr lang="en-GB" sz="1100" b="1" baseline="0" dirty="0" smtClean="0">
-                          <a:solidFill>
-                            <a:schemeClr val="tx1"/>
-                          </a:solidFill>
-                          <a:latin typeface="Courier New" pitchFamily="49" charset="0"/>
-                        </a:rPr>
-                        <a:t>pragma</a:t>
-                      </a:r>
-                      <a:r>
-                        <a:rPr lang="en-GB" sz="1100" b="0" baseline="0" dirty="0" smtClean="0">
-                          <a:solidFill>
-                            <a:schemeClr val="tx1"/>
-                          </a:solidFill>
-                          <a:latin typeface="Courier New" pitchFamily="49" charset="0"/>
-                        </a:rPr>
-                        <a:t> Import (CPP, Animal);</a:t>
-                      </a:r>
-                    </a:p>
-                    <a:p>
-                      <a:pPr marL="0" marR="0" indent="0" algn="l" defTabSz="914400" rtl="0" eaLnBrk="1" fontAlgn="auto" latinLnBrk="0" hangingPunct="1">
-                        <a:lnSpc>
-                          <a:spcPct val="100000"/>
-                        </a:lnSpc>
-                        <a:spcBef>
-                          <a:spcPts val="0"/>
-                        </a:spcBef>
-                        <a:spcAft>
-                          <a:spcPts val="0"/>
-                        </a:spcAft>
-                        <a:buClrTx/>
-                        <a:buSzTx/>
-                        <a:buFontTx/>
-                        <a:buNone/>
-                        <a:tabLst/>
-                        <a:defRPr/>
-                      </a:pPr>
-                      <a:endParaRPr lang="en-GB" sz="1100" b="0" baseline="0" dirty="0" smtClean="0">
-                        <a:solidFill>
-                          <a:schemeClr val="tx1"/>
-                        </a:solidFill>
-                        <a:latin typeface="Courier New" pitchFamily="49" charset="0"/>
-                      </a:endParaRPr>
-                    </a:p>
-                    <a:p>
-                      <a:pPr marL="0" marR="0" indent="0" algn="l" defTabSz="914400" rtl="0" eaLnBrk="1" fontAlgn="auto" latinLnBrk="0" hangingPunct="1">
-                        <a:lnSpc>
-                          <a:spcPct val="100000"/>
-                        </a:lnSpc>
-                        <a:spcBef>
-                          <a:spcPts val="0"/>
-                        </a:spcBef>
-                        <a:spcAft>
-                          <a:spcPts val="0"/>
-                        </a:spcAft>
-                        <a:buClrTx/>
-                        <a:buSzTx/>
-                        <a:buFontTx/>
-                        <a:buNone/>
-                        <a:tabLst/>
-                        <a:defRPr/>
-                      </a:pPr>
-                      <a:r>
-                        <a:rPr lang="en-GB" sz="1100" b="0" baseline="0" dirty="0" smtClean="0">
-                          <a:solidFill>
-                            <a:schemeClr val="tx1"/>
-                          </a:solidFill>
-                          <a:latin typeface="Courier New" pitchFamily="49" charset="0"/>
-                        </a:rPr>
-                        <a:t>      </a:t>
-                      </a:r>
-                      <a:r>
-                        <a:rPr lang="en-GB" sz="1100" b="1" baseline="0" dirty="0" smtClean="0">
-                          <a:solidFill>
-                            <a:schemeClr val="tx1"/>
-                          </a:solidFill>
-                          <a:latin typeface="Courier New" pitchFamily="49" charset="0"/>
-                        </a:rPr>
-                        <a:t>function</a:t>
-                      </a:r>
-                      <a:r>
-                        <a:rPr lang="en-GB" sz="1100" b="0" baseline="0" dirty="0" smtClean="0">
-                          <a:solidFill>
-                            <a:schemeClr val="tx1"/>
-                          </a:solidFill>
-                          <a:latin typeface="Courier New" pitchFamily="49" charset="0"/>
-                        </a:rPr>
-                        <a:t> </a:t>
-                      </a:r>
-                      <a:r>
-                        <a:rPr lang="en-GB" sz="1100" b="0" baseline="0" dirty="0" err="1" smtClean="0">
-                          <a:solidFill>
-                            <a:schemeClr val="tx1"/>
-                          </a:solidFill>
-                          <a:latin typeface="Courier New" pitchFamily="49" charset="0"/>
-                        </a:rPr>
-                        <a:t>New_Animal</a:t>
-                      </a:r>
-                      <a:r>
-                        <a:rPr lang="en-GB" sz="1100" b="0" baseline="0" dirty="0" smtClean="0">
-                          <a:solidFill>
-                            <a:schemeClr val="tx1"/>
-                          </a:solidFill>
-                          <a:latin typeface="Courier New" pitchFamily="49" charset="0"/>
-                        </a:rPr>
-                        <a:t> </a:t>
-                      </a:r>
-                      <a:r>
-                        <a:rPr lang="en-GB" sz="1100" b="1" baseline="0" dirty="0" smtClean="0">
-                          <a:solidFill>
-                            <a:schemeClr val="tx1"/>
-                          </a:solidFill>
-                          <a:latin typeface="Courier New" pitchFamily="49" charset="0"/>
-                        </a:rPr>
-                        <a:t>return</a:t>
-                      </a:r>
-                      <a:r>
-                        <a:rPr lang="en-GB" sz="1100" b="0" baseline="0" dirty="0" smtClean="0">
-                          <a:solidFill>
-                            <a:schemeClr val="tx1"/>
-                          </a:solidFill>
-                          <a:latin typeface="Courier New" pitchFamily="49" charset="0"/>
-                        </a:rPr>
-                        <a:t> Animal;</a:t>
-                      </a:r>
-                    </a:p>
-                    <a:p>
-                      <a:pPr marL="0" marR="0" indent="0" algn="l" defTabSz="914400" rtl="0" eaLnBrk="1" fontAlgn="auto" latinLnBrk="0" hangingPunct="1">
-                        <a:lnSpc>
-                          <a:spcPct val="100000"/>
-                        </a:lnSpc>
-                        <a:spcBef>
-                          <a:spcPts val="0"/>
-                        </a:spcBef>
-                        <a:spcAft>
-                          <a:spcPts val="0"/>
-                        </a:spcAft>
-                        <a:buClrTx/>
-                        <a:buSzTx/>
-                        <a:buFontTx/>
-                        <a:buNone/>
-                        <a:tabLst/>
-                        <a:defRPr/>
-                      </a:pPr>
-                      <a:r>
-                        <a:rPr lang="en-GB" sz="1100" b="0" baseline="0" dirty="0" smtClean="0">
-                          <a:solidFill>
-                            <a:schemeClr val="tx1"/>
-                          </a:solidFill>
-                          <a:latin typeface="Courier New" pitchFamily="49" charset="0"/>
-                        </a:rPr>
-                        <a:t>      </a:t>
-                      </a:r>
-                      <a:r>
-                        <a:rPr lang="en-GB" sz="1100" b="1" baseline="0" dirty="0" smtClean="0">
-                          <a:solidFill>
-                            <a:schemeClr val="tx1"/>
-                          </a:solidFill>
-                          <a:latin typeface="Courier New" pitchFamily="49" charset="0"/>
-                        </a:rPr>
-                        <a:t>pragma</a:t>
-                      </a:r>
-                      <a:r>
-                        <a:rPr lang="en-GB" sz="1100" b="0" baseline="0" dirty="0" smtClean="0">
-                          <a:solidFill>
-                            <a:schemeClr val="tx1"/>
-                          </a:solidFill>
-                          <a:latin typeface="Courier New" pitchFamily="49" charset="0"/>
-                        </a:rPr>
-                        <a:t> </a:t>
-                      </a:r>
-                      <a:r>
-                        <a:rPr lang="en-GB" sz="1100" b="0" baseline="0" dirty="0" err="1" smtClean="0">
-                          <a:solidFill>
-                            <a:schemeClr val="tx1"/>
-                          </a:solidFill>
-                          <a:latin typeface="Courier New" pitchFamily="49" charset="0"/>
-                        </a:rPr>
-                        <a:t>CPP_Constructor</a:t>
-                      </a:r>
-                      <a:r>
-                        <a:rPr lang="en-GB" sz="1100" b="0" baseline="0" dirty="0" smtClean="0">
-                          <a:solidFill>
-                            <a:schemeClr val="tx1"/>
-                          </a:solidFill>
-                          <a:latin typeface="Courier New" pitchFamily="49" charset="0"/>
-                        </a:rPr>
-                        <a:t> (</a:t>
-                      </a:r>
-                      <a:r>
-                        <a:rPr lang="en-GB" sz="1100" b="0" baseline="0" dirty="0" err="1" smtClean="0">
-                          <a:solidFill>
-                            <a:schemeClr val="tx1"/>
-                          </a:solidFill>
-                          <a:latin typeface="Courier New" pitchFamily="49" charset="0"/>
-                        </a:rPr>
-                        <a:t>New_Animal</a:t>
-                      </a:r>
-                      <a:r>
-                        <a:rPr lang="en-GB" sz="1100" b="0" baseline="0" dirty="0" smtClean="0">
-                          <a:solidFill>
-                            <a:schemeClr val="tx1"/>
-                          </a:solidFill>
-                          <a:latin typeface="Courier New" pitchFamily="49" charset="0"/>
-                        </a:rPr>
-                        <a:t>, "_ZN6AnimalC1Ev");</a:t>
-                      </a:r>
-                    </a:p>
-                    <a:p>
-                      <a:pPr marL="0" marR="0" indent="0" algn="l" defTabSz="914400" rtl="0" eaLnBrk="1" fontAlgn="auto" latinLnBrk="0" hangingPunct="1">
-                        <a:lnSpc>
-                          <a:spcPct val="100000"/>
-                        </a:lnSpc>
-                        <a:spcBef>
-                          <a:spcPts val="0"/>
-                        </a:spcBef>
-                        <a:spcAft>
-                          <a:spcPts val="0"/>
-                        </a:spcAft>
-                        <a:buClrTx/>
-                        <a:buSzTx/>
-                        <a:buFontTx/>
-                        <a:buNone/>
-                        <a:tabLst/>
-                        <a:defRPr/>
-                      </a:pPr>
-                      <a:endParaRPr lang="en-GB" sz="1100" b="0" baseline="0" dirty="0" smtClean="0">
-                        <a:solidFill>
-                          <a:schemeClr val="tx1"/>
-                        </a:solidFill>
-                        <a:latin typeface="Courier New" pitchFamily="49" charset="0"/>
-                      </a:endParaRPr>
-                    </a:p>
-                    <a:p>
-                      <a:pPr marL="0" marR="0" indent="0" algn="l" defTabSz="914400" rtl="0" eaLnBrk="1" fontAlgn="auto" latinLnBrk="0" hangingPunct="1">
-                        <a:lnSpc>
-                          <a:spcPct val="100000"/>
-                        </a:lnSpc>
-                        <a:spcBef>
-                          <a:spcPts val="0"/>
-                        </a:spcBef>
-                        <a:spcAft>
-                          <a:spcPts val="0"/>
-                        </a:spcAft>
-                        <a:buClrTx/>
-                        <a:buSzTx/>
-                        <a:buFontTx/>
-                        <a:buNone/>
-                        <a:tabLst/>
-                        <a:defRPr/>
-                      </a:pPr>
-                      <a:r>
-                        <a:rPr lang="en-GB" sz="1100" b="0" baseline="0" dirty="0" smtClean="0">
-                          <a:solidFill>
-                            <a:schemeClr val="tx1"/>
-                          </a:solidFill>
-                          <a:latin typeface="Courier New" pitchFamily="49" charset="0"/>
-                        </a:rPr>
-                        <a:t>      </a:t>
-                      </a:r>
-                      <a:r>
-                        <a:rPr lang="en-GB" sz="1100" b="1" baseline="0" dirty="0" smtClean="0">
-                          <a:solidFill>
-                            <a:schemeClr val="tx1"/>
-                          </a:solidFill>
-                          <a:latin typeface="Courier New" pitchFamily="49" charset="0"/>
-                        </a:rPr>
-                        <a:t>function</a:t>
-                      </a:r>
-                      <a:r>
-                        <a:rPr lang="en-GB" sz="1100" b="0" baseline="0" dirty="0" smtClean="0">
-                          <a:solidFill>
-                            <a:schemeClr val="tx1"/>
-                          </a:solidFill>
-                          <a:latin typeface="Courier New" pitchFamily="49" charset="0"/>
-                        </a:rPr>
-                        <a:t> </a:t>
-                      </a:r>
-                      <a:r>
-                        <a:rPr lang="en-GB" sz="1100" b="0" baseline="0" dirty="0" err="1" smtClean="0">
-                          <a:solidFill>
-                            <a:schemeClr val="tx1"/>
-                          </a:solidFill>
-                          <a:latin typeface="Courier New" pitchFamily="49" charset="0"/>
-                        </a:rPr>
-                        <a:t>isOK</a:t>
-                      </a:r>
-                      <a:r>
-                        <a:rPr lang="en-GB" sz="1100" b="0" baseline="0" dirty="0" smtClean="0">
-                          <a:solidFill>
-                            <a:schemeClr val="tx1"/>
-                          </a:solidFill>
-                          <a:latin typeface="Courier New" pitchFamily="49" charset="0"/>
-                        </a:rPr>
-                        <a:t> (this : </a:t>
-                      </a:r>
-                      <a:r>
-                        <a:rPr lang="en-GB" sz="1100" b="1" baseline="0" dirty="0" smtClean="0">
-                          <a:solidFill>
-                            <a:schemeClr val="tx1"/>
-                          </a:solidFill>
-                          <a:latin typeface="Courier New" pitchFamily="49" charset="0"/>
-                        </a:rPr>
-                        <a:t>access</a:t>
-                      </a:r>
-                      <a:r>
-                        <a:rPr lang="en-GB" sz="1100" b="0" baseline="0" dirty="0" smtClean="0">
-                          <a:solidFill>
-                            <a:schemeClr val="tx1"/>
-                          </a:solidFill>
-                          <a:latin typeface="Courier New" pitchFamily="49" charset="0"/>
-                        </a:rPr>
-                        <a:t> Animal)</a:t>
-                      </a:r>
-                    </a:p>
-                    <a:p>
-                      <a:pPr marL="0" marR="0" indent="0" algn="l" defTabSz="914400" rtl="0" eaLnBrk="1" fontAlgn="auto" latinLnBrk="0" hangingPunct="1">
-                        <a:lnSpc>
-                          <a:spcPct val="100000"/>
-                        </a:lnSpc>
-                        <a:spcBef>
-                          <a:spcPts val="0"/>
-                        </a:spcBef>
-                        <a:spcAft>
-                          <a:spcPts val="0"/>
-                        </a:spcAft>
-                        <a:buClrTx/>
-                        <a:buSzTx/>
-                        <a:buFontTx/>
-                        <a:buNone/>
-                        <a:tabLst/>
-                        <a:defRPr/>
-                      </a:pPr>
-                      <a:r>
-                        <a:rPr lang="en-GB" sz="1100" b="0" baseline="0" dirty="0" smtClean="0">
-                          <a:solidFill>
-                            <a:schemeClr val="tx1"/>
-                          </a:solidFill>
-                          <a:latin typeface="Courier New" pitchFamily="49" charset="0"/>
-                        </a:rPr>
-                        <a:t>         </a:t>
-                      </a:r>
-                      <a:r>
-                        <a:rPr lang="en-GB" sz="1100" b="1" baseline="0" dirty="0" smtClean="0">
-                          <a:solidFill>
-                            <a:schemeClr val="tx1"/>
-                          </a:solidFill>
-                          <a:latin typeface="Courier New" pitchFamily="49" charset="0"/>
-                        </a:rPr>
-                        <a:t>return</a:t>
-                      </a:r>
-                      <a:r>
-                        <a:rPr lang="en-GB" sz="1100" b="0" baseline="0" dirty="0" smtClean="0">
-                          <a:solidFill>
-                            <a:schemeClr val="tx1"/>
-                          </a:solidFill>
-                          <a:latin typeface="Courier New" pitchFamily="49" charset="0"/>
-                        </a:rPr>
-                        <a:t> </a:t>
-                      </a:r>
-                      <a:r>
-                        <a:rPr lang="en-GB" sz="1100" b="0" baseline="0" dirty="0" err="1" smtClean="0">
-                          <a:solidFill>
-                            <a:schemeClr val="tx1"/>
-                          </a:solidFill>
-                          <a:latin typeface="Courier New" pitchFamily="49" charset="0"/>
-                        </a:rPr>
-                        <a:t>Extensions.bool</a:t>
-                      </a:r>
-                      <a:r>
-                        <a:rPr lang="en-GB" sz="1100" b="0" baseline="0" dirty="0" smtClean="0">
-                          <a:solidFill>
-                            <a:schemeClr val="tx1"/>
-                          </a:solidFill>
-                          <a:latin typeface="Courier New" pitchFamily="49" charset="0"/>
-                        </a:rPr>
-                        <a:t>;</a:t>
-                      </a:r>
-                    </a:p>
-                    <a:p>
-                      <a:pPr marL="0" marR="0" indent="0" algn="l" defTabSz="914400" rtl="0" eaLnBrk="1" fontAlgn="auto" latinLnBrk="0" hangingPunct="1">
-                        <a:lnSpc>
-                          <a:spcPct val="100000"/>
-                        </a:lnSpc>
-                        <a:spcBef>
-                          <a:spcPts val="0"/>
-                        </a:spcBef>
-                        <a:spcAft>
-                          <a:spcPts val="0"/>
-                        </a:spcAft>
-                        <a:buClrTx/>
-                        <a:buSzTx/>
-                        <a:buFontTx/>
-                        <a:buNone/>
-                        <a:tabLst/>
-                        <a:defRPr/>
-                      </a:pPr>
-                      <a:r>
-                        <a:rPr lang="en-GB" sz="1100" b="0" baseline="0" dirty="0" smtClean="0">
-                          <a:solidFill>
-                            <a:schemeClr val="tx1"/>
-                          </a:solidFill>
-                          <a:latin typeface="Courier New" pitchFamily="49" charset="0"/>
-                        </a:rPr>
-                        <a:t>      </a:t>
-                      </a:r>
-                      <a:r>
-                        <a:rPr lang="en-GB" sz="1100" b="1" baseline="0" dirty="0" smtClean="0">
-                          <a:solidFill>
-                            <a:schemeClr val="tx1"/>
-                          </a:solidFill>
-                          <a:latin typeface="Courier New" pitchFamily="49" charset="0"/>
-                        </a:rPr>
-                        <a:t>pragma</a:t>
-                      </a:r>
-                      <a:r>
-                        <a:rPr lang="en-GB" sz="1100" b="0" baseline="0" dirty="0" smtClean="0">
-                          <a:solidFill>
-                            <a:schemeClr val="tx1"/>
-                          </a:solidFill>
-                          <a:latin typeface="Courier New" pitchFamily="49" charset="0"/>
-                        </a:rPr>
-                        <a:t> Import (CPP, </a:t>
-                      </a:r>
-                      <a:r>
-                        <a:rPr lang="en-GB" sz="1100" b="0" baseline="0" dirty="0" err="1" smtClean="0">
-                          <a:solidFill>
-                            <a:schemeClr val="tx1"/>
-                          </a:solidFill>
-                          <a:latin typeface="Courier New" pitchFamily="49" charset="0"/>
-                        </a:rPr>
-                        <a:t>isOK</a:t>
-                      </a:r>
-                      <a:r>
-                        <a:rPr lang="en-GB" sz="1100" b="0" baseline="0" dirty="0" smtClean="0">
-                          <a:solidFill>
-                            <a:schemeClr val="tx1"/>
-                          </a:solidFill>
-                          <a:latin typeface="Courier New" pitchFamily="49" charset="0"/>
-                        </a:rPr>
-                        <a:t>, "_ZN6Animal4isOKEv");</a:t>
-                      </a:r>
-                    </a:p>
-                    <a:p>
-                      <a:pPr marL="0" marR="0" indent="0" algn="l" defTabSz="914400" rtl="0" eaLnBrk="1" fontAlgn="auto" latinLnBrk="0" hangingPunct="1">
-                        <a:lnSpc>
-                          <a:spcPct val="100000"/>
-                        </a:lnSpc>
-                        <a:spcBef>
-                          <a:spcPts val="0"/>
-                        </a:spcBef>
-                        <a:spcAft>
-                          <a:spcPts val="0"/>
-                        </a:spcAft>
-                        <a:buClrTx/>
-                        <a:buSzTx/>
-                        <a:buFontTx/>
-                        <a:buNone/>
-                        <a:tabLst/>
-                        <a:defRPr/>
-                      </a:pPr>
-                      <a:r>
-                        <a:rPr lang="en-GB" sz="1100" b="0" baseline="0" dirty="0" smtClean="0">
-                          <a:solidFill>
-                            <a:schemeClr val="tx1"/>
-                          </a:solidFill>
-                          <a:latin typeface="Courier New" pitchFamily="49" charset="0"/>
-                        </a:rPr>
-                        <a:t>   </a:t>
-                      </a:r>
-                      <a:r>
-                        <a:rPr lang="en-GB" sz="1100" b="1" baseline="0" dirty="0" smtClean="0">
-                          <a:solidFill>
-                            <a:schemeClr val="tx1"/>
-                          </a:solidFill>
-                          <a:latin typeface="Courier New" pitchFamily="49" charset="0"/>
-                        </a:rPr>
-                        <a:t>end</a:t>
-                      </a:r>
-                      <a:r>
-                        <a:rPr lang="en-GB" sz="1100" b="0" baseline="0" dirty="0" smtClean="0">
-                          <a:solidFill>
-                            <a:schemeClr val="tx1"/>
-                          </a:solidFill>
-                          <a:latin typeface="Courier New" pitchFamily="49" charset="0"/>
-                        </a:rPr>
-                        <a:t>;</a:t>
-                      </a:r>
-                    </a:p>
-                    <a:p>
-                      <a:pPr marL="0" marR="0" indent="0" algn="l" defTabSz="914400" rtl="0" eaLnBrk="1" fontAlgn="auto" latinLnBrk="0" hangingPunct="1">
-                        <a:lnSpc>
-                          <a:spcPct val="100000"/>
-                        </a:lnSpc>
-                        <a:spcBef>
-                          <a:spcPts val="0"/>
-                        </a:spcBef>
-                        <a:spcAft>
-                          <a:spcPts val="0"/>
-                        </a:spcAft>
-                        <a:buClrTx/>
-                        <a:buSzTx/>
-                        <a:buFontTx/>
-                        <a:buNone/>
-                        <a:tabLst/>
-                        <a:defRPr/>
-                      </a:pPr>
-                      <a:r>
-                        <a:rPr lang="en-GB" sz="1100" b="0" baseline="0" dirty="0" smtClean="0">
-                          <a:solidFill>
-                            <a:schemeClr val="tx1"/>
-                          </a:solidFill>
-                          <a:latin typeface="Courier New" pitchFamily="49" charset="0"/>
-                        </a:rPr>
-                        <a:t>   </a:t>
-                      </a:r>
-                      <a:r>
-                        <a:rPr lang="en-GB" sz="1100" b="1" baseline="0" dirty="0" smtClean="0">
-                          <a:solidFill>
-                            <a:schemeClr val="tx1"/>
-                          </a:solidFill>
-                          <a:latin typeface="Courier New" pitchFamily="49" charset="0"/>
-                        </a:rPr>
-                        <a:t>use</a:t>
-                      </a:r>
-                      <a:r>
-                        <a:rPr lang="en-GB" sz="1100" b="0" baseline="0" dirty="0" smtClean="0">
-                          <a:solidFill>
-                            <a:schemeClr val="tx1"/>
-                          </a:solidFill>
-                          <a:latin typeface="Courier New" pitchFamily="49" charset="0"/>
-                        </a:rPr>
-                        <a:t> </a:t>
-                      </a:r>
-                      <a:r>
-                        <a:rPr lang="en-GB" sz="1100" b="0" baseline="0" dirty="0" err="1" smtClean="0">
-                          <a:solidFill>
-                            <a:schemeClr val="tx1"/>
-                          </a:solidFill>
-                          <a:latin typeface="Courier New" pitchFamily="49" charset="0"/>
-                        </a:rPr>
-                        <a:t>Class_Animal</a:t>
-                      </a:r>
-                      <a:r>
-                        <a:rPr lang="en-GB" sz="1100" b="0" baseline="0" dirty="0" smtClean="0">
-                          <a:solidFill>
-                            <a:schemeClr val="tx1"/>
-                          </a:solidFill>
-                          <a:latin typeface="Courier New" pitchFamily="49" charset="0"/>
-                        </a:rPr>
-                        <a:t>;</a:t>
-                      </a:r>
-                    </a:p>
-                    <a:p>
-                      <a:pPr marL="0" marR="0" indent="0" algn="l" defTabSz="914400" rtl="0" eaLnBrk="1" fontAlgn="auto" latinLnBrk="0" hangingPunct="1">
-                        <a:lnSpc>
-                          <a:spcPct val="100000"/>
-                        </a:lnSpc>
-                        <a:spcBef>
-                          <a:spcPts val="0"/>
-                        </a:spcBef>
-                        <a:spcAft>
-                          <a:spcPts val="0"/>
-                        </a:spcAft>
-                        <a:buClrTx/>
-                        <a:buSzTx/>
-                        <a:buFontTx/>
-                        <a:buNone/>
-                        <a:tabLst/>
-                        <a:defRPr/>
-                      </a:pPr>
-                      <a:r>
-                        <a:rPr lang="en-GB" sz="1100" b="1" baseline="0" dirty="0" smtClean="0">
-                          <a:solidFill>
-                            <a:schemeClr val="tx1"/>
-                          </a:solidFill>
-                          <a:latin typeface="Courier New" pitchFamily="49" charset="0"/>
-                        </a:rPr>
-                        <a:t>end</a:t>
-                      </a:r>
-                      <a:r>
-                        <a:rPr lang="en-GB" sz="1100" b="0" baseline="0" dirty="0" smtClean="0">
-                          <a:solidFill>
-                            <a:schemeClr val="tx1"/>
-                          </a:solidFill>
-                          <a:latin typeface="Courier New" pitchFamily="49" charset="0"/>
-                        </a:rPr>
-                        <a:t> </a:t>
-                      </a:r>
-                      <a:r>
-                        <a:rPr lang="en-GB" sz="1100" b="0" baseline="0" dirty="0" err="1" smtClean="0">
-                          <a:solidFill>
-                            <a:schemeClr val="tx1"/>
-                          </a:solidFill>
-                          <a:latin typeface="Courier New" pitchFamily="49" charset="0"/>
-                        </a:rPr>
-                        <a:t>animal_h</a:t>
-                      </a:r>
-                      <a:r>
-                        <a:rPr lang="en-GB" sz="1100" b="0" baseline="0" dirty="0" smtClean="0">
-                          <a:solidFill>
-                            <a:schemeClr val="tx1"/>
-                          </a:solidFill>
-                          <a:latin typeface="Courier New" pitchFamily="49" charset="0"/>
-                        </a:rPr>
-                        <a:t>;</a:t>
                       </a:r>
                       <a:endParaRPr lang="en-US" sz="1100" b="0" baseline="0" dirty="0" smtClean="0">
                         <a:solidFill>
@@ -24580,14 +23995,14 @@
           <p:nvPr>
             <p:extLst>
               <p:ext uri="{D42A27DB-BD31-4B8C-83A1-F6EECF244321}">
-                <p14:modId xmlns:p14="http://schemas.microsoft.com/office/powerpoint/2010/main" val="2669547027"/>
+                <p14:modId xmlns:p14="http://schemas.microsoft.com/office/powerpoint/2010/main" val="3090742841"/>
               </p:ext>
             </p:extLst>
           </p:nvPr>
         </p:nvGraphicFramePr>
         <p:xfrm>
-          <a:off x="1926724" y="4052148"/>
-          <a:ext cx="5312276" cy="2437850"/>
+          <a:off x="1915862" y="2486025"/>
+          <a:ext cx="5312276" cy="2771775"/>
         </p:xfrm>
         <a:graphic>
           <a:graphicData uri="http://schemas.openxmlformats.org/drawingml/2006/table">
@@ -24598,66 +24013,11 @@
               <a:tblGrid>
                 <a:gridCol w="5312276"/>
               </a:tblGrid>
-              <a:tr h="796366">
+              <a:tr h="2771775">
                 <a:tc>
                   <a:txBody>
                     <a:bodyPr/>
                     <a:lstStyle/>
-                    <a:p>
-                      <a:pPr marL="0" marR="0" indent="0" algn="l" defTabSz="914400" rtl="0" eaLnBrk="1" fontAlgn="auto" latinLnBrk="0" hangingPunct="1">
-                        <a:lnSpc>
-                          <a:spcPct val="100000"/>
-                        </a:lnSpc>
-                        <a:spcBef>
-                          <a:spcPts val="0"/>
-                        </a:spcBef>
-                        <a:spcAft>
-                          <a:spcPts val="0"/>
-                        </a:spcAft>
-                        <a:buClrTx/>
-                        <a:buSzTx/>
-                        <a:buFontTx/>
-                        <a:buNone/>
-                        <a:tabLst/>
-                        <a:defRPr/>
-                      </a:pPr>
-                      <a:r>
-                        <a:rPr lang="en-GB" sz="1100" b="1" baseline="0" dirty="0" smtClean="0">
-                          <a:solidFill>
-                            <a:schemeClr val="tx1"/>
-                          </a:solidFill>
-                          <a:latin typeface="Courier New" pitchFamily="49" charset="0"/>
-                        </a:rPr>
-                        <a:t>with</a:t>
-                      </a:r>
-                      <a:r>
-                        <a:rPr lang="en-GB" sz="1100" b="0" baseline="0" dirty="0" smtClean="0">
-                          <a:solidFill>
-                            <a:schemeClr val="tx1"/>
-                          </a:solidFill>
-                          <a:latin typeface="Courier New" pitchFamily="49" charset="0"/>
-                        </a:rPr>
-                        <a:t> </a:t>
-                      </a:r>
-                      <a:r>
-                        <a:rPr lang="en-GB" sz="1100" b="0" baseline="0" dirty="0" err="1" smtClean="0">
-                          <a:solidFill>
-                            <a:schemeClr val="tx1"/>
-                          </a:solidFill>
-                          <a:latin typeface="Courier New" pitchFamily="49" charset="0"/>
-                        </a:rPr>
-                        <a:t>animal_h</a:t>
-                      </a:r>
-                      <a:r>
-                        <a:rPr lang="en-GB" sz="1100" b="0" baseline="0" dirty="0" smtClean="0">
-                          <a:solidFill>
-                            <a:schemeClr val="tx1"/>
-                          </a:solidFill>
-                          <a:latin typeface="Courier New" pitchFamily="49" charset="0"/>
-                        </a:rPr>
-                        <a:t>;</a:t>
-                      </a:r>
-                    </a:p>
                     <a:p>
                       <a:pPr marL="0" marR="0" indent="0" algn="l" defTabSz="914400" rtl="0" eaLnBrk="1" fontAlgn="auto" latinLnBrk="0" hangingPunct="1">
                         <a:lnSpc>
@@ -24873,7 +24233,7 @@
                           </a:solidFill>
                           <a:latin typeface="Courier New" pitchFamily="49" charset="0"/>
                         </a:rPr>
-                        <a:t>use</a:t>
+                        <a:t>function</a:t>
                       </a:r>
                       <a:r>
                         <a:rPr lang="en-GB" sz="1100" b="0" baseline="0" dirty="0" smtClean="0">
@@ -24891,7 +24251,43 @@
                           </a:solidFill>
                           <a:latin typeface="Courier New" pitchFamily="49" charset="0"/>
                         </a:rPr>
-                        <a:t>animal_h.Class_Animal</a:t>
+                        <a:t>IsOK</a:t>
+                      </a:r>
+                      <a:r>
+                        <a:rPr lang="en-GB" sz="1100" b="0" baseline="0" dirty="0" smtClean="0">
+                          <a:solidFill>
+                            <a:schemeClr val="tx1"/>
+                          </a:solidFill>
+                          <a:latin typeface="Courier New" pitchFamily="49" charset="0"/>
+                        </a:rPr>
+                        <a:t> </a:t>
+                      </a:r>
+                      <a:r>
+                        <a:rPr lang="en-GB" sz="1100" b="1" baseline="0" dirty="0" smtClean="0">
+                          <a:solidFill>
+                            <a:schemeClr val="tx1"/>
+                          </a:solidFill>
+                          <a:latin typeface="Courier New" pitchFamily="49" charset="0"/>
+                        </a:rPr>
+                        <a:t>return</a:t>
+                      </a:r>
+                      <a:r>
+                        <a:rPr lang="en-GB" sz="1100" b="0" baseline="0" dirty="0" smtClean="0">
+                          <a:solidFill>
+                            <a:schemeClr val="tx1"/>
+                          </a:solidFill>
+                          <a:latin typeface="Courier New" pitchFamily="49" charset="0"/>
+                        </a:rPr>
+                        <a:t> </a:t>
+                      </a:r>
+                      <a:r>
+                        <a:rPr lang="en-GB" sz="1100" b="0" baseline="0" dirty="0" err="1" smtClean="0">
+                          <a:solidFill>
+                            <a:schemeClr val="tx1"/>
+                          </a:solidFill>
+                          <a:latin typeface="Courier New" pitchFamily="49" charset="0"/>
+                        </a:rPr>
+                        <a:t>Interfaces.C.Extensions.Bool</a:t>
                       </a:r>
                       <a:r>
                         <a:rPr lang="en-GB" sz="1100" b="0" baseline="0" dirty="0" smtClean="0">
@@ -24931,23 +24327,115 @@
                         <a:t>   </a:t>
                       </a:r>
                       <a:r>
+                        <a:rPr lang="en-GB" sz="1100" b="1" baseline="0" dirty="0" smtClean="0">
+                          <a:solidFill>
+                            <a:schemeClr val="tx1"/>
+                          </a:solidFill>
+                          <a:latin typeface="Courier New" pitchFamily="49" charset="0"/>
+                        </a:rPr>
+                        <a:t>pragma</a:t>
+                      </a:r>
+                      <a:r>
+                        <a:rPr lang="en-GB" sz="1100" b="0" baseline="0" dirty="0" smtClean="0">
+                          <a:solidFill>
+                            <a:schemeClr val="tx1"/>
+                          </a:solidFill>
+                          <a:latin typeface="Courier New" pitchFamily="49" charset="0"/>
+                        </a:rPr>
+                        <a:t> Import (CPP, </a:t>
+                      </a:r>
+                      <a:r>
                         <a:rPr lang="en-GB" sz="1100" b="0" baseline="0" dirty="0" err="1" smtClean="0">
                           <a:solidFill>
                             <a:schemeClr val="tx1"/>
                           </a:solidFill>
                           <a:latin typeface="Courier New" pitchFamily="49" charset="0"/>
                         </a:rPr>
-                        <a:t>Obj</a:t>
-                      </a:r>
-                      <a:r>
-                        <a:rPr lang="en-GB" sz="1100" b="0" baseline="0" dirty="0" smtClean="0">
-                          <a:solidFill>
-                            <a:schemeClr val="tx1"/>
-                          </a:solidFill>
-                          <a:latin typeface="Courier New" pitchFamily="49" charset="0"/>
-                        </a:rPr>
-                        <a:t> : </a:t>
-                      </a:r>
+                        <a:t>isOK</a:t>
+                      </a:r>
+                      <a:r>
+                        <a:rPr lang="en-GB" sz="1100" b="0" baseline="0" dirty="0" smtClean="0">
+                          <a:solidFill>
+                            <a:schemeClr val="tx1"/>
+                          </a:solidFill>
+                          <a:latin typeface="Courier New" pitchFamily="49" charset="0"/>
+                        </a:rPr>
+                        <a:t>, "_Z4isOKv");</a:t>
+                      </a:r>
+                    </a:p>
+                    <a:p>
+                      <a:pPr marL="0" marR="0" indent="0" algn="l" defTabSz="914400" rtl="0" eaLnBrk="1" fontAlgn="auto" latinLnBrk="0" hangingPunct="1">
+                        <a:lnSpc>
+                          <a:spcPct val="100000"/>
+                        </a:lnSpc>
+                        <a:spcBef>
+                          <a:spcPts val="0"/>
+                        </a:spcBef>
+                        <a:spcAft>
+                          <a:spcPts val="0"/>
+                        </a:spcAft>
+                        <a:buClrTx/>
+                        <a:buSzTx/>
+                        <a:buFontTx/>
+                        <a:buNone/>
+                        <a:tabLst/>
+                        <a:defRPr/>
+                      </a:pPr>
+                      <a:r>
+                        <a:rPr lang="en-GB" sz="1100" b="0" baseline="0" dirty="0" smtClean="0">
+                          <a:solidFill>
+                            <a:schemeClr val="tx1"/>
+                          </a:solidFill>
+                          <a:latin typeface="Courier New" pitchFamily="49" charset="0"/>
+                        </a:rPr>
+                        <a:t>   Res </a:t>
+                      </a:r>
+                      <a:r>
+                        <a:rPr lang="en-GB" sz="1100" b="0" baseline="0" dirty="0" smtClean="0">
+                          <a:solidFill>
+                            <a:schemeClr val="tx1"/>
+                          </a:solidFill>
+                          <a:latin typeface="Courier New" pitchFamily="49" charset="0"/>
+                        </a:rPr>
+                        <a:t>: </a:t>
+                      </a:r>
+                      <a:r>
+                        <a:rPr lang="en-GB" sz="1100" b="0" baseline="0" dirty="0" err="1" smtClean="0">
+                          <a:solidFill>
+                            <a:schemeClr val="tx1"/>
+                          </a:solidFill>
+                          <a:latin typeface="Courier New" pitchFamily="49" charset="0"/>
+                        </a:rPr>
+                        <a:t>Interfaces.C.Extensions.bool</a:t>
+                      </a:r>
+                      <a:r>
+                        <a:rPr lang="en-GB" sz="1100" b="0" baseline="0" dirty="0" smtClean="0">
+                          <a:solidFill>
+                            <a:schemeClr val="tx1"/>
+                          </a:solidFill>
+                          <a:latin typeface="Courier New" pitchFamily="49" charset="0"/>
+                        </a:rPr>
+                        <a:t>;</a:t>
+                      </a:r>
+                    </a:p>
+                    <a:p>
+                      <a:pPr marL="0" marR="0" indent="0" algn="l" defTabSz="914400" rtl="0" eaLnBrk="1" fontAlgn="auto" latinLnBrk="0" hangingPunct="1">
+                        <a:lnSpc>
+                          <a:spcPct val="100000"/>
+                        </a:lnSpc>
+                        <a:spcBef>
+                          <a:spcPts val="0"/>
+                        </a:spcBef>
+                        <a:spcAft>
+                          <a:spcPts val="0"/>
+                        </a:spcAft>
+                        <a:buClrTx/>
+                        <a:buSzTx/>
+                        <a:buFontTx/>
+                        <a:buNone/>
+                        <a:tabLst/>
+                        <a:defRPr/>
+                      </a:pPr>
                       <a:r>
                         <a:rPr lang="en-GB" sz="1100" b="1" baseline="0" dirty="0" smtClean="0">
                           <a:solidFill>
@@ -24955,44 +24443,35 @@
                           </a:solidFill>
                           <a:latin typeface="Courier New" pitchFamily="49" charset="0"/>
                         </a:rPr>
-                        <a:t>aliased</a:t>
-                      </a:r>
-                      <a:r>
-                        <a:rPr lang="en-GB" sz="1100" b="0" baseline="0" dirty="0" smtClean="0">
-                          <a:solidFill>
-                            <a:schemeClr val="tx1"/>
-                          </a:solidFill>
-                          <a:latin typeface="Courier New" pitchFamily="49" charset="0"/>
-                        </a:rPr>
-                        <a:t> Animal;</a:t>
-                      </a:r>
-                    </a:p>
-                    <a:p>
-                      <a:pPr marL="0" marR="0" indent="0" algn="l" defTabSz="914400" rtl="0" eaLnBrk="1" fontAlgn="auto" latinLnBrk="0" hangingPunct="1">
-                        <a:lnSpc>
-                          <a:spcPct val="100000"/>
-                        </a:lnSpc>
-                        <a:spcBef>
-                          <a:spcPts val="0"/>
-                        </a:spcBef>
-                        <a:spcAft>
-                          <a:spcPts val="0"/>
-                        </a:spcAft>
-                        <a:buClrTx/>
-                        <a:buSzTx/>
-                        <a:buFontTx/>
-                        <a:buNone/>
-                        <a:tabLst/>
-                        <a:defRPr/>
-                      </a:pPr>
-                      <a:r>
-                        <a:rPr lang="en-GB" sz="1100" b="0" baseline="0" dirty="0" smtClean="0">
-                          <a:solidFill>
-                            <a:schemeClr val="tx1"/>
-                          </a:solidFill>
-                          <a:latin typeface="Courier New" pitchFamily="49" charset="0"/>
-                        </a:rPr>
-                        <a:t>   Res : </a:t>
+                        <a:t>begin</a:t>
+                      </a:r>
+                    </a:p>
+                    <a:p>
+                      <a:pPr marL="0" marR="0" indent="0" algn="l" defTabSz="914400" rtl="0" eaLnBrk="1" fontAlgn="auto" latinLnBrk="0" hangingPunct="1">
+                        <a:lnSpc>
+                          <a:spcPct val="100000"/>
+                        </a:lnSpc>
+                        <a:spcBef>
+                          <a:spcPts val="0"/>
+                        </a:spcBef>
+                        <a:spcAft>
+                          <a:spcPts val="0"/>
+                        </a:spcAft>
+                        <a:buClrTx/>
+                        <a:buSzTx/>
+                        <a:buFontTx/>
+                        <a:buNone/>
+                        <a:tabLst/>
+                        <a:defRPr/>
+                      </a:pPr>
+                      <a:r>
+                        <a:rPr lang="en-GB" sz="1100" b="0" baseline="0" dirty="0" smtClean="0">
+                          <a:solidFill>
+                            <a:schemeClr val="tx1"/>
+                          </a:solidFill>
+                          <a:latin typeface="Courier New" pitchFamily="49" charset="0"/>
+                        </a:rPr>
+                        <a:t>   Res := </a:t>
                       </a:r>
                       <a:r>
                         <a:rPr lang="en-GB" sz="1100" b="0" baseline="0" dirty="0" err="1" smtClean="0">
@@ -25001,7 +24480,7 @@
                           </a:solidFill>
                           <a:latin typeface="Courier New" pitchFamily="49" charset="0"/>
                         </a:rPr>
-                        <a:t>Interfaces.C.Extensions.bool</a:t>
+                        <a:t>isOK</a:t>
                       </a:r>
                       <a:r>
                         <a:rPr lang="en-GB" sz="1100" b="0" baseline="0" dirty="0" smtClean="0">
@@ -25012,107 +24491,12 @@
                         </a:rPr>
                         <a:t>;</a:t>
                       </a:r>
-                    </a:p>
-                    <a:p>
-                      <a:pPr marL="0" marR="0" indent="0" algn="l" defTabSz="914400" rtl="0" eaLnBrk="1" fontAlgn="auto" latinLnBrk="0" hangingPunct="1">
-                        <a:lnSpc>
-                          <a:spcPct val="100000"/>
-                        </a:lnSpc>
-                        <a:spcBef>
-                          <a:spcPts val="0"/>
-                        </a:spcBef>
-                        <a:spcAft>
-                          <a:spcPts val="0"/>
-                        </a:spcAft>
-                        <a:buClrTx/>
-                        <a:buSzTx/>
-                        <a:buFontTx/>
-                        <a:buNone/>
-                        <a:tabLst/>
-                        <a:defRPr/>
-                      </a:pPr>
-                      <a:r>
-                        <a:rPr lang="en-GB" sz="1100" b="1" baseline="0" dirty="0" smtClean="0">
-                          <a:solidFill>
-                            <a:schemeClr val="tx1"/>
-                          </a:solidFill>
-                          <a:latin typeface="Courier New" pitchFamily="49" charset="0"/>
-                        </a:rPr>
-                        <a:t>begin</a:t>
-                      </a:r>
-                    </a:p>
-                    <a:p>
-                      <a:pPr marL="0" marR="0" indent="0" algn="l" defTabSz="914400" rtl="0" eaLnBrk="1" fontAlgn="auto" latinLnBrk="0" hangingPunct="1">
-                        <a:lnSpc>
-                          <a:spcPct val="100000"/>
-                        </a:lnSpc>
-                        <a:spcBef>
-                          <a:spcPts val="0"/>
-                        </a:spcBef>
-                        <a:spcAft>
-                          <a:spcPts val="0"/>
-                        </a:spcAft>
-                        <a:buClrTx/>
-                        <a:buSzTx/>
-                        <a:buFontTx/>
-                        <a:buNone/>
-                        <a:tabLst/>
-                        <a:defRPr/>
-                      </a:pPr>
-                      <a:r>
-                        <a:rPr lang="en-GB" sz="1100" b="0" baseline="0" dirty="0" smtClean="0">
-                          <a:solidFill>
-                            <a:schemeClr val="tx1"/>
-                          </a:solidFill>
-                          <a:latin typeface="Courier New" pitchFamily="49" charset="0"/>
-                        </a:rPr>
-                        <a:t>   Res := </a:t>
-                      </a:r>
-                      <a:r>
-                        <a:rPr lang="en-GB" sz="1100" b="0" baseline="0" dirty="0" err="1" smtClean="0">
-                          <a:solidFill>
-                            <a:schemeClr val="tx1"/>
-                          </a:solidFill>
-                          <a:latin typeface="Courier New" pitchFamily="49" charset="0"/>
-                        </a:rPr>
-                        <a:t>isOK</a:t>
-                      </a:r>
-                      <a:r>
-                        <a:rPr lang="en-GB" sz="1100" b="0" baseline="0" dirty="0" smtClean="0">
-                          <a:solidFill>
-                            <a:schemeClr val="tx1"/>
-                          </a:solidFill>
-                          <a:latin typeface="Courier New" pitchFamily="49" charset="0"/>
-                        </a:rPr>
-                        <a:t>(</a:t>
-                      </a:r>
-                      <a:r>
-                        <a:rPr lang="en-GB" sz="1100" b="0" baseline="0" dirty="0" err="1" smtClean="0">
-                          <a:solidFill>
-                            <a:schemeClr val="tx1"/>
-                          </a:solidFill>
-                          <a:latin typeface="Courier New" pitchFamily="49" charset="0"/>
-                        </a:rPr>
-                        <a:t>Obj'</a:t>
-                      </a:r>
-                      <a:r>
-                        <a:rPr lang="en-GB" sz="1100" b="1" baseline="0" dirty="0" err="1" smtClean="0">
-                          <a:solidFill>
-                            <a:schemeClr val="tx1"/>
-                          </a:solidFill>
-                          <a:latin typeface="Courier New" pitchFamily="49" charset="0"/>
-                        </a:rPr>
-                        <a:t>Access</a:t>
-                      </a:r>
-                      <a:r>
-                        <a:rPr lang="en-GB" sz="1100" b="0" baseline="0" dirty="0" smtClean="0">
-                          <a:solidFill>
-                            <a:schemeClr val="tx1"/>
-                          </a:solidFill>
-                          <a:latin typeface="Courier New" pitchFamily="49" charset="0"/>
-                        </a:rPr>
-                        <a:t>);</a:t>
-                      </a:r>
+                      <a:endParaRPr lang="en-GB" sz="1100" b="0" baseline="0" dirty="0" smtClean="0">
+                        <a:solidFill>
+                          <a:schemeClr val="tx1"/>
+                        </a:solidFill>
+                        <a:latin typeface="Courier New" pitchFamily="49" charset="0"/>
+                      </a:endParaRPr>
                     </a:p>
                     <a:p>
                       <a:pPr marL="0" marR="0" indent="0" algn="l" defTabSz="914400" rtl="0" eaLnBrk="1" fontAlgn="auto" latinLnBrk="0" hangingPunct="1">
@@ -25319,6 +24703,13 @@
   <p:clrMapOvr>
     <a:masterClrMapping/>
   </p:clrMapOvr>
+  <p:timing>
+    <p:tnLst>
+      <p:par>
+        <p:cTn id="1" dur="indefinite" restart="never" nodeType="tmRoot"/>
+      </p:par>
+    </p:tnLst>
+  </p:timing>
 </p:sld>
 </file>
 
@@ -25349,6 +24740,13 @@
   <p:clrMapOvr>
     <a:masterClrMapping/>
   </p:clrMapOvr>
+  <p:timing>
+    <p:tnLst>
+      <p:par>
+        <p:cTn id="1" dur="indefinite" restart="never" nodeType="tmRoot"/>
+      </p:par>
+    </p:tnLst>
+  </p:timing>
 </p:sld>
 </file>
 

</xml_diff>